<commit_message>
Modified PPT and Document with Updated Feature
</commit_message>
<xml_diff>
--- a/Documents/D2_VIVA_FINAL_PPT.pptx
+++ b/Documents/D2_VIVA_FINAL_PPT.pptx
@@ -5,12 +5,15 @@
     <p:sldMasterId id="2147483648" r:id="rId1"/>
   </p:sldMasterIdLst>
   <p:notesMasterIdLst>
-    <p:notesMasterId r:id="rId6"/>
+    <p:notesMasterId r:id="rId4"/>
   </p:notesMasterIdLst>
+  <p:handoutMasterIdLst>
+    <p:handoutMasterId r:id="rId32"/>
+  </p:handoutMasterIdLst>
   <p:sldIdLst>
     <p:sldId id="256" r:id="rId3"/>
-    <p:sldId id="257" r:id="rId4"/>
-    <p:sldId id="258" r:id="rId5"/>
+    <p:sldId id="257" r:id="rId5"/>
+    <p:sldId id="258" r:id="rId6"/>
     <p:sldId id="259" r:id="rId7"/>
     <p:sldId id="260" r:id="rId8"/>
     <p:sldId id="261" r:id="rId9"/>
@@ -31,9 +34,11 @@
     <p:sldId id="288" r:id="rId24"/>
     <p:sldId id="289" r:id="rId25"/>
     <p:sldId id="299" r:id="rId26"/>
-    <p:sldId id="272" r:id="rId27"/>
-    <p:sldId id="273" r:id="rId28"/>
-    <p:sldId id="274" r:id="rId29"/>
+    <p:sldId id="303" r:id="rId27"/>
+    <p:sldId id="304" r:id="rId28"/>
+    <p:sldId id="272" r:id="rId29"/>
+    <p:sldId id="273" r:id="rId30"/>
+    <p:sldId id="274" r:id="rId31"/>
   </p:sldIdLst>
   <p:sldSz cx="9144000" cy="6858000" type="screen4x3"/>
   <p:notesSz cx="6858000" cy="9144000"/>
@@ -135,6 +140,165 @@
 </p:presentation>
 </file>
 
+<file path=ppt/handoutMasters/handoutMaster1.xml><?xml version="1.0" encoding="utf-8"?>
+<p:handoutMaster xmlns:a="http://schemas.openxmlformats.org/drawingml/2006/main" xmlns:r="http://schemas.openxmlformats.org/officeDocument/2006/relationships" xmlns:p="http://schemas.openxmlformats.org/presentationml/2006/main">
+  <p:cSld>
+    <p:bg>
+      <p:bgRef idx="1001">
+        <a:schemeClr val="bg1"/>
+      </p:bgRef>
+    </p:bg>
+    <p:spTree>
+      <p:nvGrpSpPr>
+        <p:cNvPr id="1" name=""/>
+        <p:cNvGrpSpPr/>
+        <p:nvPr/>
+      </p:nvGrpSpPr>
+      <p:grpSpPr>
+        <a:xfrm>
+          <a:off x="0" y="0"/>
+          <a:ext cx="0" cy="0"/>
+          <a:chOff x="0" y="0"/>
+          <a:chExt cx="0" cy="0"/>
+        </a:xfrm>
+      </p:grpSpPr>
+      <p:sp>
+        <p:nvSpPr>
+          <p:cNvPr id="2" name="Header Placeholder 1"/>
+          <p:cNvSpPr>
+            <a:spLocks noGrp="1"/>
+          </p:cNvSpPr>
+          <p:nvPr>
+            <p:ph type="hdr" sz="quarter"/>
+          </p:nvPr>
+        </p:nvSpPr>
+        <p:spPr>
+          <a:xfrm>
+            <a:off x="0" y="0"/>
+            <a:ext cx="2971800" cy="458788"/>
+          </a:xfrm>
+          <a:prstGeom prst="rect">
+            <a:avLst/>
+          </a:prstGeom>
+        </p:spPr>
+        <p:txBody>
+          <a:bodyPr vert="horz" lIns="91440" tIns="45720" rIns="91440" bIns="45720" rtlCol="0"/>
+          <a:lstStyle>
+            <a:lvl1pPr algn="l">
+              <a:defRPr sz="1200"/>
+            </a:lvl1pPr>
+          </a:lstStyle>
+          <a:p>
+            <a:endParaRPr lang="en-US"/>
+          </a:p>
+        </p:txBody>
+      </p:sp>
+      <p:sp>
+        <p:nvSpPr>
+          <p:cNvPr id="3" name="Date Placeholder 2"/>
+          <p:cNvSpPr>
+            <a:spLocks noGrp="1"/>
+          </p:cNvSpPr>
+          <p:nvPr>
+            <p:ph type="dt" sz="quarter" idx="1"/>
+          </p:nvPr>
+        </p:nvSpPr>
+        <p:spPr>
+          <a:xfrm>
+            <a:off x="3884613" y="0"/>
+            <a:ext cx="2971800" cy="458788"/>
+          </a:xfrm>
+          <a:prstGeom prst="rect">
+            <a:avLst/>
+          </a:prstGeom>
+        </p:spPr>
+        <p:txBody>
+          <a:bodyPr vert="horz" lIns="91440" tIns="45720" rIns="91440" bIns="45720" rtlCol="0"/>
+          <a:lstStyle>
+            <a:lvl1pPr algn="r">
+              <a:defRPr sz="1200"/>
+            </a:lvl1pPr>
+          </a:lstStyle>
+          <a:p>
+            <a:fld id="{696C064A-D61B-4B21-B757-51A9B82445B8}" type="datetimeFigureOut">
+              <a:rPr lang="en-US" smtClean="0"/>
+            </a:fld>
+            <a:endParaRPr lang="en-US"/>
+          </a:p>
+        </p:txBody>
+      </p:sp>
+      <p:sp>
+        <p:nvSpPr>
+          <p:cNvPr id="4" name="Footer Placeholder 3"/>
+          <p:cNvSpPr>
+            <a:spLocks noGrp="1"/>
+          </p:cNvSpPr>
+          <p:nvPr>
+            <p:ph type="ftr" sz="quarter" idx="2"/>
+          </p:nvPr>
+        </p:nvSpPr>
+        <p:spPr>
+          <a:xfrm>
+            <a:off x="0" y="8685213"/>
+            <a:ext cx="2971800" cy="458787"/>
+          </a:xfrm>
+          <a:prstGeom prst="rect">
+            <a:avLst/>
+          </a:prstGeom>
+        </p:spPr>
+        <p:txBody>
+          <a:bodyPr vert="horz" lIns="91440" tIns="45720" rIns="91440" bIns="45720" rtlCol="0" anchor="b"/>
+          <a:lstStyle>
+            <a:lvl1pPr algn="l">
+              <a:defRPr sz="1200"/>
+            </a:lvl1pPr>
+          </a:lstStyle>
+          <a:p>
+            <a:endParaRPr lang="en-US"/>
+          </a:p>
+        </p:txBody>
+      </p:sp>
+      <p:sp>
+        <p:nvSpPr>
+          <p:cNvPr id="5" name="Slide Number Placeholder 4"/>
+          <p:cNvSpPr>
+            <a:spLocks noGrp="1"/>
+          </p:cNvSpPr>
+          <p:nvPr>
+            <p:ph type="sldNum" sz="quarter" idx="3"/>
+          </p:nvPr>
+        </p:nvSpPr>
+        <p:spPr>
+          <a:xfrm>
+            <a:off x="3884613" y="8685213"/>
+            <a:ext cx="2971800" cy="458787"/>
+          </a:xfrm>
+          <a:prstGeom prst="rect">
+            <a:avLst/>
+          </a:prstGeom>
+        </p:spPr>
+        <p:txBody>
+          <a:bodyPr vert="horz" lIns="91440" tIns="45720" rIns="91440" bIns="45720" rtlCol="0" anchor="b"/>
+          <a:lstStyle>
+            <a:lvl1pPr algn="r">
+              <a:defRPr sz="1200"/>
+            </a:lvl1pPr>
+          </a:lstStyle>
+          <a:p>
+            <a:fld id="{50305E07-67EA-4042-A3F6-853A8AD8D209}" type="slidenum">
+              <a:rPr lang="en-US" smtClean="0"/>
+            </a:fld>
+            <a:endParaRPr lang="en-US"/>
+          </a:p>
+        </p:txBody>
+      </p:sp>
+    </p:spTree>
+  </p:cSld>
+  <p:clrMap bg1="lt1" tx1="dk1" bg2="lt2" tx2="dk2" accent1="accent1" accent2="accent2" accent3="accent3" accent4="accent4" accent5="accent5" accent6="accent6" hlink="hlink" folHlink="folHlink"/>
+  <p:hf hdr="0" ftr="0" dt="0"/>
+</p:handoutMaster>
+</file>
+
 <file path=ppt/notesMasters/notesMaster1.xml><?xml version="1.0" encoding="utf-8"?>
 <p:notesMaster xmlns:a="http://schemas.openxmlformats.org/drawingml/2006/main" xmlns:r="http://schemas.openxmlformats.org/officeDocument/2006/relationships" xmlns:p="http://schemas.openxmlformats.org/presentationml/2006/main">
   <p:cSld>
@@ -387,6 +551,7 @@
     </p:spTree>
   </p:cSld>
   <p:clrMap bg1="lt1" tx1="dk1" bg2="lt2" tx2="dk2" accent1="accent1" accent2="accent2" accent3="accent3" accent4="accent4" accent5="accent5" accent6="accent6" hlink="hlink" folHlink="folHlink"/>
+  <p:hf hdr="0" ftr="0" dt="0"/>
   <p:notesStyle>
     <a:lvl1pPr marL="0" algn="l" defTabSz="914400" rtl="0" eaLnBrk="1" latinLnBrk="0" hangingPunct="1">
       <a:defRPr sz="1200" kern="1200">
@@ -514,6 +679,1782 @@
         <p:txBody>
           <a:bodyPr/>
           <a:p>
+            <a:endParaRPr lang="en-US"/>
+          </a:p>
+        </p:txBody>
+      </p:sp>
+      <p:sp>
+        <p:nvSpPr>
+          <p:cNvPr id="4" name="Slide Number Placeholder 3"/>
+          <p:cNvSpPr>
+            <a:spLocks noGrp="1"/>
+          </p:cNvSpPr>
+          <p:nvPr>
+            <p:ph type="sldNum" sz="quarter" idx="5"/>
+          </p:nvPr>
+        </p:nvSpPr>
+        <p:spPr/>
+        <p:txBody>
+          <a:bodyPr/>
+          <a:p>
+            <a:fld id="{21B2AA4F-B828-4D7C-AFD3-893933DAFCB4}" type="slidenum">
+              <a:rPr lang="en-US" smtClean="0"/>
+            </a:fld>
+            <a:endParaRPr lang="en-US"/>
+          </a:p>
+        </p:txBody>
+      </p:sp>
+    </p:spTree>
+  </p:cSld>
+  <p:clrMapOvr>
+    <a:masterClrMapping/>
+  </p:clrMapOvr>
+</p:notes>
+</file>
+
+<file path=ppt/notesSlides/notesSlide10.xml><?xml version="1.0" encoding="utf-8"?>
+<p:notes xmlns:a="http://schemas.openxmlformats.org/drawingml/2006/main" xmlns:r="http://schemas.openxmlformats.org/officeDocument/2006/relationships" xmlns:p="http://schemas.openxmlformats.org/presentationml/2006/main">
+  <p:cSld>
+    <p:spTree>
+      <p:nvGrpSpPr>
+        <p:cNvPr id="1" name=""/>
+        <p:cNvGrpSpPr/>
+        <p:nvPr/>
+      </p:nvGrpSpPr>
+      <p:grpSpPr/>
+      <p:sp>
+        <p:nvSpPr>
+          <p:cNvPr id="2" name="Slide Image Placeholder 1"/>
+          <p:cNvSpPr/>
+          <p:nvPr>
+            <p:ph type="sldImg" idx="2"/>
+          </p:nvPr>
+        </p:nvSpPr>
+        <p:spPr/>
+      </p:sp>
+      <p:sp>
+        <p:nvSpPr>
+          <p:cNvPr id="3" name="Text Placeholder 2"/>
+          <p:cNvSpPr/>
+          <p:nvPr>
+            <p:ph type="body" idx="3"/>
+          </p:nvPr>
+        </p:nvSpPr>
+        <p:spPr/>
+        <p:txBody>
+          <a:bodyPr/>
+          <a:p>
+            <a:endParaRPr lang="en-US"/>
+          </a:p>
+        </p:txBody>
+      </p:sp>
+      <p:sp>
+        <p:nvSpPr>
+          <p:cNvPr id="4" name="Slide Number Placeholder 3"/>
+          <p:cNvSpPr>
+            <a:spLocks noGrp="1"/>
+          </p:cNvSpPr>
+          <p:nvPr>
+            <p:ph type="sldNum" sz="quarter" idx="5"/>
+          </p:nvPr>
+        </p:nvSpPr>
+        <p:spPr/>
+        <p:txBody>
+          <a:bodyPr/>
+          <a:p>
+            <a:fld id="{21B2AA4F-B828-4D7C-AFD3-893933DAFCB4}" type="slidenum">
+              <a:rPr lang="en-US" smtClean="0"/>
+            </a:fld>
+            <a:endParaRPr lang="en-US"/>
+          </a:p>
+        </p:txBody>
+      </p:sp>
+    </p:spTree>
+  </p:cSld>
+  <p:clrMapOvr>
+    <a:masterClrMapping/>
+  </p:clrMapOvr>
+</p:notes>
+</file>
+
+<file path=ppt/notesSlides/notesSlide11.xml><?xml version="1.0" encoding="utf-8"?>
+<p:notes xmlns:a="http://schemas.openxmlformats.org/drawingml/2006/main" xmlns:r="http://schemas.openxmlformats.org/officeDocument/2006/relationships" xmlns:p="http://schemas.openxmlformats.org/presentationml/2006/main">
+  <p:cSld>
+    <p:spTree>
+      <p:nvGrpSpPr>
+        <p:cNvPr id="1" name=""/>
+        <p:cNvGrpSpPr/>
+        <p:nvPr/>
+      </p:nvGrpSpPr>
+      <p:grpSpPr/>
+      <p:sp>
+        <p:nvSpPr>
+          <p:cNvPr id="2" name="Slide Image Placeholder 1"/>
+          <p:cNvSpPr/>
+          <p:nvPr>
+            <p:ph type="sldImg" idx="2"/>
+          </p:nvPr>
+        </p:nvSpPr>
+        <p:spPr/>
+      </p:sp>
+      <p:sp>
+        <p:nvSpPr>
+          <p:cNvPr id="3" name="Text Placeholder 2"/>
+          <p:cNvSpPr/>
+          <p:nvPr>
+            <p:ph type="body" idx="3"/>
+          </p:nvPr>
+        </p:nvSpPr>
+        <p:spPr/>
+        <p:txBody>
+          <a:bodyPr/>
+          <a:p>
+            <a:endParaRPr lang="en-US"/>
+          </a:p>
+        </p:txBody>
+      </p:sp>
+      <p:sp>
+        <p:nvSpPr>
+          <p:cNvPr id="4" name="Slide Number Placeholder 3"/>
+          <p:cNvSpPr>
+            <a:spLocks noGrp="1"/>
+          </p:cNvSpPr>
+          <p:nvPr>
+            <p:ph type="sldNum" sz="quarter" idx="5"/>
+          </p:nvPr>
+        </p:nvSpPr>
+        <p:spPr/>
+        <p:txBody>
+          <a:bodyPr/>
+          <a:p>
+            <a:fld id="{21B2AA4F-B828-4D7C-AFD3-893933DAFCB4}" type="slidenum">
+              <a:rPr lang="en-US" smtClean="0"/>
+            </a:fld>
+            <a:endParaRPr lang="en-US"/>
+          </a:p>
+        </p:txBody>
+      </p:sp>
+    </p:spTree>
+  </p:cSld>
+  <p:clrMapOvr>
+    <a:masterClrMapping/>
+  </p:clrMapOvr>
+</p:notes>
+</file>
+
+<file path=ppt/notesSlides/notesSlide12.xml><?xml version="1.0" encoding="utf-8"?>
+<p:notes xmlns:a="http://schemas.openxmlformats.org/drawingml/2006/main" xmlns:r="http://schemas.openxmlformats.org/officeDocument/2006/relationships" xmlns:p="http://schemas.openxmlformats.org/presentationml/2006/main">
+  <p:cSld>
+    <p:spTree>
+      <p:nvGrpSpPr>
+        <p:cNvPr id="1" name=""/>
+        <p:cNvGrpSpPr/>
+        <p:nvPr/>
+      </p:nvGrpSpPr>
+      <p:grpSpPr/>
+      <p:sp>
+        <p:nvSpPr>
+          <p:cNvPr id="2" name="Slide Image Placeholder 1"/>
+          <p:cNvSpPr/>
+          <p:nvPr>
+            <p:ph type="sldImg" idx="2"/>
+          </p:nvPr>
+        </p:nvSpPr>
+        <p:spPr/>
+      </p:sp>
+      <p:sp>
+        <p:nvSpPr>
+          <p:cNvPr id="3" name="Text Placeholder 2"/>
+          <p:cNvSpPr/>
+          <p:nvPr>
+            <p:ph type="body" idx="3"/>
+          </p:nvPr>
+        </p:nvSpPr>
+        <p:spPr/>
+        <p:txBody>
+          <a:bodyPr/>
+          <a:p>
+            <a:endParaRPr lang="en-US"/>
+          </a:p>
+        </p:txBody>
+      </p:sp>
+      <p:sp>
+        <p:nvSpPr>
+          <p:cNvPr id="4" name="Slide Number Placeholder 3"/>
+          <p:cNvSpPr>
+            <a:spLocks noGrp="1"/>
+          </p:cNvSpPr>
+          <p:nvPr>
+            <p:ph type="sldNum" sz="quarter" idx="5"/>
+          </p:nvPr>
+        </p:nvSpPr>
+        <p:spPr/>
+        <p:txBody>
+          <a:bodyPr/>
+          <a:p>
+            <a:fld id="{21B2AA4F-B828-4D7C-AFD3-893933DAFCB4}" type="slidenum">
+              <a:rPr lang="en-US" smtClean="0"/>
+            </a:fld>
+            <a:endParaRPr lang="en-US"/>
+          </a:p>
+        </p:txBody>
+      </p:sp>
+    </p:spTree>
+  </p:cSld>
+  <p:clrMapOvr>
+    <a:masterClrMapping/>
+  </p:clrMapOvr>
+</p:notes>
+</file>
+
+<file path=ppt/notesSlides/notesSlide13.xml><?xml version="1.0" encoding="utf-8"?>
+<p:notes xmlns:a="http://schemas.openxmlformats.org/drawingml/2006/main" xmlns:r="http://schemas.openxmlformats.org/officeDocument/2006/relationships" xmlns:p="http://schemas.openxmlformats.org/presentationml/2006/main">
+  <p:cSld>
+    <p:spTree>
+      <p:nvGrpSpPr>
+        <p:cNvPr id="1" name=""/>
+        <p:cNvGrpSpPr/>
+        <p:nvPr/>
+      </p:nvGrpSpPr>
+      <p:grpSpPr/>
+      <p:sp>
+        <p:nvSpPr>
+          <p:cNvPr id="2" name="Slide Image Placeholder 1"/>
+          <p:cNvSpPr/>
+          <p:nvPr>
+            <p:ph type="sldImg" idx="2"/>
+          </p:nvPr>
+        </p:nvSpPr>
+        <p:spPr/>
+      </p:sp>
+      <p:sp>
+        <p:nvSpPr>
+          <p:cNvPr id="3" name="Text Placeholder 2"/>
+          <p:cNvSpPr/>
+          <p:nvPr>
+            <p:ph type="body" idx="3"/>
+          </p:nvPr>
+        </p:nvSpPr>
+        <p:spPr/>
+        <p:txBody>
+          <a:bodyPr/>
+          <a:p>
+            <a:endParaRPr lang="en-US"/>
+          </a:p>
+        </p:txBody>
+      </p:sp>
+      <p:sp>
+        <p:nvSpPr>
+          <p:cNvPr id="4" name="Slide Number Placeholder 3"/>
+          <p:cNvSpPr>
+            <a:spLocks noGrp="1"/>
+          </p:cNvSpPr>
+          <p:nvPr>
+            <p:ph type="sldNum" sz="quarter" idx="5"/>
+          </p:nvPr>
+        </p:nvSpPr>
+        <p:spPr/>
+        <p:txBody>
+          <a:bodyPr/>
+          <a:p>
+            <a:fld id="{21B2AA4F-B828-4D7C-AFD3-893933DAFCB4}" type="slidenum">
+              <a:rPr lang="en-US" smtClean="0"/>
+            </a:fld>
+            <a:endParaRPr lang="en-US"/>
+          </a:p>
+        </p:txBody>
+      </p:sp>
+    </p:spTree>
+  </p:cSld>
+  <p:clrMapOvr>
+    <a:masterClrMapping/>
+  </p:clrMapOvr>
+</p:notes>
+</file>
+
+<file path=ppt/notesSlides/notesSlide14.xml><?xml version="1.0" encoding="utf-8"?>
+<p:notes xmlns:a="http://schemas.openxmlformats.org/drawingml/2006/main" xmlns:r="http://schemas.openxmlformats.org/officeDocument/2006/relationships" xmlns:p="http://schemas.openxmlformats.org/presentationml/2006/main">
+  <p:cSld>
+    <p:spTree>
+      <p:nvGrpSpPr>
+        <p:cNvPr id="1" name=""/>
+        <p:cNvGrpSpPr/>
+        <p:nvPr/>
+      </p:nvGrpSpPr>
+      <p:grpSpPr/>
+      <p:sp>
+        <p:nvSpPr>
+          <p:cNvPr id="2" name="Slide Image Placeholder 1"/>
+          <p:cNvSpPr/>
+          <p:nvPr>
+            <p:ph type="sldImg" idx="2"/>
+          </p:nvPr>
+        </p:nvSpPr>
+        <p:spPr/>
+      </p:sp>
+      <p:sp>
+        <p:nvSpPr>
+          <p:cNvPr id="3" name="Text Placeholder 2"/>
+          <p:cNvSpPr/>
+          <p:nvPr>
+            <p:ph type="body" idx="3"/>
+          </p:nvPr>
+        </p:nvSpPr>
+        <p:spPr/>
+        <p:txBody>
+          <a:bodyPr/>
+          <a:p>
+            <a:endParaRPr lang="en-US"/>
+          </a:p>
+        </p:txBody>
+      </p:sp>
+      <p:sp>
+        <p:nvSpPr>
+          <p:cNvPr id="4" name="Slide Number Placeholder 3"/>
+          <p:cNvSpPr>
+            <a:spLocks noGrp="1"/>
+          </p:cNvSpPr>
+          <p:nvPr>
+            <p:ph type="sldNum" sz="quarter" idx="5"/>
+          </p:nvPr>
+        </p:nvSpPr>
+        <p:spPr/>
+        <p:txBody>
+          <a:bodyPr/>
+          <a:p>
+            <a:fld id="{21B2AA4F-B828-4D7C-AFD3-893933DAFCB4}" type="slidenum">
+              <a:rPr lang="en-US" smtClean="0"/>
+            </a:fld>
+            <a:endParaRPr lang="en-US"/>
+          </a:p>
+        </p:txBody>
+      </p:sp>
+    </p:spTree>
+  </p:cSld>
+  <p:clrMapOvr>
+    <a:masterClrMapping/>
+  </p:clrMapOvr>
+</p:notes>
+</file>
+
+<file path=ppt/notesSlides/notesSlide15.xml><?xml version="1.0" encoding="utf-8"?>
+<p:notes xmlns:a="http://schemas.openxmlformats.org/drawingml/2006/main" xmlns:r="http://schemas.openxmlformats.org/officeDocument/2006/relationships" xmlns:p="http://schemas.openxmlformats.org/presentationml/2006/main">
+  <p:cSld>
+    <p:spTree>
+      <p:nvGrpSpPr>
+        <p:cNvPr id="1" name=""/>
+        <p:cNvGrpSpPr/>
+        <p:nvPr/>
+      </p:nvGrpSpPr>
+      <p:grpSpPr/>
+      <p:sp>
+        <p:nvSpPr>
+          <p:cNvPr id="2" name="Slide Image Placeholder 1"/>
+          <p:cNvSpPr/>
+          <p:nvPr>
+            <p:ph type="sldImg" idx="2"/>
+          </p:nvPr>
+        </p:nvSpPr>
+        <p:spPr/>
+      </p:sp>
+      <p:sp>
+        <p:nvSpPr>
+          <p:cNvPr id="3" name="Text Placeholder 2"/>
+          <p:cNvSpPr/>
+          <p:nvPr>
+            <p:ph type="body" idx="3"/>
+          </p:nvPr>
+        </p:nvSpPr>
+        <p:spPr/>
+        <p:txBody>
+          <a:bodyPr/>
+          <a:p>
+            <a:endParaRPr lang="en-US"/>
+          </a:p>
+        </p:txBody>
+      </p:sp>
+      <p:sp>
+        <p:nvSpPr>
+          <p:cNvPr id="4" name="Slide Number Placeholder 3"/>
+          <p:cNvSpPr>
+            <a:spLocks noGrp="1"/>
+          </p:cNvSpPr>
+          <p:nvPr>
+            <p:ph type="sldNum" sz="quarter" idx="5"/>
+          </p:nvPr>
+        </p:nvSpPr>
+        <p:spPr/>
+        <p:txBody>
+          <a:bodyPr/>
+          <a:p>
+            <a:fld id="{21B2AA4F-B828-4D7C-AFD3-893933DAFCB4}" type="slidenum">
+              <a:rPr lang="en-US" smtClean="0"/>
+            </a:fld>
+            <a:endParaRPr lang="en-US"/>
+          </a:p>
+        </p:txBody>
+      </p:sp>
+    </p:spTree>
+  </p:cSld>
+  <p:clrMapOvr>
+    <a:masterClrMapping/>
+  </p:clrMapOvr>
+</p:notes>
+</file>
+
+<file path=ppt/notesSlides/notesSlide16.xml><?xml version="1.0" encoding="utf-8"?>
+<p:notes xmlns:a="http://schemas.openxmlformats.org/drawingml/2006/main" xmlns:r="http://schemas.openxmlformats.org/officeDocument/2006/relationships" xmlns:p="http://schemas.openxmlformats.org/presentationml/2006/main">
+  <p:cSld>
+    <p:spTree>
+      <p:nvGrpSpPr>
+        <p:cNvPr id="1" name=""/>
+        <p:cNvGrpSpPr/>
+        <p:nvPr/>
+      </p:nvGrpSpPr>
+      <p:grpSpPr/>
+      <p:sp>
+        <p:nvSpPr>
+          <p:cNvPr id="2" name="Slide Image Placeholder 1"/>
+          <p:cNvSpPr/>
+          <p:nvPr>
+            <p:ph type="sldImg" idx="2"/>
+          </p:nvPr>
+        </p:nvSpPr>
+        <p:spPr/>
+      </p:sp>
+      <p:sp>
+        <p:nvSpPr>
+          <p:cNvPr id="3" name="Text Placeholder 2"/>
+          <p:cNvSpPr/>
+          <p:nvPr>
+            <p:ph type="body" idx="3"/>
+          </p:nvPr>
+        </p:nvSpPr>
+        <p:spPr/>
+        <p:txBody>
+          <a:bodyPr/>
+          <a:p>
+            <a:endParaRPr lang="en-US"/>
+          </a:p>
+        </p:txBody>
+      </p:sp>
+      <p:sp>
+        <p:nvSpPr>
+          <p:cNvPr id="4" name="Slide Number Placeholder 3"/>
+          <p:cNvSpPr>
+            <a:spLocks noGrp="1"/>
+          </p:cNvSpPr>
+          <p:nvPr>
+            <p:ph type="sldNum" sz="quarter" idx="5"/>
+          </p:nvPr>
+        </p:nvSpPr>
+        <p:spPr/>
+        <p:txBody>
+          <a:bodyPr/>
+          <a:p>
+            <a:fld id="{21B2AA4F-B828-4D7C-AFD3-893933DAFCB4}" type="slidenum">
+              <a:rPr lang="en-US" smtClean="0"/>
+            </a:fld>
+            <a:endParaRPr lang="en-US"/>
+          </a:p>
+        </p:txBody>
+      </p:sp>
+    </p:spTree>
+  </p:cSld>
+  <p:clrMapOvr>
+    <a:masterClrMapping/>
+  </p:clrMapOvr>
+</p:notes>
+</file>
+
+<file path=ppt/notesSlides/notesSlide17.xml><?xml version="1.0" encoding="utf-8"?>
+<p:notes xmlns:a="http://schemas.openxmlformats.org/drawingml/2006/main" xmlns:r="http://schemas.openxmlformats.org/officeDocument/2006/relationships" xmlns:p="http://schemas.openxmlformats.org/presentationml/2006/main">
+  <p:cSld>
+    <p:spTree>
+      <p:nvGrpSpPr>
+        <p:cNvPr id="1" name=""/>
+        <p:cNvGrpSpPr/>
+        <p:nvPr/>
+      </p:nvGrpSpPr>
+      <p:grpSpPr/>
+      <p:sp>
+        <p:nvSpPr>
+          <p:cNvPr id="2" name="Slide Image Placeholder 1"/>
+          <p:cNvSpPr/>
+          <p:nvPr>
+            <p:ph type="sldImg" idx="2"/>
+          </p:nvPr>
+        </p:nvSpPr>
+        <p:spPr/>
+      </p:sp>
+      <p:sp>
+        <p:nvSpPr>
+          <p:cNvPr id="3" name="Text Placeholder 2"/>
+          <p:cNvSpPr/>
+          <p:nvPr>
+            <p:ph type="body" idx="3"/>
+          </p:nvPr>
+        </p:nvSpPr>
+        <p:spPr/>
+        <p:txBody>
+          <a:bodyPr/>
+          <a:p>
+            <a:endParaRPr lang="en-US"/>
+          </a:p>
+        </p:txBody>
+      </p:sp>
+      <p:sp>
+        <p:nvSpPr>
+          <p:cNvPr id="4" name="Slide Number Placeholder 3"/>
+          <p:cNvSpPr>
+            <a:spLocks noGrp="1"/>
+          </p:cNvSpPr>
+          <p:nvPr>
+            <p:ph type="sldNum" sz="quarter" idx="5"/>
+          </p:nvPr>
+        </p:nvSpPr>
+        <p:spPr/>
+        <p:txBody>
+          <a:bodyPr/>
+          <a:p>
+            <a:fld id="{21B2AA4F-B828-4D7C-AFD3-893933DAFCB4}" type="slidenum">
+              <a:rPr lang="en-US" smtClean="0"/>
+            </a:fld>
+            <a:endParaRPr lang="en-US"/>
+          </a:p>
+        </p:txBody>
+      </p:sp>
+    </p:spTree>
+  </p:cSld>
+  <p:clrMapOvr>
+    <a:masterClrMapping/>
+  </p:clrMapOvr>
+</p:notes>
+</file>
+
+<file path=ppt/notesSlides/notesSlide18.xml><?xml version="1.0" encoding="utf-8"?>
+<p:notes xmlns:a="http://schemas.openxmlformats.org/drawingml/2006/main" xmlns:r="http://schemas.openxmlformats.org/officeDocument/2006/relationships" xmlns:p="http://schemas.openxmlformats.org/presentationml/2006/main">
+  <p:cSld>
+    <p:spTree>
+      <p:nvGrpSpPr>
+        <p:cNvPr id="1" name=""/>
+        <p:cNvGrpSpPr/>
+        <p:nvPr/>
+      </p:nvGrpSpPr>
+      <p:grpSpPr/>
+      <p:sp>
+        <p:nvSpPr>
+          <p:cNvPr id="2" name="Slide Image Placeholder 1"/>
+          <p:cNvSpPr/>
+          <p:nvPr>
+            <p:ph type="sldImg" idx="2"/>
+          </p:nvPr>
+        </p:nvSpPr>
+        <p:spPr/>
+      </p:sp>
+      <p:sp>
+        <p:nvSpPr>
+          <p:cNvPr id="3" name="Text Placeholder 2"/>
+          <p:cNvSpPr/>
+          <p:nvPr>
+            <p:ph type="body" idx="3"/>
+          </p:nvPr>
+        </p:nvSpPr>
+        <p:spPr/>
+        <p:txBody>
+          <a:bodyPr/>
+          <a:p>
+            <a:endParaRPr lang="en-US"/>
+          </a:p>
+        </p:txBody>
+      </p:sp>
+      <p:sp>
+        <p:nvSpPr>
+          <p:cNvPr id="4" name="Slide Number Placeholder 3"/>
+          <p:cNvSpPr>
+            <a:spLocks noGrp="1"/>
+          </p:cNvSpPr>
+          <p:nvPr>
+            <p:ph type="sldNum" sz="quarter" idx="5"/>
+          </p:nvPr>
+        </p:nvSpPr>
+        <p:spPr/>
+        <p:txBody>
+          <a:bodyPr/>
+          <a:p>
+            <a:fld id="{21B2AA4F-B828-4D7C-AFD3-893933DAFCB4}" type="slidenum">
+              <a:rPr lang="en-US" smtClean="0"/>
+            </a:fld>
+            <a:endParaRPr lang="en-US"/>
+          </a:p>
+        </p:txBody>
+      </p:sp>
+    </p:spTree>
+  </p:cSld>
+  <p:clrMapOvr>
+    <a:masterClrMapping/>
+  </p:clrMapOvr>
+</p:notes>
+</file>
+
+<file path=ppt/notesSlides/notesSlide19.xml><?xml version="1.0" encoding="utf-8"?>
+<p:notes xmlns:a="http://schemas.openxmlformats.org/drawingml/2006/main" xmlns:r="http://schemas.openxmlformats.org/officeDocument/2006/relationships" xmlns:p="http://schemas.openxmlformats.org/presentationml/2006/main">
+  <p:cSld>
+    <p:spTree>
+      <p:nvGrpSpPr>
+        <p:cNvPr id="1" name=""/>
+        <p:cNvGrpSpPr/>
+        <p:nvPr/>
+      </p:nvGrpSpPr>
+      <p:grpSpPr/>
+      <p:sp>
+        <p:nvSpPr>
+          <p:cNvPr id="2" name="Slide Image Placeholder 1"/>
+          <p:cNvSpPr/>
+          <p:nvPr>
+            <p:ph type="sldImg" idx="2"/>
+          </p:nvPr>
+        </p:nvSpPr>
+        <p:spPr/>
+      </p:sp>
+      <p:sp>
+        <p:nvSpPr>
+          <p:cNvPr id="3" name="Text Placeholder 2"/>
+          <p:cNvSpPr/>
+          <p:nvPr>
+            <p:ph type="body" idx="3"/>
+          </p:nvPr>
+        </p:nvSpPr>
+        <p:spPr/>
+        <p:txBody>
+          <a:bodyPr/>
+          <a:p>
+            <a:endParaRPr lang="en-US"/>
+          </a:p>
+        </p:txBody>
+      </p:sp>
+      <p:sp>
+        <p:nvSpPr>
+          <p:cNvPr id="4" name="Slide Number Placeholder 3"/>
+          <p:cNvSpPr>
+            <a:spLocks noGrp="1"/>
+          </p:cNvSpPr>
+          <p:nvPr>
+            <p:ph type="sldNum" sz="quarter" idx="5"/>
+          </p:nvPr>
+        </p:nvSpPr>
+        <p:spPr/>
+        <p:txBody>
+          <a:bodyPr/>
+          <a:p>
+            <a:fld id="{21B2AA4F-B828-4D7C-AFD3-893933DAFCB4}" type="slidenum">
+              <a:rPr lang="en-US" smtClean="0"/>
+            </a:fld>
+            <a:endParaRPr lang="en-US"/>
+          </a:p>
+        </p:txBody>
+      </p:sp>
+    </p:spTree>
+  </p:cSld>
+  <p:clrMapOvr>
+    <a:masterClrMapping/>
+  </p:clrMapOvr>
+</p:notes>
+</file>
+
+<file path=ppt/notesSlides/notesSlide2.xml><?xml version="1.0" encoding="utf-8"?>
+<p:notes xmlns:a="http://schemas.openxmlformats.org/drawingml/2006/main" xmlns:r="http://schemas.openxmlformats.org/officeDocument/2006/relationships" xmlns:p="http://schemas.openxmlformats.org/presentationml/2006/main">
+  <p:cSld>
+    <p:spTree>
+      <p:nvGrpSpPr>
+        <p:cNvPr id="1" name=""/>
+        <p:cNvGrpSpPr/>
+        <p:nvPr/>
+      </p:nvGrpSpPr>
+      <p:grpSpPr/>
+      <p:sp>
+        <p:nvSpPr>
+          <p:cNvPr id="2" name="Slide Image Placeholder 1"/>
+          <p:cNvSpPr/>
+          <p:nvPr>
+            <p:ph type="sldImg" idx="2"/>
+          </p:nvPr>
+        </p:nvSpPr>
+        <p:spPr/>
+      </p:sp>
+      <p:sp>
+        <p:nvSpPr>
+          <p:cNvPr id="3" name="Text Placeholder 2"/>
+          <p:cNvSpPr/>
+          <p:nvPr>
+            <p:ph type="body" idx="3"/>
+          </p:nvPr>
+        </p:nvSpPr>
+        <p:spPr/>
+        <p:txBody>
+          <a:bodyPr/>
+          <a:p>
+            <a:endParaRPr lang="en-US"/>
+          </a:p>
+        </p:txBody>
+      </p:sp>
+      <p:sp>
+        <p:nvSpPr>
+          <p:cNvPr id="4" name="Slide Number Placeholder 3"/>
+          <p:cNvSpPr>
+            <a:spLocks noGrp="1"/>
+          </p:cNvSpPr>
+          <p:nvPr>
+            <p:ph type="sldNum" sz="quarter" idx="5"/>
+          </p:nvPr>
+        </p:nvSpPr>
+        <p:spPr/>
+        <p:txBody>
+          <a:bodyPr/>
+          <a:p>
+            <a:fld id="{21B2AA4F-B828-4D7C-AFD3-893933DAFCB4}" type="slidenum">
+              <a:rPr lang="en-US" smtClean="0"/>
+            </a:fld>
+            <a:endParaRPr lang="en-US"/>
+          </a:p>
+        </p:txBody>
+      </p:sp>
+    </p:spTree>
+  </p:cSld>
+  <p:clrMapOvr>
+    <a:masterClrMapping/>
+  </p:clrMapOvr>
+</p:notes>
+</file>
+
+<file path=ppt/notesSlides/notesSlide20.xml><?xml version="1.0" encoding="utf-8"?>
+<p:notes xmlns:a="http://schemas.openxmlformats.org/drawingml/2006/main" xmlns:r="http://schemas.openxmlformats.org/officeDocument/2006/relationships" xmlns:p="http://schemas.openxmlformats.org/presentationml/2006/main">
+  <p:cSld>
+    <p:spTree>
+      <p:nvGrpSpPr>
+        <p:cNvPr id="1" name=""/>
+        <p:cNvGrpSpPr/>
+        <p:nvPr/>
+      </p:nvGrpSpPr>
+      <p:grpSpPr/>
+      <p:sp>
+        <p:nvSpPr>
+          <p:cNvPr id="2" name="Slide Image Placeholder 1"/>
+          <p:cNvSpPr/>
+          <p:nvPr>
+            <p:ph type="sldImg" idx="2"/>
+          </p:nvPr>
+        </p:nvSpPr>
+        <p:spPr/>
+      </p:sp>
+      <p:sp>
+        <p:nvSpPr>
+          <p:cNvPr id="3" name="Text Placeholder 2"/>
+          <p:cNvSpPr/>
+          <p:nvPr>
+            <p:ph type="body" idx="3"/>
+          </p:nvPr>
+        </p:nvSpPr>
+        <p:spPr/>
+        <p:txBody>
+          <a:bodyPr/>
+          <a:p>
+            <a:endParaRPr lang="en-US"/>
+          </a:p>
+        </p:txBody>
+      </p:sp>
+      <p:sp>
+        <p:nvSpPr>
+          <p:cNvPr id="4" name="Slide Number Placeholder 3"/>
+          <p:cNvSpPr>
+            <a:spLocks noGrp="1"/>
+          </p:cNvSpPr>
+          <p:nvPr>
+            <p:ph type="sldNum" sz="quarter" idx="5"/>
+          </p:nvPr>
+        </p:nvSpPr>
+        <p:spPr/>
+        <p:txBody>
+          <a:bodyPr/>
+          <a:p>
+            <a:fld id="{21B2AA4F-B828-4D7C-AFD3-893933DAFCB4}" type="slidenum">
+              <a:rPr lang="en-US" smtClean="0"/>
+            </a:fld>
+            <a:endParaRPr lang="en-US"/>
+          </a:p>
+        </p:txBody>
+      </p:sp>
+    </p:spTree>
+  </p:cSld>
+  <p:clrMapOvr>
+    <a:masterClrMapping/>
+  </p:clrMapOvr>
+</p:notes>
+</file>
+
+<file path=ppt/notesSlides/notesSlide21.xml><?xml version="1.0" encoding="utf-8"?>
+<p:notes xmlns:a="http://schemas.openxmlformats.org/drawingml/2006/main" xmlns:r="http://schemas.openxmlformats.org/officeDocument/2006/relationships" xmlns:p="http://schemas.openxmlformats.org/presentationml/2006/main">
+  <p:cSld>
+    <p:spTree>
+      <p:nvGrpSpPr>
+        <p:cNvPr id="1" name=""/>
+        <p:cNvGrpSpPr/>
+        <p:nvPr/>
+      </p:nvGrpSpPr>
+      <p:grpSpPr/>
+      <p:sp>
+        <p:nvSpPr>
+          <p:cNvPr id="2" name="Slide Image Placeholder 1"/>
+          <p:cNvSpPr/>
+          <p:nvPr>
+            <p:ph type="sldImg" idx="2"/>
+          </p:nvPr>
+        </p:nvSpPr>
+        <p:spPr/>
+      </p:sp>
+      <p:sp>
+        <p:nvSpPr>
+          <p:cNvPr id="3" name="Text Placeholder 2"/>
+          <p:cNvSpPr/>
+          <p:nvPr>
+            <p:ph type="body" idx="3"/>
+          </p:nvPr>
+        </p:nvSpPr>
+        <p:spPr/>
+        <p:txBody>
+          <a:bodyPr/>
+          <a:p>
+            <a:endParaRPr lang="en-US"/>
+          </a:p>
+        </p:txBody>
+      </p:sp>
+      <p:sp>
+        <p:nvSpPr>
+          <p:cNvPr id="4" name="Slide Number Placeholder 3"/>
+          <p:cNvSpPr>
+            <a:spLocks noGrp="1"/>
+          </p:cNvSpPr>
+          <p:nvPr>
+            <p:ph type="sldNum" sz="quarter" idx="5"/>
+          </p:nvPr>
+        </p:nvSpPr>
+        <p:spPr/>
+        <p:txBody>
+          <a:bodyPr/>
+          <a:p>
+            <a:fld id="{21B2AA4F-B828-4D7C-AFD3-893933DAFCB4}" type="slidenum">
+              <a:rPr lang="en-US" smtClean="0"/>
+            </a:fld>
+            <a:endParaRPr lang="en-US"/>
+          </a:p>
+        </p:txBody>
+      </p:sp>
+    </p:spTree>
+  </p:cSld>
+  <p:clrMapOvr>
+    <a:masterClrMapping/>
+  </p:clrMapOvr>
+</p:notes>
+</file>
+
+<file path=ppt/notesSlides/notesSlide22.xml><?xml version="1.0" encoding="utf-8"?>
+<p:notes xmlns:a="http://schemas.openxmlformats.org/drawingml/2006/main" xmlns:r="http://schemas.openxmlformats.org/officeDocument/2006/relationships" xmlns:p="http://schemas.openxmlformats.org/presentationml/2006/main">
+  <p:cSld>
+    <p:spTree>
+      <p:nvGrpSpPr>
+        <p:cNvPr id="1" name=""/>
+        <p:cNvGrpSpPr/>
+        <p:nvPr/>
+      </p:nvGrpSpPr>
+      <p:grpSpPr/>
+      <p:sp>
+        <p:nvSpPr>
+          <p:cNvPr id="2" name="Slide Image Placeholder 1"/>
+          <p:cNvSpPr/>
+          <p:nvPr>
+            <p:ph type="sldImg" idx="2"/>
+          </p:nvPr>
+        </p:nvSpPr>
+        <p:spPr/>
+      </p:sp>
+      <p:sp>
+        <p:nvSpPr>
+          <p:cNvPr id="3" name="Text Placeholder 2"/>
+          <p:cNvSpPr/>
+          <p:nvPr>
+            <p:ph type="body" idx="3"/>
+          </p:nvPr>
+        </p:nvSpPr>
+        <p:spPr/>
+        <p:txBody>
+          <a:bodyPr/>
+          <a:p>
+            <a:endParaRPr lang="en-US"/>
+          </a:p>
+        </p:txBody>
+      </p:sp>
+      <p:sp>
+        <p:nvSpPr>
+          <p:cNvPr id="4" name="Slide Number Placeholder 3"/>
+          <p:cNvSpPr>
+            <a:spLocks noGrp="1"/>
+          </p:cNvSpPr>
+          <p:nvPr>
+            <p:ph type="sldNum" sz="quarter" idx="5"/>
+          </p:nvPr>
+        </p:nvSpPr>
+        <p:spPr/>
+        <p:txBody>
+          <a:bodyPr/>
+          <a:p>
+            <a:fld id="{21B2AA4F-B828-4D7C-AFD3-893933DAFCB4}" type="slidenum">
+              <a:rPr lang="en-US" smtClean="0"/>
+            </a:fld>
+            <a:endParaRPr lang="en-US"/>
+          </a:p>
+        </p:txBody>
+      </p:sp>
+    </p:spTree>
+  </p:cSld>
+  <p:clrMapOvr>
+    <a:masterClrMapping/>
+  </p:clrMapOvr>
+</p:notes>
+</file>
+
+<file path=ppt/notesSlides/notesSlide23.xml><?xml version="1.0" encoding="utf-8"?>
+<p:notes xmlns:a="http://schemas.openxmlformats.org/drawingml/2006/main" xmlns:r="http://schemas.openxmlformats.org/officeDocument/2006/relationships" xmlns:p="http://schemas.openxmlformats.org/presentationml/2006/main">
+  <p:cSld>
+    <p:spTree>
+      <p:nvGrpSpPr>
+        <p:cNvPr id="1" name=""/>
+        <p:cNvGrpSpPr/>
+        <p:nvPr/>
+      </p:nvGrpSpPr>
+      <p:grpSpPr/>
+      <p:sp>
+        <p:nvSpPr>
+          <p:cNvPr id="2" name="Slide Image Placeholder 1"/>
+          <p:cNvSpPr/>
+          <p:nvPr>
+            <p:ph type="sldImg" idx="2"/>
+          </p:nvPr>
+        </p:nvSpPr>
+        <p:spPr/>
+      </p:sp>
+      <p:sp>
+        <p:nvSpPr>
+          <p:cNvPr id="3" name="Text Placeholder 2"/>
+          <p:cNvSpPr/>
+          <p:nvPr>
+            <p:ph type="body" idx="3"/>
+          </p:nvPr>
+        </p:nvSpPr>
+        <p:spPr/>
+        <p:txBody>
+          <a:bodyPr/>
+          <a:p>
+            <a:endParaRPr lang="en-US"/>
+          </a:p>
+        </p:txBody>
+      </p:sp>
+      <p:sp>
+        <p:nvSpPr>
+          <p:cNvPr id="4" name="Slide Number Placeholder 3"/>
+          <p:cNvSpPr>
+            <a:spLocks noGrp="1"/>
+          </p:cNvSpPr>
+          <p:nvPr>
+            <p:ph type="sldNum" sz="quarter" idx="5"/>
+          </p:nvPr>
+        </p:nvSpPr>
+        <p:spPr/>
+        <p:txBody>
+          <a:bodyPr/>
+          <a:p>
+            <a:fld id="{21B2AA4F-B828-4D7C-AFD3-893933DAFCB4}" type="slidenum">
+              <a:rPr lang="en-US" smtClean="0"/>
+            </a:fld>
+            <a:endParaRPr lang="en-US"/>
+          </a:p>
+        </p:txBody>
+      </p:sp>
+    </p:spTree>
+  </p:cSld>
+  <p:clrMapOvr>
+    <a:masterClrMapping/>
+  </p:clrMapOvr>
+</p:notes>
+</file>
+
+<file path=ppt/notesSlides/notesSlide24.xml><?xml version="1.0" encoding="utf-8"?>
+<p:notes xmlns:a="http://schemas.openxmlformats.org/drawingml/2006/main" xmlns:r="http://schemas.openxmlformats.org/officeDocument/2006/relationships" xmlns:p="http://schemas.openxmlformats.org/presentationml/2006/main">
+  <p:cSld>
+    <p:spTree>
+      <p:nvGrpSpPr>
+        <p:cNvPr id="1" name=""/>
+        <p:cNvGrpSpPr/>
+        <p:nvPr/>
+      </p:nvGrpSpPr>
+      <p:grpSpPr/>
+      <p:sp>
+        <p:nvSpPr>
+          <p:cNvPr id="2" name="Slide Image Placeholder 1"/>
+          <p:cNvSpPr/>
+          <p:nvPr>
+            <p:ph type="sldImg" idx="2"/>
+          </p:nvPr>
+        </p:nvSpPr>
+        <p:spPr/>
+      </p:sp>
+      <p:sp>
+        <p:nvSpPr>
+          <p:cNvPr id="3" name="Text Placeholder 2"/>
+          <p:cNvSpPr/>
+          <p:nvPr>
+            <p:ph type="body" idx="3"/>
+          </p:nvPr>
+        </p:nvSpPr>
+        <p:spPr/>
+        <p:txBody>
+          <a:bodyPr/>
+          <a:p>
+            <a:endParaRPr lang="en-US"/>
+          </a:p>
+        </p:txBody>
+      </p:sp>
+      <p:sp>
+        <p:nvSpPr>
+          <p:cNvPr id="4" name="Slide Number Placeholder 3"/>
+          <p:cNvSpPr>
+            <a:spLocks noGrp="1"/>
+          </p:cNvSpPr>
+          <p:nvPr>
+            <p:ph type="sldNum" sz="quarter" idx="5"/>
+          </p:nvPr>
+        </p:nvSpPr>
+        <p:spPr/>
+        <p:txBody>
+          <a:bodyPr/>
+          <a:p>
+            <a:fld id="{21B2AA4F-B828-4D7C-AFD3-893933DAFCB4}" type="slidenum">
+              <a:rPr lang="en-US" smtClean="0"/>
+            </a:fld>
+            <a:endParaRPr lang="en-US"/>
+          </a:p>
+        </p:txBody>
+      </p:sp>
+    </p:spTree>
+  </p:cSld>
+  <p:clrMapOvr>
+    <a:masterClrMapping/>
+  </p:clrMapOvr>
+</p:notes>
+</file>
+
+<file path=ppt/notesSlides/notesSlide25.xml><?xml version="1.0" encoding="utf-8"?>
+<p:notes xmlns:a="http://schemas.openxmlformats.org/drawingml/2006/main" xmlns:r="http://schemas.openxmlformats.org/officeDocument/2006/relationships" xmlns:p="http://schemas.openxmlformats.org/presentationml/2006/main">
+  <p:cSld>
+    <p:spTree>
+      <p:nvGrpSpPr>
+        <p:cNvPr id="1" name=""/>
+        <p:cNvGrpSpPr/>
+        <p:nvPr/>
+      </p:nvGrpSpPr>
+      <p:grpSpPr/>
+      <p:sp>
+        <p:nvSpPr>
+          <p:cNvPr id="2" name="Slide Image Placeholder 1"/>
+          <p:cNvSpPr/>
+          <p:nvPr>
+            <p:ph type="sldImg" idx="2"/>
+          </p:nvPr>
+        </p:nvSpPr>
+        <p:spPr/>
+      </p:sp>
+      <p:sp>
+        <p:nvSpPr>
+          <p:cNvPr id="3" name="Text Placeholder 2"/>
+          <p:cNvSpPr/>
+          <p:nvPr>
+            <p:ph type="body" idx="3"/>
+          </p:nvPr>
+        </p:nvSpPr>
+        <p:spPr/>
+        <p:txBody>
+          <a:bodyPr/>
+          <a:p>
+            <a:endParaRPr lang="en-US"/>
+          </a:p>
+        </p:txBody>
+      </p:sp>
+      <p:sp>
+        <p:nvSpPr>
+          <p:cNvPr id="4" name="Slide Number Placeholder 3"/>
+          <p:cNvSpPr>
+            <a:spLocks noGrp="1"/>
+          </p:cNvSpPr>
+          <p:nvPr>
+            <p:ph type="sldNum" sz="quarter" idx="5"/>
+          </p:nvPr>
+        </p:nvSpPr>
+        <p:spPr/>
+        <p:txBody>
+          <a:bodyPr/>
+          <a:p>
+            <a:fld id="{21B2AA4F-B828-4D7C-AFD3-893933DAFCB4}" type="slidenum">
+              <a:rPr lang="en-US" smtClean="0"/>
+            </a:fld>
+            <a:endParaRPr lang="en-US"/>
+          </a:p>
+        </p:txBody>
+      </p:sp>
+    </p:spTree>
+  </p:cSld>
+  <p:clrMapOvr>
+    <a:masterClrMapping/>
+  </p:clrMapOvr>
+</p:notes>
+</file>
+
+<file path=ppt/notesSlides/notesSlide26.xml><?xml version="1.0" encoding="utf-8"?>
+<p:notes xmlns:a="http://schemas.openxmlformats.org/drawingml/2006/main" xmlns:r="http://schemas.openxmlformats.org/officeDocument/2006/relationships" xmlns:p="http://schemas.openxmlformats.org/presentationml/2006/main">
+  <p:cSld>
+    <p:spTree>
+      <p:nvGrpSpPr>
+        <p:cNvPr id="1" name=""/>
+        <p:cNvGrpSpPr/>
+        <p:nvPr/>
+      </p:nvGrpSpPr>
+      <p:grpSpPr/>
+      <p:sp>
+        <p:nvSpPr>
+          <p:cNvPr id="2" name="Slide Image Placeholder 1"/>
+          <p:cNvSpPr/>
+          <p:nvPr>
+            <p:ph type="sldImg" idx="2"/>
+          </p:nvPr>
+        </p:nvSpPr>
+        <p:spPr/>
+      </p:sp>
+      <p:sp>
+        <p:nvSpPr>
+          <p:cNvPr id="3" name="Text Placeholder 2"/>
+          <p:cNvSpPr/>
+          <p:nvPr>
+            <p:ph type="body" idx="3"/>
+          </p:nvPr>
+        </p:nvSpPr>
+        <p:spPr/>
+        <p:txBody>
+          <a:bodyPr/>
+          <a:p>
+            <a:endParaRPr lang="en-US"/>
+          </a:p>
+        </p:txBody>
+      </p:sp>
+      <p:sp>
+        <p:nvSpPr>
+          <p:cNvPr id="4" name="Slide Number Placeholder 3"/>
+          <p:cNvSpPr>
+            <a:spLocks noGrp="1"/>
+          </p:cNvSpPr>
+          <p:nvPr>
+            <p:ph type="sldNum" sz="quarter" idx="5"/>
+          </p:nvPr>
+        </p:nvSpPr>
+        <p:spPr/>
+        <p:txBody>
+          <a:bodyPr/>
+          <a:p>
+            <a:fld id="{21B2AA4F-B828-4D7C-AFD3-893933DAFCB4}" type="slidenum">
+              <a:rPr lang="en-US" smtClean="0"/>
+            </a:fld>
+            <a:endParaRPr lang="en-US"/>
+          </a:p>
+        </p:txBody>
+      </p:sp>
+    </p:spTree>
+  </p:cSld>
+  <p:clrMapOvr>
+    <a:masterClrMapping/>
+  </p:clrMapOvr>
+</p:notes>
+</file>
+
+<file path=ppt/notesSlides/notesSlide27.xml><?xml version="1.0" encoding="utf-8"?>
+<p:notes xmlns:a="http://schemas.openxmlformats.org/drawingml/2006/main" xmlns:r="http://schemas.openxmlformats.org/officeDocument/2006/relationships" xmlns:p="http://schemas.openxmlformats.org/presentationml/2006/main">
+  <p:cSld>
+    <p:spTree>
+      <p:nvGrpSpPr>
+        <p:cNvPr id="1" name=""/>
+        <p:cNvGrpSpPr/>
+        <p:nvPr/>
+      </p:nvGrpSpPr>
+      <p:grpSpPr/>
+      <p:sp>
+        <p:nvSpPr>
+          <p:cNvPr id="2" name="Slide Image Placeholder 1"/>
+          <p:cNvSpPr/>
+          <p:nvPr>
+            <p:ph type="sldImg" idx="2"/>
+          </p:nvPr>
+        </p:nvSpPr>
+        <p:spPr/>
+      </p:sp>
+      <p:sp>
+        <p:nvSpPr>
+          <p:cNvPr id="3" name="Text Placeholder 2"/>
+          <p:cNvSpPr/>
+          <p:nvPr>
+            <p:ph type="body" idx="3"/>
+          </p:nvPr>
+        </p:nvSpPr>
+        <p:spPr/>
+        <p:txBody>
+          <a:bodyPr/>
+          <a:p>
+            <a:endParaRPr lang="en-US"/>
+          </a:p>
+        </p:txBody>
+      </p:sp>
+      <p:sp>
+        <p:nvSpPr>
+          <p:cNvPr id="4" name="Slide Number Placeholder 3"/>
+          <p:cNvSpPr>
+            <a:spLocks noGrp="1"/>
+          </p:cNvSpPr>
+          <p:nvPr>
+            <p:ph type="sldNum" sz="quarter" idx="5"/>
+          </p:nvPr>
+        </p:nvSpPr>
+        <p:spPr/>
+        <p:txBody>
+          <a:bodyPr/>
+          <a:p>
+            <a:fld id="{21B2AA4F-B828-4D7C-AFD3-893933DAFCB4}" type="slidenum">
+              <a:rPr lang="en-US" smtClean="0"/>
+            </a:fld>
+            <a:endParaRPr lang="en-US"/>
+          </a:p>
+        </p:txBody>
+      </p:sp>
+    </p:spTree>
+  </p:cSld>
+  <p:clrMapOvr>
+    <a:masterClrMapping/>
+  </p:clrMapOvr>
+</p:notes>
+</file>
+
+<file path=ppt/notesSlides/notesSlide28.xml><?xml version="1.0" encoding="utf-8"?>
+<p:notes xmlns:a="http://schemas.openxmlformats.org/drawingml/2006/main" xmlns:r="http://schemas.openxmlformats.org/officeDocument/2006/relationships" xmlns:p="http://schemas.openxmlformats.org/presentationml/2006/main">
+  <p:cSld>
+    <p:spTree>
+      <p:nvGrpSpPr>
+        <p:cNvPr id="1" name=""/>
+        <p:cNvGrpSpPr/>
+        <p:nvPr/>
+      </p:nvGrpSpPr>
+      <p:grpSpPr/>
+      <p:sp>
+        <p:nvSpPr>
+          <p:cNvPr id="2" name="Slide Image Placeholder 1"/>
+          <p:cNvSpPr/>
+          <p:nvPr>
+            <p:ph type="sldImg" idx="2"/>
+          </p:nvPr>
+        </p:nvSpPr>
+        <p:spPr/>
+      </p:sp>
+      <p:sp>
+        <p:nvSpPr>
+          <p:cNvPr id="3" name="Text Placeholder 2"/>
+          <p:cNvSpPr/>
+          <p:nvPr>
+            <p:ph type="body" idx="3"/>
+          </p:nvPr>
+        </p:nvSpPr>
+        <p:spPr/>
+        <p:txBody>
+          <a:bodyPr/>
+          <a:p>
+            <a:endParaRPr lang="en-US"/>
+          </a:p>
+        </p:txBody>
+      </p:sp>
+      <p:sp>
+        <p:nvSpPr>
+          <p:cNvPr id="4" name="Slide Number Placeholder 3"/>
+          <p:cNvSpPr>
+            <a:spLocks noGrp="1"/>
+          </p:cNvSpPr>
+          <p:nvPr>
+            <p:ph type="sldNum" sz="quarter" idx="5"/>
+          </p:nvPr>
+        </p:nvSpPr>
+        <p:spPr/>
+        <p:txBody>
+          <a:bodyPr/>
+          <a:p>
+            <a:fld id="{21B2AA4F-B828-4D7C-AFD3-893933DAFCB4}" type="slidenum">
+              <a:rPr lang="en-US" smtClean="0"/>
+            </a:fld>
+            <a:endParaRPr lang="en-US"/>
+          </a:p>
+        </p:txBody>
+      </p:sp>
+    </p:spTree>
+  </p:cSld>
+  <p:clrMapOvr>
+    <a:masterClrMapping/>
+  </p:clrMapOvr>
+</p:notes>
+</file>
+
+<file path=ppt/notesSlides/notesSlide3.xml><?xml version="1.0" encoding="utf-8"?>
+<p:notes xmlns:a="http://schemas.openxmlformats.org/drawingml/2006/main" xmlns:r="http://schemas.openxmlformats.org/officeDocument/2006/relationships" xmlns:p="http://schemas.openxmlformats.org/presentationml/2006/main">
+  <p:cSld>
+    <p:spTree>
+      <p:nvGrpSpPr>
+        <p:cNvPr id="1" name=""/>
+        <p:cNvGrpSpPr/>
+        <p:nvPr/>
+      </p:nvGrpSpPr>
+      <p:grpSpPr/>
+      <p:sp>
+        <p:nvSpPr>
+          <p:cNvPr id="2" name="Slide Image Placeholder 1"/>
+          <p:cNvSpPr/>
+          <p:nvPr>
+            <p:ph type="sldImg" idx="2"/>
+          </p:nvPr>
+        </p:nvSpPr>
+        <p:spPr/>
+      </p:sp>
+      <p:sp>
+        <p:nvSpPr>
+          <p:cNvPr id="3" name="Text Placeholder 2"/>
+          <p:cNvSpPr/>
+          <p:nvPr>
+            <p:ph type="body" idx="3"/>
+          </p:nvPr>
+        </p:nvSpPr>
+        <p:spPr/>
+        <p:txBody>
+          <a:bodyPr/>
+          <a:p>
+            <a:endParaRPr lang="en-US"/>
+          </a:p>
+        </p:txBody>
+      </p:sp>
+      <p:sp>
+        <p:nvSpPr>
+          <p:cNvPr id="4" name="Slide Number Placeholder 3"/>
+          <p:cNvSpPr>
+            <a:spLocks noGrp="1"/>
+          </p:cNvSpPr>
+          <p:nvPr>
+            <p:ph type="sldNum" sz="quarter" idx="5"/>
+          </p:nvPr>
+        </p:nvSpPr>
+        <p:spPr/>
+        <p:txBody>
+          <a:bodyPr/>
+          <a:p>
+            <a:fld id="{21B2AA4F-B828-4D7C-AFD3-893933DAFCB4}" type="slidenum">
+              <a:rPr lang="en-US" smtClean="0"/>
+            </a:fld>
+            <a:endParaRPr lang="en-US"/>
+          </a:p>
+        </p:txBody>
+      </p:sp>
+    </p:spTree>
+  </p:cSld>
+  <p:clrMapOvr>
+    <a:masterClrMapping/>
+  </p:clrMapOvr>
+</p:notes>
+</file>
+
+<file path=ppt/notesSlides/notesSlide4.xml><?xml version="1.0" encoding="utf-8"?>
+<p:notes xmlns:a="http://schemas.openxmlformats.org/drawingml/2006/main" xmlns:r="http://schemas.openxmlformats.org/officeDocument/2006/relationships" xmlns:p="http://schemas.openxmlformats.org/presentationml/2006/main">
+  <p:cSld>
+    <p:spTree>
+      <p:nvGrpSpPr>
+        <p:cNvPr id="1" name=""/>
+        <p:cNvGrpSpPr/>
+        <p:nvPr/>
+      </p:nvGrpSpPr>
+      <p:grpSpPr/>
+      <p:sp>
+        <p:nvSpPr>
+          <p:cNvPr id="2" name="Slide Image Placeholder 1"/>
+          <p:cNvSpPr/>
+          <p:nvPr>
+            <p:ph type="sldImg" idx="2"/>
+          </p:nvPr>
+        </p:nvSpPr>
+        <p:spPr/>
+      </p:sp>
+      <p:sp>
+        <p:nvSpPr>
+          <p:cNvPr id="3" name="Text Placeholder 2"/>
+          <p:cNvSpPr/>
+          <p:nvPr>
+            <p:ph type="body" idx="3"/>
+          </p:nvPr>
+        </p:nvSpPr>
+        <p:spPr/>
+        <p:txBody>
+          <a:bodyPr/>
+          <a:p>
+            <a:endParaRPr lang="en-US"/>
+          </a:p>
+        </p:txBody>
+      </p:sp>
+      <p:sp>
+        <p:nvSpPr>
+          <p:cNvPr id="4" name="Slide Number Placeholder 3"/>
+          <p:cNvSpPr>
+            <a:spLocks noGrp="1"/>
+          </p:cNvSpPr>
+          <p:nvPr>
+            <p:ph type="sldNum" sz="quarter" idx="5"/>
+          </p:nvPr>
+        </p:nvSpPr>
+        <p:spPr/>
+        <p:txBody>
+          <a:bodyPr/>
+          <a:p>
+            <a:fld id="{21B2AA4F-B828-4D7C-AFD3-893933DAFCB4}" type="slidenum">
+              <a:rPr lang="en-US" smtClean="0"/>
+            </a:fld>
+            <a:endParaRPr lang="en-US"/>
+          </a:p>
+        </p:txBody>
+      </p:sp>
+    </p:spTree>
+  </p:cSld>
+  <p:clrMapOvr>
+    <a:masterClrMapping/>
+  </p:clrMapOvr>
+</p:notes>
+</file>
+
+<file path=ppt/notesSlides/notesSlide5.xml><?xml version="1.0" encoding="utf-8"?>
+<p:notes xmlns:a="http://schemas.openxmlformats.org/drawingml/2006/main" xmlns:r="http://schemas.openxmlformats.org/officeDocument/2006/relationships" xmlns:p="http://schemas.openxmlformats.org/presentationml/2006/main">
+  <p:cSld>
+    <p:spTree>
+      <p:nvGrpSpPr>
+        <p:cNvPr id="1" name=""/>
+        <p:cNvGrpSpPr/>
+        <p:nvPr/>
+      </p:nvGrpSpPr>
+      <p:grpSpPr/>
+      <p:sp>
+        <p:nvSpPr>
+          <p:cNvPr id="2" name="Slide Image Placeholder 1"/>
+          <p:cNvSpPr/>
+          <p:nvPr>
+            <p:ph type="sldImg" idx="2"/>
+          </p:nvPr>
+        </p:nvSpPr>
+        <p:spPr/>
+      </p:sp>
+      <p:sp>
+        <p:nvSpPr>
+          <p:cNvPr id="3" name="Text Placeholder 2"/>
+          <p:cNvSpPr/>
+          <p:nvPr>
+            <p:ph type="body" idx="3"/>
+          </p:nvPr>
+        </p:nvSpPr>
+        <p:spPr/>
+        <p:txBody>
+          <a:bodyPr/>
+          <a:p>
+            <a:endParaRPr lang="en-US"/>
+          </a:p>
+        </p:txBody>
+      </p:sp>
+      <p:sp>
+        <p:nvSpPr>
+          <p:cNvPr id="4" name="Slide Number Placeholder 3"/>
+          <p:cNvSpPr>
+            <a:spLocks noGrp="1"/>
+          </p:cNvSpPr>
+          <p:nvPr>
+            <p:ph type="sldNum" sz="quarter" idx="5"/>
+          </p:nvPr>
+        </p:nvSpPr>
+        <p:spPr/>
+        <p:txBody>
+          <a:bodyPr/>
+          <a:p>
+            <a:fld id="{21B2AA4F-B828-4D7C-AFD3-893933DAFCB4}" type="slidenum">
+              <a:rPr lang="en-US" smtClean="0"/>
+            </a:fld>
+            <a:endParaRPr lang="en-US"/>
+          </a:p>
+        </p:txBody>
+      </p:sp>
+    </p:spTree>
+  </p:cSld>
+  <p:clrMapOvr>
+    <a:masterClrMapping/>
+  </p:clrMapOvr>
+</p:notes>
+</file>
+
+<file path=ppt/notesSlides/notesSlide6.xml><?xml version="1.0" encoding="utf-8"?>
+<p:notes xmlns:a="http://schemas.openxmlformats.org/drawingml/2006/main" xmlns:r="http://schemas.openxmlformats.org/officeDocument/2006/relationships" xmlns:p="http://schemas.openxmlformats.org/presentationml/2006/main">
+  <p:cSld>
+    <p:spTree>
+      <p:nvGrpSpPr>
+        <p:cNvPr id="1" name=""/>
+        <p:cNvGrpSpPr/>
+        <p:nvPr/>
+      </p:nvGrpSpPr>
+      <p:grpSpPr/>
+      <p:sp>
+        <p:nvSpPr>
+          <p:cNvPr id="2" name="Slide Image Placeholder 1"/>
+          <p:cNvSpPr/>
+          <p:nvPr>
+            <p:ph type="sldImg" idx="2"/>
+          </p:nvPr>
+        </p:nvSpPr>
+        <p:spPr/>
+      </p:sp>
+      <p:sp>
+        <p:nvSpPr>
+          <p:cNvPr id="3" name="Text Placeholder 2"/>
+          <p:cNvSpPr/>
+          <p:nvPr>
+            <p:ph type="body" idx="3"/>
+          </p:nvPr>
+        </p:nvSpPr>
+        <p:spPr/>
+        <p:txBody>
+          <a:bodyPr/>
+          <a:p>
+            <a:endParaRPr lang="en-US"/>
+          </a:p>
+        </p:txBody>
+      </p:sp>
+      <p:sp>
+        <p:nvSpPr>
+          <p:cNvPr id="4" name="Slide Number Placeholder 3"/>
+          <p:cNvSpPr>
+            <a:spLocks noGrp="1"/>
+          </p:cNvSpPr>
+          <p:nvPr>
+            <p:ph type="sldNum" sz="quarter" idx="5"/>
+          </p:nvPr>
+        </p:nvSpPr>
+        <p:spPr/>
+        <p:txBody>
+          <a:bodyPr/>
+          <a:p>
+            <a:fld id="{21B2AA4F-B828-4D7C-AFD3-893933DAFCB4}" type="slidenum">
+              <a:rPr lang="en-US" smtClean="0"/>
+            </a:fld>
+            <a:endParaRPr lang="en-US"/>
+          </a:p>
+        </p:txBody>
+      </p:sp>
+    </p:spTree>
+  </p:cSld>
+  <p:clrMapOvr>
+    <a:masterClrMapping/>
+  </p:clrMapOvr>
+</p:notes>
+</file>
+
+<file path=ppt/notesSlides/notesSlide7.xml><?xml version="1.0" encoding="utf-8"?>
+<p:notes xmlns:a="http://schemas.openxmlformats.org/drawingml/2006/main" xmlns:r="http://schemas.openxmlformats.org/officeDocument/2006/relationships" xmlns:p="http://schemas.openxmlformats.org/presentationml/2006/main">
+  <p:cSld>
+    <p:spTree>
+      <p:nvGrpSpPr>
+        <p:cNvPr id="1" name=""/>
+        <p:cNvGrpSpPr/>
+        <p:nvPr/>
+      </p:nvGrpSpPr>
+      <p:grpSpPr/>
+      <p:sp>
+        <p:nvSpPr>
+          <p:cNvPr id="2" name="Slide Image Placeholder 1"/>
+          <p:cNvSpPr/>
+          <p:nvPr>
+            <p:ph type="sldImg" idx="2"/>
+          </p:nvPr>
+        </p:nvSpPr>
+        <p:spPr/>
+      </p:sp>
+      <p:sp>
+        <p:nvSpPr>
+          <p:cNvPr id="3" name="Text Placeholder 2"/>
+          <p:cNvSpPr/>
+          <p:nvPr>
+            <p:ph type="body" idx="3"/>
+          </p:nvPr>
+        </p:nvSpPr>
+        <p:spPr/>
+        <p:txBody>
+          <a:bodyPr/>
+          <a:p>
+            <a:endParaRPr lang="en-US"/>
+          </a:p>
+        </p:txBody>
+      </p:sp>
+      <p:sp>
+        <p:nvSpPr>
+          <p:cNvPr id="4" name="Slide Number Placeholder 3"/>
+          <p:cNvSpPr>
+            <a:spLocks noGrp="1"/>
+          </p:cNvSpPr>
+          <p:nvPr>
+            <p:ph type="sldNum" sz="quarter" idx="5"/>
+          </p:nvPr>
+        </p:nvSpPr>
+        <p:spPr/>
+        <p:txBody>
+          <a:bodyPr/>
+          <a:p>
+            <a:fld id="{21B2AA4F-B828-4D7C-AFD3-893933DAFCB4}" type="slidenum">
+              <a:rPr lang="en-US" smtClean="0"/>
+            </a:fld>
+            <a:endParaRPr lang="en-US"/>
+          </a:p>
+        </p:txBody>
+      </p:sp>
+    </p:spTree>
+  </p:cSld>
+  <p:clrMapOvr>
+    <a:masterClrMapping/>
+  </p:clrMapOvr>
+</p:notes>
+</file>
+
+<file path=ppt/notesSlides/notesSlide8.xml><?xml version="1.0" encoding="utf-8"?>
+<p:notes xmlns:a="http://schemas.openxmlformats.org/drawingml/2006/main" xmlns:r="http://schemas.openxmlformats.org/officeDocument/2006/relationships" xmlns:p="http://schemas.openxmlformats.org/presentationml/2006/main">
+  <p:cSld>
+    <p:spTree>
+      <p:nvGrpSpPr>
+        <p:cNvPr id="1" name=""/>
+        <p:cNvGrpSpPr/>
+        <p:nvPr/>
+      </p:nvGrpSpPr>
+      <p:grpSpPr/>
+      <p:sp>
+        <p:nvSpPr>
+          <p:cNvPr id="2" name="Slide Image Placeholder 1"/>
+          <p:cNvSpPr/>
+          <p:nvPr>
+            <p:ph type="sldImg" idx="2"/>
+          </p:nvPr>
+        </p:nvSpPr>
+        <p:spPr/>
+      </p:sp>
+      <p:sp>
+        <p:nvSpPr>
+          <p:cNvPr id="3" name="Text Placeholder 2"/>
+          <p:cNvSpPr/>
+          <p:nvPr>
+            <p:ph type="body" idx="3"/>
+          </p:nvPr>
+        </p:nvSpPr>
+        <p:spPr/>
+        <p:txBody>
+          <a:bodyPr/>
+          <a:p>
+            <a:endParaRPr lang="en-US"/>
+          </a:p>
+        </p:txBody>
+      </p:sp>
+      <p:sp>
+        <p:nvSpPr>
+          <p:cNvPr id="4" name="Slide Number Placeholder 3"/>
+          <p:cNvSpPr>
+            <a:spLocks noGrp="1"/>
+          </p:cNvSpPr>
+          <p:nvPr>
+            <p:ph type="sldNum" sz="quarter" idx="5"/>
+          </p:nvPr>
+        </p:nvSpPr>
+        <p:spPr/>
+        <p:txBody>
+          <a:bodyPr/>
+          <a:p>
+            <a:fld id="{21B2AA4F-B828-4D7C-AFD3-893933DAFCB4}" type="slidenum">
+              <a:rPr lang="en-US" smtClean="0"/>
+            </a:fld>
+            <a:endParaRPr lang="en-US"/>
+          </a:p>
+        </p:txBody>
+      </p:sp>
+    </p:spTree>
+  </p:cSld>
+  <p:clrMapOvr>
+    <a:masterClrMapping/>
+  </p:clrMapOvr>
+</p:notes>
+</file>
+
+<file path=ppt/notesSlides/notesSlide9.xml><?xml version="1.0" encoding="utf-8"?>
+<p:notes xmlns:a="http://schemas.openxmlformats.org/drawingml/2006/main" xmlns:r="http://schemas.openxmlformats.org/officeDocument/2006/relationships" xmlns:p="http://schemas.openxmlformats.org/presentationml/2006/main">
+  <p:cSld>
+    <p:spTree>
+      <p:nvGrpSpPr>
+        <p:cNvPr id="1" name=""/>
+        <p:cNvGrpSpPr/>
+        <p:nvPr/>
+      </p:nvGrpSpPr>
+      <p:grpSpPr/>
+      <p:sp>
+        <p:nvSpPr>
+          <p:cNvPr id="2" name="Slide Image Placeholder 1"/>
+          <p:cNvSpPr/>
+          <p:nvPr>
+            <p:ph type="sldImg" idx="2"/>
+          </p:nvPr>
+        </p:nvSpPr>
+        <p:spPr/>
+      </p:sp>
+      <p:sp>
+        <p:nvSpPr>
+          <p:cNvPr id="3" name="Text Placeholder 2"/>
+          <p:cNvSpPr/>
+          <p:nvPr>
+            <p:ph type="body" idx="3"/>
+          </p:nvPr>
+        </p:nvSpPr>
+        <p:spPr/>
+        <p:txBody>
+          <a:bodyPr/>
+          <a:p>
+            <a:endParaRPr lang="en-US"/>
+          </a:p>
+        </p:txBody>
+      </p:sp>
+      <p:sp>
+        <p:nvSpPr>
+          <p:cNvPr id="4" name="Slide Number Placeholder 3"/>
+          <p:cNvSpPr>
+            <a:spLocks noGrp="1"/>
+          </p:cNvSpPr>
+          <p:nvPr>
+            <p:ph type="sldNum" sz="quarter" idx="5"/>
+          </p:nvPr>
+        </p:nvSpPr>
+        <p:spPr/>
+        <p:txBody>
+          <a:bodyPr/>
+          <a:p>
+            <a:fld id="{21B2AA4F-B828-4D7C-AFD3-893933DAFCB4}" type="slidenum">
+              <a:rPr lang="en-US" smtClean="0"/>
+            </a:fld>
             <a:endParaRPr lang="en-US"/>
           </a:p>
         </p:txBody>
@@ -1203,6 +3144,7 @@
   <p:clrMapOvr>
     <a:masterClrMapping/>
   </p:clrMapOvr>
+  <p:hf hdr="0" ftr="0" dt="0"/>
 </p:sldLayout>
 </file>
 
@@ -1375,6 +3317,7 @@
   <p:clrMapOvr>
     <a:masterClrMapping/>
   </p:clrMapOvr>
+  <p:hf hdr="0" ftr="0" dt="0"/>
 </p:sldLayout>
 </file>
 
@@ -1552,6 +3495,7 @@
   <p:clrMapOvr>
     <a:masterClrMapping/>
   </p:clrMapOvr>
+  <p:hf hdr="0" ftr="0" dt="0"/>
 </p:sldLayout>
 </file>
 
@@ -1719,6 +3663,7 @@
   <p:clrMapOvr>
     <a:masterClrMapping/>
   </p:clrMapOvr>
+  <p:hf hdr="0" ftr="0" dt="0"/>
 </p:sldLayout>
 </file>
 
@@ -2096,6 +4041,7 @@
   <p:clrMapOvr>
     <a:overrideClrMapping bg1="dk1" tx1="lt1" bg2="dk2" tx2="lt2" accent1="accent1" accent2="accent2" accent3="accent3" accent4="accent4" accent5="accent5" accent6="accent6" hlink="hlink" folHlink="folHlink"/>
   </p:clrMapOvr>
+  <p:hf hdr="0" ftr="0" dt="0"/>
 </p:sldLayout>
 </file>
 
@@ -2366,6 +4312,7 @@
   <p:clrMapOvr>
     <a:overrideClrMapping bg1="dk1" tx1="lt1" bg2="dk2" tx2="lt2" accent1="accent1" accent2="accent2" accent3="accent3" accent4="accent4" accent5="accent5" accent6="accent6" hlink="hlink" folHlink="folHlink"/>
   </p:clrMapOvr>
+  <p:hf hdr="0" ftr="0" dt="0"/>
 </p:sldLayout>
 </file>
 
@@ -2784,6 +4731,7 @@
   <p:clrMapOvr>
     <a:overrideClrMapping bg1="lt1" tx1="dk1" bg2="lt2" tx2="dk2" accent1="accent1" accent2="accent2" accent3="accent3" accent4="accent4" accent5="accent5" accent6="accent6" hlink="hlink" folHlink="folHlink"/>
   </p:clrMapOvr>
+  <p:hf hdr="0" ftr="0" dt="0"/>
 </p:sldLayout>
 </file>
 
@@ -2900,6 +4848,7 @@
   <p:clrMapOvr>
     <a:overrideClrMapping bg1="dk1" tx1="lt1" bg2="dk2" tx2="lt2" accent1="accent1" accent2="accent2" accent3="accent3" accent4="accent4" accent5="accent5" accent6="accent6" hlink="hlink" folHlink="folHlink"/>
   </p:clrMapOvr>
+  <p:hf hdr="0" ftr="0" dt="0"/>
 </p:sldLayout>
 </file>
 
@@ -2988,6 +4937,7 @@
   <p:clrMapOvr>
     <a:masterClrMapping/>
   </p:clrMapOvr>
+  <p:hf hdr="0" ftr="0" dt="0"/>
 </p:sldLayout>
 </file>
 
@@ -3256,6 +5206,7 @@
   <p:clrMapOvr>
     <a:overrideClrMapping bg1="lt1" tx1="dk1" bg2="lt2" tx2="dk2" accent1="accent1" accent2="accent2" accent3="accent3" accent4="accent4" accent5="accent5" accent6="accent6" hlink="hlink" folHlink="folHlink"/>
   </p:clrMapOvr>
+  <p:hf hdr="0" ftr="0" dt="0"/>
 </p:sldLayout>
 </file>
 
@@ -3995,6 +5946,7 @@
   <p:clrMapOvr>
     <a:overrideClrMapping bg1="dk1" tx1="lt1" bg2="dk2" tx2="lt2" accent1="accent1" accent2="accent2" accent3="accent3" accent4="accent4" accent5="accent5" accent6="accent6" hlink="hlink" folHlink="folHlink"/>
   </p:clrMapOvr>
+  <p:hf hdr="0" ftr="0" dt="0"/>
 </p:sldLayout>
 </file>
 
@@ -4571,6 +6523,7 @@
     <p:sldLayoutId id="2147483658" r:id="rId10"/>
     <p:sldLayoutId id="2147483659" r:id="rId11"/>
   </p:sldLayoutIdLst>
+  <p:hf hdr="0" ftr="0" dt="0"/>
   <p:txStyles>
     <p:titleStyle>
       <a:lvl1pPr algn="l" rtl="0" eaLnBrk="1" latinLnBrk="0" hangingPunct="1">
@@ -5252,8 +7205,8 @@
         </p:nvSpPr>
         <p:spPr>
           <a:xfrm>
-            <a:off x="5638490" y="3352801"/>
-            <a:ext cx="3357586" cy="1922145"/>
+            <a:off x="5459095" y="3352800"/>
+            <a:ext cx="3537585" cy="1660525"/>
           </a:xfrm>
           <a:prstGeom prst="rect">
             <a:avLst/>
@@ -5291,7 +7244,21 @@
                 <a:latin typeface="Times New Roman" panose="02020603050405020304" pitchFamily="18" charset="0"/>
                 <a:cs typeface="Times New Roman" panose="02020603050405020304" pitchFamily="18" charset="0"/>
               </a:rPr>
-              <a:t>	Mr. K.KAJENDRAN, M.C.A., M.E.,</a:t>
+              <a:t>Mr. K.KAJENDRAN,</a:t>
+            </a:r>
+            <a:r>
+              <a:rPr lang="en-US" altLang="en-IN" sz="1700" b="1" smtClean="0">
+                <a:latin typeface="Times New Roman" panose="02020603050405020304" pitchFamily="18" charset="0"/>
+                <a:cs typeface="Times New Roman" panose="02020603050405020304" pitchFamily="18" charset="0"/>
+              </a:rPr>
+              <a:t> </a:t>
+            </a:r>
+            <a:r>
+              <a:rPr lang="en-IN" sz="1700" b="1" smtClean="0">
+                <a:latin typeface="Times New Roman" panose="02020603050405020304" pitchFamily="18" charset="0"/>
+                <a:cs typeface="Times New Roman" panose="02020603050405020304" pitchFamily="18" charset="0"/>
+              </a:rPr>
+              <a:t>M.C.A., M.E.,</a:t>
             </a:r>
             <a:endParaRPr lang="en-IN" sz="1700" b="1" smtClean="0">
               <a:latin typeface="Times New Roman" panose="02020603050405020304" pitchFamily="18" charset="0"/>
@@ -5327,7 +7294,34 @@
             </a:endParaRPr>
           </a:p>
           <a:p>
+            <a:pPr algn="r"/>
             <a:endParaRPr lang="en-US" sz="1700" dirty="0"/>
+          </a:p>
+        </p:txBody>
+      </p:sp>
+      <p:sp>
+        <p:nvSpPr>
+          <p:cNvPr id="5" name="Slide Number Placeholder 4"/>
+          <p:cNvSpPr>
+            <a:spLocks noGrp="1"/>
+          </p:cNvSpPr>
+          <p:nvPr>
+            <p:ph type="sldNum" sz="quarter" idx="12"/>
+          </p:nvPr>
+        </p:nvSpPr>
+        <p:spPr>
+          <a:xfrm>
+            <a:off x="8694420" y="6518275"/>
+            <a:ext cx="318770" cy="254635"/>
+          </a:xfrm>
+        </p:spPr>
+        <p:txBody>
+          <a:bodyPr/>
+          <a:p>
+            <a:fld id="{6AC1B37A-5BC2-4299-A427-7A619A58F75A}" type="slidenum">
+              <a:rPr lang="en-US" smtClean="0"/>
+            </a:fld>
+            <a:endParaRPr lang="en-US"/>
           </a:p>
         </p:txBody>
       </p:sp>
@@ -5422,6 +7416,27 @@
           </a:ln>
         </p:spPr>
       </p:pic>
+      <p:sp>
+        <p:nvSpPr>
+          <p:cNvPr id="2" name="Slide Number Placeholder 1"/>
+          <p:cNvSpPr>
+            <a:spLocks noGrp="1"/>
+          </p:cNvSpPr>
+          <p:nvPr>
+            <p:ph type="sldNum" sz="quarter" idx="12"/>
+          </p:nvPr>
+        </p:nvSpPr>
+        <p:spPr/>
+        <p:txBody>
+          <a:bodyPr/>
+          <a:p>
+            <a:fld id="{6AC1B37A-5BC2-4299-A427-7A619A58F75A}" type="slidenum">
+              <a:rPr lang="en-US" smtClean="0"/>
+            </a:fld>
+            <a:endParaRPr lang="en-US"/>
+          </a:p>
+        </p:txBody>
+      </p:sp>
     </p:spTree>
   </p:cSld>
   <p:clrMapOvr>
@@ -5513,6 +7528,27 @@
           </a:ln>
         </p:spPr>
       </p:pic>
+      <p:sp>
+        <p:nvSpPr>
+          <p:cNvPr id="2" name="Slide Number Placeholder 1"/>
+          <p:cNvSpPr>
+            <a:spLocks noGrp="1"/>
+          </p:cNvSpPr>
+          <p:nvPr>
+            <p:ph type="sldNum" sz="quarter" idx="12"/>
+          </p:nvPr>
+        </p:nvSpPr>
+        <p:spPr/>
+        <p:txBody>
+          <a:bodyPr/>
+          <a:p>
+            <a:fld id="{6AC1B37A-5BC2-4299-A427-7A619A58F75A}" type="slidenum">
+              <a:rPr lang="en-US" smtClean="0"/>
+            </a:fld>
+            <a:endParaRPr lang="en-US"/>
+          </a:p>
+        </p:txBody>
+      </p:sp>
     </p:spTree>
   </p:cSld>
   <p:clrMapOvr>
@@ -5631,6 +7667,27 @@
           </a:p>
         </p:txBody>
       </p:sp>
+      <p:sp>
+        <p:nvSpPr>
+          <p:cNvPr id="4" name="Slide Number Placeholder 3"/>
+          <p:cNvSpPr>
+            <a:spLocks noGrp="1"/>
+          </p:cNvSpPr>
+          <p:nvPr>
+            <p:ph type="sldNum" sz="quarter" idx="12"/>
+          </p:nvPr>
+        </p:nvSpPr>
+        <p:spPr/>
+        <p:txBody>
+          <a:bodyPr/>
+          <a:p>
+            <a:fld id="{6AC1B37A-5BC2-4299-A427-7A619A58F75A}" type="slidenum">
+              <a:rPr lang="en-US" smtClean="0"/>
+            </a:fld>
+            <a:endParaRPr lang="en-US"/>
+          </a:p>
+        </p:txBody>
+      </p:sp>
     </p:spTree>
   </p:cSld>
   <p:clrMapOvr>
@@ -5757,6 +7814,27 @@
             <a:endParaRPr lang="en-US" altLang="en-IN" dirty="0" smtClean="0">
               <a:sym typeface="+mn-ea"/>
             </a:endParaRPr>
+          </a:p>
+        </p:txBody>
+      </p:sp>
+      <p:sp>
+        <p:nvSpPr>
+          <p:cNvPr id="4" name="Slide Number Placeholder 3"/>
+          <p:cNvSpPr>
+            <a:spLocks noGrp="1"/>
+          </p:cNvSpPr>
+          <p:nvPr>
+            <p:ph type="sldNum" sz="quarter" idx="12"/>
+          </p:nvPr>
+        </p:nvSpPr>
+        <p:spPr/>
+        <p:txBody>
+          <a:bodyPr/>
+          <a:p>
+            <a:fld id="{6AC1B37A-5BC2-4299-A427-7A619A58F75A}" type="slidenum">
+              <a:rPr lang="en-US" smtClean="0"/>
+            </a:fld>
+            <a:endParaRPr lang="en-US"/>
           </a:p>
         </p:txBody>
       </p:sp>
@@ -5860,6 +7938,27 @@
           </a:p>
         </p:txBody>
       </p:sp>
+      <p:sp>
+        <p:nvSpPr>
+          <p:cNvPr id="4" name="Slide Number Placeholder 3"/>
+          <p:cNvSpPr>
+            <a:spLocks noGrp="1"/>
+          </p:cNvSpPr>
+          <p:nvPr>
+            <p:ph type="sldNum" sz="quarter" idx="12"/>
+          </p:nvPr>
+        </p:nvSpPr>
+        <p:spPr/>
+        <p:txBody>
+          <a:bodyPr/>
+          <a:p>
+            <a:fld id="{6AC1B37A-5BC2-4299-A427-7A619A58F75A}" type="slidenum">
+              <a:rPr lang="en-US" smtClean="0"/>
+            </a:fld>
+            <a:endParaRPr lang="en-US"/>
+          </a:p>
+        </p:txBody>
+      </p:sp>
     </p:spTree>
   </p:cSld>
   <p:clrMapOvr>
@@ -6005,6 +8104,27 @@
           </a:p>
         </p:txBody>
       </p:sp>
+      <p:sp>
+        <p:nvSpPr>
+          <p:cNvPr id="4" name="Slide Number Placeholder 3"/>
+          <p:cNvSpPr>
+            <a:spLocks noGrp="1"/>
+          </p:cNvSpPr>
+          <p:nvPr>
+            <p:ph type="sldNum" sz="quarter" idx="12"/>
+          </p:nvPr>
+        </p:nvSpPr>
+        <p:spPr/>
+        <p:txBody>
+          <a:bodyPr/>
+          <a:p>
+            <a:fld id="{6AC1B37A-5BC2-4299-A427-7A619A58F75A}" type="slidenum">
+              <a:rPr lang="en-US" smtClean="0"/>
+            </a:fld>
+            <a:endParaRPr lang="en-US"/>
+          </a:p>
+        </p:txBody>
+      </p:sp>
     </p:spTree>
   </p:cSld>
   <p:clrMapOvr>
@@ -6145,6 +8265,27 @@
           </a:p>
         </p:txBody>
       </p:sp>
+      <p:sp>
+        <p:nvSpPr>
+          <p:cNvPr id="4" name="Slide Number Placeholder 3"/>
+          <p:cNvSpPr>
+            <a:spLocks noGrp="1"/>
+          </p:cNvSpPr>
+          <p:nvPr>
+            <p:ph type="sldNum" sz="quarter" idx="12"/>
+          </p:nvPr>
+        </p:nvSpPr>
+        <p:spPr/>
+        <p:txBody>
+          <a:bodyPr/>
+          <a:p>
+            <a:fld id="{6AC1B37A-5BC2-4299-A427-7A619A58F75A}" type="slidenum">
+              <a:rPr lang="en-US" smtClean="0"/>
+            </a:fld>
+            <a:endParaRPr lang="en-US"/>
+          </a:p>
+        </p:txBody>
+      </p:sp>
     </p:spTree>
   </p:cSld>
   <p:clrMapOvr>
@@ -6294,6 +8435,27 @@
           </a:p>
         </p:txBody>
       </p:sp>
+      <p:sp>
+        <p:nvSpPr>
+          <p:cNvPr id="4" name="Slide Number Placeholder 3"/>
+          <p:cNvSpPr>
+            <a:spLocks noGrp="1"/>
+          </p:cNvSpPr>
+          <p:nvPr>
+            <p:ph type="sldNum" sz="quarter" idx="12"/>
+          </p:nvPr>
+        </p:nvSpPr>
+        <p:spPr/>
+        <p:txBody>
+          <a:bodyPr/>
+          <a:p>
+            <a:fld id="{6AC1B37A-5BC2-4299-A427-7A619A58F75A}" type="slidenum">
+              <a:rPr lang="en-US" smtClean="0"/>
+            </a:fld>
+            <a:endParaRPr lang="en-US"/>
+          </a:p>
+        </p:txBody>
+      </p:sp>
     </p:spTree>
   </p:cSld>
   <p:clrMapOvr>
@@ -6463,6 +8625,27 @@
           </a:p>
         </p:txBody>
       </p:sp>
+      <p:sp>
+        <p:nvSpPr>
+          <p:cNvPr id="4" name="Slide Number Placeholder 3"/>
+          <p:cNvSpPr>
+            <a:spLocks noGrp="1"/>
+          </p:cNvSpPr>
+          <p:nvPr>
+            <p:ph type="sldNum" sz="quarter" idx="12"/>
+          </p:nvPr>
+        </p:nvSpPr>
+        <p:spPr/>
+        <p:txBody>
+          <a:bodyPr/>
+          <a:p>
+            <a:fld id="{6AC1B37A-5BC2-4299-A427-7A619A58F75A}" type="slidenum">
+              <a:rPr lang="en-US" smtClean="0"/>
+            </a:fld>
+            <a:endParaRPr lang="en-US"/>
+          </a:p>
+        </p:txBody>
+      </p:sp>
     </p:spTree>
   </p:cSld>
   <p:clrMapOvr>
@@ -6648,6 +8831,27 @@
           </a:p>
         </p:txBody>
       </p:sp>
+      <p:sp>
+        <p:nvSpPr>
+          <p:cNvPr id="4" name="Slide Number Placeholder 3"/>
+          <p:cNvSpPr>
+            <a:spLocks noGrp="1"/>
+          </p:cNvSpPr>
+          <p:nvPr>
+            <p:ph type="sldNum" sz="quarter" idx="12"/>
+          </p:nvPr>
+        </p:nvSpPr>
+        <p:spPr/>
+        <p:txBody>
+          <a:bodyPr/>
+          <a:p>
+            <a:fld id="{6AC1B37A-5BC2-4299-A427-7A619A58F75A}" type="slidenum">
+              <a:rPr lang="en-US" smtClean="0"/>
+            </a:fld>
+            <a:endParaRPr lang="en-US"/>
+          </a:p>
+        </p:txBody>
+      </p:sp>
     </p:spTree>
   </p:cSld>
   <p:clrMapOvr>
@@ -6686,7 +8890,7 @@
         <p:spPr>
           <a:xfrm>
             <a:off x="457200" y="1066800"/>
-            <a:ext cx="8229600" cy="4848860"/>
+            <a:ext cx="8229600" cy="5113020"/>
           </a:xfrm>
         </p:spPr>
         <p:txBody>
@@ -6717,7 +8921,7 @@
                 <a:latin typeface="Times New Roman" panose="02020603050405020304" pitchFamily="18" charset="0"/>
                 <a:cs typeface="Times New Roman" panose="02020603050405020304" pitchFamily="18" charset="0"/>
               </a:rPr>
-              <a:t>Reviews act as a valuable source of information for decision making. Online e-commerce sites has provided their users to make their opinion about products and services. </a:t>
+              <a:t>Reviews act as a valuable source of information for decision-making. Online e-commerce sites have provided their users to make their opinion about products and services. </a:t>
             </a:r>
             <a:endParaRPr lang="en-US" sz="2000" kern="0" smtClean="0">
               <a:solidFill>
@@ -6750,7 +8954,7 @@
                 <a:latin typeface="Times New Roman" panose="02020603050405020304" pitchFamily="18" charset="0"/>
                 <a:cs typeface="Times New Roman" panose="02020603050405020304" pitchFamily="18" charset="0"/>
               </a:rPr>
-              <a:t>Huge amount of such opinions are publicly available in the form of reviews. Manufacturers, retailer as well as customers have great interest in customer reviews. </a:t>
+              <a:t>A huge amount of such opinions are publicly available in the form of reviews. Manufacturers, retailers as well as customers have great interest in customer reviews. </a:t>
             </a:r>
             <a:endParaRPr lang="en-US" sz="2000" kern="0" smtClean="0">
               <a:solidFill>
@@ -6783,7 +8987,7 @@
                 <a:latin typeface="Times New Roman" panose="02020603050405020304" pitchFamily="18" charset="0"/>
                 <a:cs typeface="Times New Roman" panose="02020603050405020304" pitchFamily="18" charset="0"/>
               </a:rPr>
-              <a:t>Due to large number of reviews available on internet for analysis, it is not cost worthy to read these manually. </a:t>
+              <a:t>Due to a large number of reviews available on the internet for analysis, it is not cost worthy to read these manually. </a:t>
             </a:r>
             <a:endParaRPr lang="en-US" sz="2000" kern="0" smtClean="0">
               <a:solidFill>
@@ -6816,7 +9020,7 @@
                 <a:latin typeface="Times New Roman" panose="02020603050405020304" pitchFamily="18" charset="0"/>
                 <a:cs typeface="Times New Roman" panose="02020603050405020304" pitchFamily="18" charset="0"/>
               </a:rPr>
-              <a:t>To optimize this time consuming task there is a need of an automated system which provides summarized result of user sentiments. Opinion Mining (OM) is the field of study that analyzes people's sentiments or opinion from reviews or opinionated text. </a:t>
+              <a:t>To optimize this time-consuming task there is a need for an automated system that provides the summarized result of user sentiments. </a:t>
             </a:r>
             <a:endParaRPr lang="en-US" sz="2000" kern="0" smtClean="0">
               <a:solidFill>
@@ -6849,19 +9053,45 @@
                 <a:latin typeface="Times New Roman" panose="02020603050405020304" pitchFamily="18" charset="0"/>
                 <a:cs typeface="Times New Roman" panose="02020603050405020304" pitchFamily="18" charset="0"/>
               </a:rPr>
-              <a:t> Opinion Mining can be viewed as a natural language processing task, the task is to develop a system that understands the people's language. Opinion Mining is a difficult task due to ambiguous nature of human languages( like English).</a:t>
-            </a:r>
-            <a:r>
-              <a:rPr lang="en-US" sz="2000" kern="0" dirty="0" smtClean="0">
+              <a:t>Opinion Mining (OM) in the field of study that analyzes people's sentiments or opinions from reviews or opinionated text. </a:t>
+            </a:r>
+            <a:endParaRPr lang="en-US" sz="2000" kern="0" smtClean="0">
+              <a:solidFill>
+                <a:srgbClr val="000000"/>
+              </a:solidFill>
+              <a:latin typeface="Times New Roman" panose="02020603050405020304" pitchFamily="18" charset="0"/>
+              <a:cs typeface="Times New Roman" panose="02020603050405020304" pitchFamily="18" charset="0"/>
+            </a:endParaRPr>
+          </a:p>
+          <a:p>
+            <a:pPr marL="342900" lvl="0" indent="-342900" algn="just">
+              <a:lnSpc>
+                <a:spcPct val="90000"/>
+              </a:lnSpc>
+              <a:spcBef>
+                <a:spcPts val="750"/>
+              </a:spcBef>
+              <a:buClr>
+                <a:srgbClr val="1FAECD"/>
+              </a:buClr>
+              <a:buSzTx/>
+              <a:buFont typeface="Wingdings" panose="05000000000000000000" charset="0"/>
+              <a:buChar char="Ø"/>
+            </a:pPr>
+            <a:r>
+              <a:rPr lang="en-US" sz="2000" kern="0" smtClean="0">
                 <a:solidFill>
                   <a:srgbClr val="000000"/>
                 </a:solidFill>
                 <a:latin typeface="Times New Roman" panose="02020603050405020304" pitchFamily="18" charset="0"/>
                 <a:cs typeface="Times New Roman" panose="02020603050405020304" pitchFamily="18" charset="0"/>
               </a:rPr>
-              <a:t>             </a:t>
-            </a:r>
-            <a:endParaRPr lang="en-US" sz="2000" dirty="0">
+              <a:t>Opinion Mining can be viewed as a natural language processing task, the task is to develop a system that understands the people's language. Opinion Mining is a difficult task due to the ambiguous nature of human languages( like English, etc).             </a:t>
+            </a:r>
+            <a:endParaRPr lang="en-US" sz="2000" kern="0" smtClean="0">
+              <a:solidFill>
+                <a:srgbClr val="000000"/>
+              </a:solidFill>
               <a:latin typeface="Times New Roman" panose="02020603050405020304" pitchFamily="18" charset="0"/>
               <a:cs typeface="Times New Roman" panose="02020603050405020304" pitchFamily="18" charset="0"/>
             </a:endParaRPr>
@@ -6899,6 +9129,27 @@
               <a:latin typeface="Times New Roman" panose="02020603050405020304" pitchFamily="18" charset="0"/>
               <a:cs typeface="Times New Roman" panose="02020603050405020304" pitchFamily="18" charset="0"/>
             </a:endParaRPr>
+          </a:p>
+        </p:txBody>
+      </p:sp>
+      <p:sp>
+        <p:nvSpPr>
+          <p:cNvPr id="4" name="Slide Number Placeholder 3"/>
+          <p:cNvSpPr>
+            <a:spLocks noGrp="1"/>
+          </p:cNvSpPr>
+          <p:nvPr>
+            <p:ph type="sldNum" sz="quarter" idx="12"/>
+          </p:nvPr>
+        </p:nvSpPr>
+        <p:spPr/>
+        <p:txBody>
+          <a:bodyPr/>
+          <a:p>
+            <a:fld id="{6AC1B37A-5BC2-4299-A427-7A619A58F75A}" type="slidenum">
+              <a:rPr lang="en-US" smtClean="0"/>
+            </a:fld>
+            <a:endParaRPr lang="en-US"/>
           </a:p>
         </p:txBody>
       </p:sp>
@@ -6942,9 +9193,30 @@
           </a:p>
         </p:txBody>
       </p:sp>
+      <p:sp>
+        <p:nvSpPr>
+          <p:cNvPr id="2" name="Slide Number Placeholder 1"/>
+          <p:cNvSpPr>
+            <a:spLocks noGrp="1"/>
+          </p:cNvSpPr>
+          <p:nvPr>
+            <p:ph type="sldNum" sz="quarter" idx="12"/>
+          </p:nvPr>
+        </p:nvSpPr>
+        <p:spPr/>
+        <p:txBody>
+          <a:bodyPr/>
+          <a:p>
+            <a:fld id="{6AC1B37A-5BC2-4299-A427-7A619A58F75A}" type="slidenum">
+              <a:rPr lang="en-US" smtClean="0"/>
+            </a:fld>
+            <a:endParaRPr lang="en-US"/>
+          </a:p>
+        </p:txBody>
+      </p:sp>
       <p:pic>
         <p:nvPicPr>
-          <p:cNvPr id="4" name="Content Placeholder 3"/>
+          <p:cNvPr id="8" name="Picture 1"/>
           <p:cNvPicPr>
             <a:picLocks noChangeAspect="1"/>
           </p:cNvPicPr>
@@ -6960,12 +9232,16 @@
         </p:blipFill>
         <p:spPr>
           <a:xfrm>
-            <a:off x="457200" y="1398270"/>
-            <a:ext cx="8229600" cy="4345940"/>
+            <a:off x="481330" y="1445895"/>
+            <a:ext cx="8205470" cy="4359910"/>
           </a:xfrm>
           <a:prstGeom prst="rect">
             <a:avLst/>
           </a:prstGeom>
+          <a:noFill/>
+          <a:ln>
+            <a:noFill/>
+          </a:ln>
         </p:spPr>
       </p:pic>
     </p:spTree>
@@ -7008,9 +9284,30 @@
           </a:p>
         </p:txBody>
       </p:sp>
+      <p:sp>
+        <p:nvSpPr>
+          <p:cNvPr id="2" name="Slide Number Placeholder 1"/>
+          <p:cNvSpPr>
+            <a:spLocks noGrp="1"/>
+          </p:cNvSpPr>
+          <p:nvPr>
+            <p:ph type="sldNum" sz="quarter" idx="12"/>
+          </p:nvPr>
+        </p:nvSpPr>
+        <p:spPr/>
+        <p:txBody>
+          <a:bodyPr/>
+          <a:p>
+            <a:fld id="{6AC1B37A-5BC2-4299-A427-7A619A58F75A}" type="slidenum">
+              <a:rPr lang="en-US" smtClean="0"/>
+            </a:fld>
+            <a:endParaRPr lang="en-US"/>
+          </a:p>
+        </p:txBody>
+      </p:sp>
       <p:pic>
         <p:nvPicPr>
-          <p:cNvPr id="4" name="Content Placeholder 3"/>
+          <p:cNvPr id="8" name="Picture 2"/>
           <p:cNvPicPr>
             <a:picLocks noChangeAspect="1"/>
           </p:cNvPicPr>
@@ -7026,12 +9323,16 @@
         </p:blipFill>
         <p:spPr>
           <a:xfrm>
-            <a:off x="457200" y="1567180"/>
-            <a:ext cx="8229600" cy="4272915"/>
+            <a:off x="457200" y="1546860"/>
+            <a:ext cx="8229600" cy="4413250"/>
           </a:xfrm>
           <a:prstGeom prst="rect">
             <a:avLst/>
           </a:prstGeom>
+          <a:noFill/>
+          <a:ln>
+            <a:noFill/>
+          </a:ln>
         </p:spPr>
       </p:pic>
     </p:spTree>
@@ -7068,15 +9369,36 @@
           <a:p>
             <a:r>
               <a:rPr lang="en-US"/>
-              <a:t>VISUALIZATION</a:t>
-            </a:r>
+              <a:t>OPINIONS VISUALIZATION</a:t>
+            </a:r>
+            <a:endParaRPr lang="en-US"/>
+          </a:p>
+        </p:txBody>
+      </p:sp>
+      <p:sp>
+        <p:nvSpPr>
+          <p:cNvPr id="2" name="Slide Number Placeholder 1"/>
+          <p:cNvSpPr>
+            <a:spLocks noGrp="1"/>
+          </p:cNvSpPr>
+          <p:nvPr>
+            <p:ph type="sldNum" sz="quarter" idx="12"/>
+          </p:nvPr>
+        </p:nvSpPr>
+        <p:spPr/>
+        <p:txBody>
+          <a:bodyPr/>
+          <a:p>
+            <a:fld id="{6AC1B37A-5BC2-4299-A427-7A619A58F75A}" type="slidenum">
+              <a:rPr lang="en-US" smtClean="0"/>
+            </a:fld>
             <a:endParaRPr lang="en-US"/>
           </a:p>
         </p:txBody>
       </p:sp>
       <p:pic>
         <p:nvPicPr>
-          <p:cNvPr id="6" name="Content Placeholder 5"/>
+          <p:cNvPr id="5" name="Content Placeholder 4"/>
           <p:cNvPicPr>
             <a:picLocks noChangeAspect="1"/>
           </p:cNvPicPr>
@@ -7092,8 +9414,8 @@
         </p:blipFill>
         <p:spPr>
           <a:xfrm>
-            <a:off x="457200" y="1579245"/>
-            <a:ext cx="8229600" cy="4237990"/>
+            <a:off x="457200" y="1641475"/>
+            <a:ext cx="8229600" cy="4242435"/>
           </a:xfrm>
           <a:prstGeom prst="rect">
             <a:avLst/>
@@ -7166,6 +9488,27 @@
           </a:prstGeom>
         </p:spPr>
       </p:pic>
+      <p:sp>
+        <p:nvSpPr>
+          <p:cNvPr id="2" name="Slide Number Placeholder 1"/>
+          <p:cNvSpPr>
+            <a:spLocks noGrp="1"/>
+          </p:cNvSpPr>
+          <p:nvPr>
+            <p:ph type="sldNum" sz="quarter" idx="12"/>
+          </p:nvPr>
+        </p:nvSpPr>
+        <p:spPr/>
+        <p:txBody>
+          <a:bodyPr/>
+          <a:p>
+            <a:fld id="{6AC1B37A-5BC2-4299-A427-7A619A58F75A}" type="slidenum">
+              <a:rPr lang="en-US" smtClean="0"/>
+            </a:fld>
+            <a:endParaRPr lang="en-US"/>
+          </a:p>
+        </p:txBody>
+      </p:sp>
     </p:spTree>
   </p:cSld>
   <p:clrMapOvr>
@@ -7183,160 +9526,78 @@
         <p:cNvGrpSpPr/>
         <p:nvPr/>
       </p:nvGrpSpPr>
-      <p:grpSpPr>
-        <a:xfrm>
-          <a:off x="0" y="0"/>
-          <a:ext cx="0" cy="0"/>
-          <a:chOff x="0" y="0"/>
-          <a:chExt cx="0" cy="0"/>
-        </a:xfrm>
-      </p:grpSpPr>
-      <p:sp>
-        <p:nvSpPr>
-          <p:cNvPr id="2" name="Content Placeholder 1"/>
-          <p:cNvSpPr>
-            <a:spLocks noGrp="1"/>
-          </p:cNvSpPr>
+      <p:grpSpPr/>
+      <p:sp>
+        <p:nvSpPr>
+          <p:cNvPr id="3" name="Title 2"/>
+          <p:cNvSpPr>
+            <a:spLocks noGrp="1"/>
+          </p:cNvSpPr>
+          <p:nvPr>
+            <p:ph type="title"/>
+          </p:nvPr>
+        </p:nvSpPr>
+        <p:spPr/>
+        <p:txBody>
+          <a:bodyPr>
+            <a:normAutofit fontScale="90000"/>
+          </a:bodyPr>
+          <a:p>
+            <a:r>
+              <a:rPr lang="en-US"/>
+              <a:t>RETWEET AND FAVOURITE COUNTS</a:t>
+            </a:r>
+            <a:endParaRPr lang="en-US"/>
+          </a:p>
+        </p:txBody>
+      </p:sp>
+      <p:sp>
+        <p:nvSpPr>
+          <p:cNvPr id="2" name="Slide Number Placeholder 1"/>
+          <p:cNvSpPr>
+            <a:spLocks noGrp="1"/>
+          </p:cNvSpPr>
+          <p:nvPr>
+            <p:ph type="sldNum" sz="quarter" idx="12"/>
+          </p:nvPr>
+        </p:nvSpPr>
+        <p:spPr/>
+        <p:txBody>
+          <a:bodyPr/>
+          <a:p>
+            <a:fld id="{6AC1B37A-5BC2-4299-A427-7A619A58F75A}" type="slidenum">
+              <a:rPr lang="en-US" smtClean="0"/>
+            </a:fld>
+            <a:endParaRPr lang="en-US"/>
+          </a:p>
+        </p:txBody>
+      </p:sp>
+      <p:pic>
+        <p:nvPicPr>
+          <p:cNvPr id="6" name="Content Placeholder 5"/>
+          <p:cNvPicPr>
+            <a:picLocks noChangeAspect="1"/>
+          </p:cNvPicPr>
           <p:nvPr>
             <p:ph idx="1"/>
           </p:nvPr>
-        </p:nvSpPr>
-        <p:spPr/>
-        <p:txBody>
-          <a:bodyPr>
-            <a:noAutofit/>
-          </a:bodyPr>
-          <a:lstStyle/>
-          <a:p>
-            <a:pPr algn="just">
-              <a:buNone/>
-            </a:pPr>
-            <a:r>
-              <a:rPr lang="en-US" sz="1500" smtClean="0">
-                <a:latin typeface="Times New Roman" panose="02020603050405020304" pitchFamily="18" charset="0"/>
-                <a:cs typeface="Times New Roman" panose="02020603050405020304" pitchFamily="18" charset="0"/>
-              </a:rPr>
-              <a:t>[1] G.Vinodhini and RM.Chandrasekaran, “Sentiment Analysis and Opinion Mining: A Survey”, Volume 2, Issue 6, June 2012 ISSN: 2277 128X International Journal of Advanced Research in Computer Science and Software Engineering </a:t>
-            </a:r>
-            <a:endParaRPr lang="en-US" sz="1500" smtClean="0">
-              <a:latin typeface="Times New Roman" panose="02020603050405020304" pitchFamily="18" charset="0"/>
-              <a:cs typeface="Times New Roman" panose="02020603050405020304" pitchFamily="18" charset="0"/>
-            </a:endParaRPr>
-          </a:p>
-          <a:p>
-            <a:pPr algn="just">
-              <a:buNone/>
-            </a:pPr>
-            <a:r>
-              <a:rPr lang="en-US" sz="1500" smtClean="0">
-                <a:latin typeface="Times New Roman" panose="02020603050405020304" pitchFamily="18" charset="0"/>
-                <a:cs typeface="Times New Roman" panose="02020603050405020304" pitchFamily="18" charset="0"/>
-              </a:rPr>
-              <a:t>[2] Zhongwu Zhai, Bing Liu, Hua Xu and Hua Xu, “Clustering Product Features for Opinion Mining”, WSDM’11, February 9–12, 2011, Hong Kong, China. Copyright 2011 ACM 978-1-4503- 0493- 1/11/02...$10.00 </a:t>
-            </a:r>
-            <a:endParaRPr lang="en-US" sz="1500" smtClean="0">
-              <a:latin typeface="Times New Roman" panose="02020603050405020304" pitchFamily="18" charset="0"/>
-              <a:cs typeface="Times New Roman" panose="02020603050405020304" pitchFamily="18" charset="0"/>
-            </a:endParaRPr>
-          </a:p>
-          <a:p>
-            <a:pPr algn="just">
-              <a:buNone/>
-            </a:pPr>
-            <a:r>
-              <a:rPr lang="en-US" sz="1500" smtClean="0">
-                <a:latin typeface="Times New Roman" panose="02020603050405020304" pitchFamily="18" charset="0"/>
-                <a:cs typeface="Times New Roman" panose="02020603050405020304" pitchFamily="18" charset="0"/>
-              </a:rPr>
-              <a:t>[3] Singh and Vivek Kumar, ―A clustering and opinion mining approach to socio-political analysis of the blogosphere”, Computational Intelligence and Computing Research (ICCIC), 2010 IEEE International Conference. </a:t>
-            </a:r>
-            <a:endParaRPr lang="en-US" sz="1500" smtClean="0">
-              <a:latin typeface="Times New Roman" panose="02020603050405020304" pitchFamily="18" charset="0"/>
-              <a:cs typeface="Times New Roman" panose="02020603050405020304" pitchFamily="18" charset="0"/>
-            </a:endParaRPr>
-          </a:p>
-          <a:p>
-            <a:pPr algn="just">
-              <a:buNone/>
-            </a:pPr>
-            <a:r>
-              <a:rPr lang="en-US" sz="1500" smtClean="0">
-                <a:latin typeface="Times New Roman" panose="02020603050405020304" pitchFamily="18" charset="0"/>
-                <a:cs typeface="Times New Roman" panose="02020603050405020304" pitchFamily="18" charset="0"/>
-              </a:rPr>
-              <a:t>[4] Alexander Pak and Patrick Paroubek, “Twitter as a Corpus for Sentiment Analysis and Opinion Mining” </a:t>
-            </a:r>
-            <a:endParaRPr lang="en-US" sz="1500" smtClean="0">
-              <a:latin typeface="Times New Roman" panose="02020603050405020304" pitchFamily="18" charset="0"/>
-              <a:cs typeface="Times New Roman" panose="02020603050405020304" pitchFamily="18" charset="0"/>
-            </a:endParaRPr>
-          </a:p>
-          <a:p>
-            <a:pPr algn="just">
-              <a:buNone/>
-            </a:pPr>
-            <a:r>
-              <a:rPr lang="en-US" sz="1500" smtClean="0">
-                <a:latin typeface="Times New Roman" panose="02020603050405020304" pitchFamily="18" charset="0"/>
-                <a:cs typeface="Times New Roman" panose="02020603050405020304" pitchFamily="18" charset="0"/>
-              </a:rPr>
-              <a:t>[5] Bing Liu. “Sentiment Analysis and Opinion Mining, Morgan &amp; Claypool Publishers, May 2012.” </a:t>
-            </a:r>
-            <a:endParaRPr lang="en-US" sz="1500" smtClean="0">
-              <a:latin typeface="Times New Roman" panose="02020603050405020304" pitchFamily="18" charset="0"/>
-              <a:cs typeface="Times New Roman" panose="02020603050405020304" pitchFamily="18" charset="0"/>
-            </a:endParaRPr>
-          </a:p>
-          <a:p>
-            <a:pPr algn="just">
-              <a:buNone/>
-            </a:pPr>
-            <a:r>
-              <a:rPr lang="en-US" sz="1500" smtClean="0">
-                <a:latin typeface="Times New Roman" panose="02020603050405020304" pitchFamily="18" charset="0"/>
-                <a:cs typeface="Times New Roman" panose="02020603050405020304" pitchFamily="18" charset="0"/>
-              </a:rPr>
-              <a:t>[6] V. S. Jagtap and Karishma Pawar, “Analysis of different approaches to Sentence-Level Sentiment Classification”, International Journal of Scientific Engineering and Technology (ISSN: 2277-1581) Volume 2 Issue 3, PP: 164-170 1 April 2013 Onam Bharti et al, International Journal of Computer Science and Mobile Computing, Vol.5 Issue.6, June- 2016, pg. 601-609 © 2016, IJCSMC All Rights Reserved 609 </a:t>
-            </a:r>
-            <a:endParaRPr lang="en-US" sz="1500" smtClean="0">
-              <a:latin typeface="Times New Roman" panose="02020603050405020304" pitchFamily="18" charset="0"/>
-              <a:cs typeface="Times New Roman" panose="02020603050405020304" pitchFamily="18" charset="0"/>
-            </a:endParaRPr>
-          </a:p>
-          <a:p>
-            <a:pPr algn="just">
-              <a:buNone/>
-            </a:pPr>
-            <a:endParaRPr lang="en-US" sz="1500" smtClean="0">
-              <a:latin typeface="Times New Roman" panose="02020603050405020304" pitchFamily="18" charset="0"/>
-              <a:cs typeface="Times New Roman" panose="02020603050405020304" pitchFamily="18" charset="0"/>
-            </a:endParaRPr>
-          </a:p>
-        </p:txBody>
-      </p:sp>
-      <p:sp>
-        <p:nvSpPr>
-          <p:cNvPr id="3" name="Title 2"/>
-          <p:cNvSpPr>
-            <a:spLocks noGrp="1"/>
-          </p:cNvSpPr>
-          <p:nvPr>
-            <p:ph type="title"/>
-          </p:nvPr>
-        </p:nvSpPr>
-        <p:spPr/>
-        <p:txBody>
-          <a:bodyPr/>
-          <a:lstStyle/>
-          <a:p>
-            <a:r>
-              <a:rPr lang="en-IN" dirty="0" smtClean="0"/>
-              <a:t>REFERENCES</a:t>
-            </a:r>
-            <a:endParaRPr lang="en-US" dirty="0"/>
-          </a:p>
-        </p:txBody>
-      </p:sp>
+        </p:nvPicPr>
+        <p:blipFill>
+          <a:blip r:embed="rId1"/>
+          <a:stretch>
+            <a:fillRect/>
+          </a:stretch>
+        </p:blipFill>
+        <p:spPr>
+          <a:xfrm>
+            <a:off x="457200" y="1646555"/>
+            <a:ext cx="8229600" cy="4185285"/>
+          </a:xfrm>
+          <a:prstGeom prst="rect">
+            <a:avLst/>
+          </a:prstGeom>
+        </p:spPr>
+      </p:pic>
     </p:spTree>
   </p:cSld>
   <p:clrMapOvr>
@@ -7354,165 +9615,78 @@
         <p:cNvGrpSpPr/>
         <p:nvPr/>
       </p:nvGrpSpPr>
-      <p:grpSpPr>
-        <a:xfrm>
-          <a:off x="0" y="0"/>
-          <a:ext cx="0" cy="0"/>
-          <a:chOff x="0" y="0"/>
-          <a:chExt cx="0" cy="0"/>
-        </a:xfrm>
-      </p:grpSpPr>
-      <p:sp>
-        <p:nvSpPr>
-          <p:cNvPr id="3" name="TextBox 2"/>
-          <p:cNvSpPr txBox="1"/>
-          <p:nvPr/>
-        </p:nvSpPr>
+      <p:grpSpPr/>
+      <p:sp>
+        <p:nvSpPr>
+          <p:cNvPr id="3" name="Title 2"/>
+          <p:cNvSpPr>
+            <a:spLocks noGrp="1"/>
+          </p:cNvSpPr>
+          <p:nvPr>
+            <p:ph type="title"/>
+          </p:nvPr>
+        </p:nvSpPr>
+        <p:spPr/>
+        <p:txBody>
+          <a:bodyPr>
+            <a:normAutofit/>
+          </a:bodyPr>
+          <a:p>
+            <a:r>
+              <a:rPr lang="en-US"/>
+              <a:t>TWEETS COUNT BY DATE</a:t>
+            </a:r>
+            <a:endParaRPr lang="en-US"/>
+          </a:p>
+        </p:txBody>
+      </p:sp>
+      <p:sp>
+        <p:nvSpPr>
+          <p:cNvPr id="2" name="Slide Number Placeholder 1"/>
+          <p:cNvSpPr>
+            <a:spLocks noGrp="1"/>
+          </p:cNvSpPr>
+          <p:nvPr>
+            <p:ph type="sldNum" sz="quarter" idx="12"/>
+          </p:nvPr>
+        </p:nvSpPr>
+        <p:spPr/>
+        <p:txBody>
+          <a:bodyPr/>
+          <a:p>
+            <a:fld id="{6AC1B37A-5BC2-4299-A427-7A619A58F75A}" type="slidenum">
+              <a:rPr lang="en-US" smtClean="0"/>
+            </a:fld>
+            <a:endParaRPr lang="en-US"/>
+          </a:p>
+        </p:txBody>
+      </p:sp>
+      <p:pic>
+        <p:nvPicPr>
+          <p:cNvPr id="5" name="Content Placeholder 4"/>
+          <p:cNvPicPr>
+            <a:picLocks noChangeAspect="1"/>
+          </p:cNvPicPr>
+          <p:nvPr>
+            <p:ph idx="1"/>
+          </p:nvPr>
+        </p:nvPicPr>
+        <p:blipFill>
+          <a:blip r:embed="rId1"/>
+          <a:stretch>
+            <a:fillRect/>
+          </a:stretch>
+        </p:blipFill>
         <p:spPr>
           <a:xfrm>
-            <a:off x="500034" y="571480"/>
-            <a:ext cx="8143932" cy="369332"/>
-          </a:xfrm>
-          <a:prstGeom prst="rect">
-            <a:avLst/>
-          </a:prstGeom>
-          <a:noFill/>
-        </p:spPr>
-        <p:txBody>
-          <a:bodyPr wrap="square" rtlCol="0">
-            <a:spAutoFit/>
-          </a:bodyPr>
-          <a:lstStyle/>
-          <a:p>
-            <a:endParaRPr lang="en-US" dirty="0"/>
-          </a:p>
-        </p:txBody>
-      </p:sp>
-      <p:sp>
-        <p:nvSpPr>
-          <p:cNvPr id="4" name="Rectangle 3"/>
-          <p:cNvSpPr/>
-          <p:nvPr/>
-        </p:nvSpPr>
-        <p:spPr>
-          <a:xfrm>
-            <a:off x="714348" y="928670"/>
-            <a:ext cx="7786742" cy="5015865"/>
+            <a:off x="457200" y="1737360"/>
+            <a:ext cx="8229600" cy="4070350"/>
           </a:xfrm>
           <a:prstGeom prst="rect">
             <a:avLst/>
           </a:prstGeom>
         </p:spPr>
-        <p:txBody>
-          <a:bodyPr wrap="square">
-            <a:spAutoFit/>
-          </a:bodyPr>
-          <a:lstStyle/>
-          <a:p>
-            <a:pPr algn="just">
-              <a:buNone/>
-            </a:pPr>
-            <a:r>
-              <a:rPr lang="en-US" sz="1600" smtClean="0">
-                <a:latin typeface="Times New Roman" panose="02020603050405020304" pitchFamily="18" charset="0"/>
-                <a:cs typeface="Times New Roman" panose="02020603050405020304" pitchFamily="18" charset="0"/>
-                <a:sym typeface="+mn-ea"/>
-              </a:rPr>
-              <a:t>[7]. K. Bun and M. Ishizuka, “Topic extraction from news archive using TF*PDF algorithm”, In Proceedings of Third International Conference on Web Information System Engineering. </a:t>
-            </a:r>
-            <a:endParaRPr lang="en-US" sz="1600" smtClean="0">
-              <a:latin typeface="Times New Roman" panose="02020603050405020304" pitchFamily="18" charset="0"/>
-              <a:cs typeface="Times New Roman" panose="02020603050405020304" pitchFamily="18" charset="0"/>
-            </a:endParaRPr>
-          </a:p>
-          <a:p>
-            <a:pPr algn="just">
-              <a:buNone/>
-            </a:pPr>
-            <a:r>
-              <a:rPr lang="en-US" sz="1600" smtClean="0">
-                <a:latin typeface="Times New Roman" panose="02020603050405020304" pitchFamily="18" charset="0"/>
-                <a:cs typeface="Times New Roman" panose="02020603050405020304" pitchFamily="18" charset="0"/>
-                <a:sym typeface="+mn-ea"/>
-              </a:rPr>
-              <a:t>[8]. Jacques Savoy, Olena Zubaryeva, “Classification Based on Specific Vocabulary” published in 2011 IEEE/WIC/ACM International Conferences on Web Intelligence and Intelligent Agent Technology 978-0-7695-4513-4/11 2011 IEEE </a:t>
-            </a:r>
-            <a:endParaRPr lang="en-US" sz="1600" smtClean="0">
-              <a:latin typeface="Times New Roman" panose="02020603050405020304" pitchFamily="18" charset="0"/>
-              <a:cs typeface="Times New Roman" panose="02020603050405020304" pitchFamily="18" charset="0"/>
-            </a:endParaRPr>
-          </a:p>
-          <a:p>
-            <a:pPr algn="just">
-              <a:buNone/>
-            </a:pPr>
-            <a:r>
-              <a:rPr lang="en-US" sz="1600" smtClean="0">
-                <a:latin typeface="Times New Roman" panose="02020603050405020304" pitchFamily="18" charset="0"/>
-                <a:cs typeface="Times New Roman" panose="02020603050405020304" pitchFamily="18" charset="0"/>
-                <a:sym typeface="+mn-ea"/>
-              </a:rPr>
-              <a:t>[9]. Dengya Zhu, Jitian XIAO, “R-tfidf, a Variety of tf-idf Term Weighting Strategy in Document Categorization”, published in 2011 Seventh International Conference on Semantics, Knowledge and Grids. </a:t>
-            </a:r>
-            <a:endParaRPr lang="en-US" sz="1600" smtClean="0">
-              <a:latin typeface="Times New Roman" panose="02020603050405020304" pitchFamily="18" charset="0"/>
-              <a:cs typeface="Times New Roman" panose="02020603050405020304" pitchFamily="18" charset="0"/>
-            </a:endParaRPr>
-          </a:p>
-          <a:p>
-            <a:pPr algn="just">
-              <a:buNone/>
-            </a:pPr>
-            <a:r>
-              <a:rPr lang="en-US" sz="1600" smtClean="0">
-                <a:latin typeface="Times New Roman" panose="02020603050405020304" pitchFamily="18" charset="0"/>
-                <a:cs typeface="Times New Roman" panose="02020603050405020304" pitchFamily="18" charset="0"/>
-                <a:sym typeface="+mn-ea"/>
-              </a:rPr>
-              <a:t>[10]. Catherine Blake “A Comparison of Document, Sentence, and Term Event Spaces” published in IEEE 2010</a:t>
-            </a:r>
-            <a:endParaRPr lang="en-US" sz="1600" smtClean="0">
-              <a:latin typeface="Times New Roman" panose="02020603050405020304" pitchFamily="18" charset="0"/>
-              <a:cs typeface="Times New Roman" panose="02020603050405020304" pitchFamily="18" charset="0"/>
-            </a:endParaRPr>
-          </a:p>
-          <a:p>
-            <a:pPr algn="just">
-              <a:buNone/>
-            </a:pPr>
-            <a:r>
-              <a:rPr lang="en-US" sz="1600" smtClean="0">
-                <a:latin typeface="Times New Roman" panose="02020603050405020304" pitchFamily="18" charset="0"/>
-                <a:cs typeface="Times New Roman" panose="02020603050405020304" pitchFamily="18" charset="0"/>
-                <a:sym typeface="+mn-ea"/>
-              </a:rPr>
-              <a:t>[11]. Ying Chen, Wenping Guo, Xiaoming Zhao, “A semantic Based Information Retrieval Model for Blog”, Third International Symposium on Electronic Commerce and Security, 2010, IEEE </a:t>
-            </a:r>
-            <a:endParaRPr lang="en-US" sz="1600" smtClean="0">
-              <a:latin typeface="Times New Roman" panose="02020603050405020304" pitchFamily="18" charset="0"/>
-              <a:cs typeface="Times New Roman" panose="02020603050405020304" pitchFamily="18" charset="0"/>
-            </a:endParaRPr>
-          </a:p>
-          <a:p>
-            <a:pPr algn="just">
-              <a:buNone/>
-            </a:pPr>
-            <a:r>
-              <a:rPr lang="en-US" sz="1600" smtClean="0">
-                <a:latin typeface="Times New Roman" panose="02020603050405020304" pitchFamily="18" charset="0"/>
-                <a:cs typeface="Times New Roman" panose="02020603050405020304" pitchFamily="18" charset="0"/>
-                <a:sym typeface="+mn-ea"/>
-              </a:rPr>
-              <a:t>[12] Jalaj S. Modha, Prof &amp; Head Gayatri S. Pandi Sandip J. Modha, “Automatic Sentiment Analysis for Unstructured Data”, International Journal of Advanced Research in Computer Science and Software Engineering , Volume 3, Issue 12, December 2013 [14] R M. Chandrasekaran, G.Vinodhini, “Sentiment Analysis and Opinion Mining: A Survey”, International Journal of Advanced Research in Computer Science and Software Engineering, Volume 2, Issue 6, June 2012 [15] Bing Liu., “Sentiment Analysis and Opinion Mining”, Morgan &amp; Claypool Publishers, May 2012</a:t>
-            </a:r>
-            <a:endParaRPr lang="en-US" sz="1600" dirty="0" smtClean="0">
-              <a:latin typeface="Times New Roman" panose="02020603050405020304" pitchFamily="18" charset="0"/>
-              <a:cs typeface="Times New Roman" panose="02020603050405020304" pitchFamily="18" charset="0"/>
-              <a:sym typeface="+mn-ea"/>
-            </a:endParaRPr>
-          </a:p>
-        </p:txBody>
-      </p:sp>
+      </p:pic>
     </p:spTree>
   </p:cSld>
   <p:clrMapOvr>
@@ -7540,6 +9714,395 @@
       </p:grpSpPr>
       <p:sp>
         <p:nvSpPr>
+          <p:cNvPr id="2" name="Content Placeholder 1"/>
+          <p:cNvSpPr>
+            <a:spLocks noGrp="1"/>
+          </p:cNvSpPr>
+          <p:nvPr>
+            <p:ph idx="1"/>
+          </p:nvPr>
+        </p:nvSpPr>
+        <p:spPr/>
+        <p:txBody>
+          <a:bodyPr>
+            <a:noAutofit/>
+          </a:bodyPr>
+          <a:lstStyle/>
+          <a:p>
+            <a:pPr algn="just">
+              <a:buNone/>
+            </a:pPr>
+            <a:r>
+              <a:rPr lang="en-US" sz="1500" smtClean="0">
+                <a:latin typeface="Times New Roman" panose="02020603050405020304" pitchFamily="18" charset="0"/>
+                <a:cs typeface="Times New Roman" panose="02020603050405020304" pitchFamily="18" charset="0"/>
+              </a:rPr>
+              <a:t>[1] G.Vinodhini and RM.Chandrasekaran, “Sentiment Analysis and Opinion Mining: A Survey”, Volume 2, Issue 6, June 2012 ISSN: 2277 128X International Journal of Advanced Research in Computer Science and Software Engineering </a:t>
+            </a:r>
+            <a:endParaRPr lang="en-US" sz="1500" smtClean="0">
+              <a:latin typeface="Times New Roman" panose="02020603050405020304" pitchFamily="18" charset="0"/>
+              <a:cs typeface="Times New Roman" panose="02020603050405020304" pitchFamily="18" charset="0"/>
+            </a:endParaRPr>
+          </a:p>
+          <a:p>
+            <a:pPr algn="just">
+              <a:buNone/>
+            </a:pPr>
+            <a:r>
+              <a:rPr lang="en-US" sz="1500" smtClean="0">
+                <a:latin typeface="Times New Roman" panose="02020603050405020304" pitchFamily="18" charset="0"/>
+                <a:cs typeface="Times New Roman" panose="02020603050405020304" pitchFamily="18" charset="0"/>
+              </a:rPr>
+              <a:t>[2] Zhongwu Zhai, Bing Liu, Hua Xu and Hua Xu, “Clustering Product Features for Opinion Mining”, WSDM’11, February 9–12, 2011, Hong Kong, China. Copyright 2011 ACM 978-1-4503- 0493- 1/11/02...$10.00 </a:t>
+            </a:r>
+            <a:endParaRPr lang="en-US" sz="1500" smtClean="0">
+              <a:latin typeface="Times New Roman" panose="02020603050405020304" pitchFamily="18" charset="0"/>
+              <a:cs typeface="Times New Roman" panose="02020603050405020304" pitchFamily="18" charset="0"/>
+            </a:endParaRPr>
+          </a:p>
+          <a:p>
+            <a:pPr algn="just">
+              <a:buNone/>
+            </a:pPr>
+            <a:r>
+              <a:rPr lang="en-US" sz="1500" smtClean="0">
+                <a:latin typeface="Times New Roman" panose="02020603050405020304" pitchFamily="18" charset="0"/>
+                <a:cs typeface="Times New Roman" panose="02020603050405020304" pitchFamily="18" charset="0"/>
+              </a:rPr>
+              <a:t>[3] Singh and Vivek Kumar, ―A clustering and opinion mining approach to socio-political analysis of the blogosphere”, Computational Intelligence and Computing Research (ICCIC), 2010 IEEE International Conference. </a:t>
+            </a:r>
+            <a:endParaRPr lang="en-US" sz="1500" smtClean="0">
+              <a:latin typeface="Times New Roman" panose="02020603050405020304" pitchFamily="18" charset="0"/>
+              <a:cs typeface="Times New Roman" panose="02020603050405020304" pitchFamily="18" charset="0"/>
+            </a:endParaRPr>
+          </a:p>
+          <a:p>
+            <a:pPr algn="just">
+              <a:buNone/>
+            </a:pPr>
+            <a:r>
+              <a:rPr lang="en-US" sz="1500" smtClean="0">
+                <a:latin typeface="Times New Roman" panose="02020603050405020304" pitchFamily="18" charset="0"/>
+                <a:cs typeface="Times New Roman" panose="02020603050405020304" pitchFamily="18" charset="0"/>
+              </a:rPr>
+              <a:t>[4] Alexander Pak and Patrick Paroubek, “Twitter as a Corpus for Sentiment Analysis and Opinion Mining” </a:t>
+            </a:r>
+            <a:endParaRPr lang="en-US" sz="1500" smtClean="0">
+              <a:latin typeface="Times New Roman" panose="02020603050405020304" pitchFamily="18" charset="0"/>
+              <a:cs typeface="Times New Roman" panose="02020603050405020304" pitchFamily="18" charset="0"/>
+            </a:endParaRPr>
+          </a:p>
+          <a:p>
+            <a:pPr algn="just">
+              <a:buNone/>
+            </a:pPr>
+            <a:r>
+              <a:rPr lang="en-US" sz="1500" smtClean="0">
+                <a:latin typeface="Times New Roman" panose="02020603050405020304" pitchFamily="18" charset="0"/>
+                <a:cs typeface="Times New Roman" panose="02020603050405020304" pitchFamily="18" charset="0"/>
+              </a:rPr>
+              <a:t>[5] Bing Liu. “Sentiment Analysis and Opinion Mining, Morgan &amp; Claypool Publishers, May 2012.” </a:t>
+            </a:r>
+            <a:endParaRPr lang="en-US" sz="1500" smtClean="0">
+              <a:latin typeface="Times New Roman" panose="02020603050405020304" pitchFamily="18" charset="0"/>
+              <a:cs typeface="Times New Roman" panose="02020603050405020304" pitchFamily="18" charset="0"/>
+            </a:endParaRPr>
+          </a:p>
+          <a:p>
+            <a:pPr algn="just">
+              <a:buNone/>
+            </a:pPr>
+            <a:r>
+              <a:rPr lang="en-US" sz="1500" smtClean="0">
+                <a:latin typeface="Times New Roman" panose="02020603050405020304" pitchFamily="18" charset="0"/>
+                <a:cs typeface="Times New Roman" panose="02020603050405020304" pitchFamily="18" charset="0"/>
+              </a:rPr>
+              <a:t>[6] V. S. Jagtap and Karishma Pawar, “Analysis of different approaches to Sentence-Level Sentiment Classification”, International Journal of Scientific Engineering and Technology (ISSN: 2277-1581) Volume 2 Issue 3, PP: 164-170 1 April 2013 Onam Bharti et al, International Journal of Computer Science and Mobile Computing, Vol.5 Issue.6, June- 2016, pg. 601-609 © 2016, IJCSMC All Rights Reserved 609 </a:t>
+            </a:r>
+            <a:endParaRPr lang="en-US" sz="1500" smtClean="0">
+              <a:latin typeface="Times New Roman" panose="02020603050405020304" pitchFamily="18" charset="0"/>
+              <a:cs typeface="Times New Roman" panose="02020603050405020304" pitchFamily="18" charset="0"/>
+            </a:endParaRPr>
+          </a:p>
+          <a:p>
+            <a:pPr algn="just">
+              <a:buNone/>
+            </a:pPr>
+            <a:endParaRPr lang="en-US" sz="1500" smtClean="0">
+              <a:latin typeface="Times New Roman" panose="02020603050405020304" pitchFamily="18" charset="0"/>
+              <a:cs typeface="Times New Roman" panose="02020603050405020304" pitchFamily="18" charset="0"/>
+            </a:endParaRPr>
+          </a:p>
+        </p:txBody>
+      </p:sp>
+      <p:sp>
+        <p:nvSpPr>
+          <p:cNvPr id="3" name="Title 2"/>
+          <p:cNvSpPr>
+            <a:spLocks noGrp="1"/>
+          </p:cNvSpPr>
+          <p:nvPr>
+            <p:ph type="title"/>
+          </p:nvPr>
+        </p:nvSpPr>
+        <p:spPr/>
+        <p:txBody>
+          <a:bodyPr/>
+          <a:lstStyle/>
+          <a:p>
+            <a:r>
+              <a:rPr lang="en-IN" dirty="0" smtClean="0"/>
+              <a:t>REFERENCES</a:t>
+            </a:r>
+            <a:endParaRPr lang="en-US" dirty="0"/>
+          </a:p>
+        </p:txBody>
+      </p:sp>
+      <p:sp>
+        <p:nvSpPr>
+          <p:cNvPr id="4" name="Slide Number Placeholder 3"/>
+          <p:cNvSpPr>
+            <a:spLocks noGrp="1"/>
+          </p:cNvSpPr>
+          <p:nvPr>
+            <p:ph type="sldNum" sz="quarter" idx="12"/>
+          </p:nvPr>
+        </p:nvSpPr>
+        <p:spPr/>
+        <p:txBody>
+          <a:bodyPr/>
+          <a:p>
+            <a:fld id="{6AC1B37A-5BC2-4299-A427-7A619A58F75A}" type="slidenum">
+              <a:rPr lang="en-US" smtClean="0"/>
+            </a:fld>
+            <a:endParaRPr lang="en-US"/>
+          </a:p>
+        </p:txBody>
+      </p:sp>
+    </p:spTree>
+  </p:cSld>
+  <p:clrMapOvr>
+    <a:masterClrMapping/>
+  </p:clrMapOvr>
+</p:sld>
+</file>
+
+<file path=ppt/slides/slide27.xml><?xml version="1.0" encoding="utf-8"?>
+<p:sld xmlns:a="http://schemas.openxmlformats.org/drawingml/2006/main" xmlns:r="http://schemas.openxmlformats.org/officeDocument/2006/relationships" xmlns:p="http://schemas.openxmlformats.org/presentationml/2006/main">
+  <p:cSld>
+    <p:spTree>
+      <p:nvGrpSpPr>
+        <p:cNvPr id="1" name=""/>
+        <p:cNvGrpSpPr/>
+        <p:nvPr/>
+      </p:nvGrpSpPr>
+      <p:grpSpPr>
+        <a:xfrm>
+          <a:off x="0" y="0"/>
+          <a:ext cx="0" cy="0"/>
+          <a:chOff x="0" y="0"/>
+          <a:chExt cx="0" cy="0"/>
+        </a:xfrm>
+      </p:grpSpPr>
+      <p:sp>
+        <p:nvSpPr>
+          <p:cNvPr id="3" name="TextBox 2"/>
+          <p:cNvSpPr txBox="1"/>
+          <p:nvPr/>
+        </p:nvSpPr>
+        <p:spPr>
+          <a:xfrm>
+            <a:off x="500034" y="571480"/>
+            <a:ext cx="8143932" cy="369332"/>
+          </a:xfrm>
+          <a:prstGeom prst="rect">
+            <a:avLst/>
+          </a:prstGeom>
+          <a:noFill/>
+        </p:spPr>
+        <p:txBody>
+          <a:bodyPr wrap="square" rtlCol="0">
+            <a:spAutoFit/>
+          </a:bodyPr>
+          <a:lstStyle/>
+          <a:p>
+            <a:endParaRPr lang="en-US" dirty="0"/>
+          </a:p>
+        </p:txBody>
+      </p:sp>
+      <p:sp>
+        <p:nvSpPr>
+          <p:cNvPr id="4" name="Rectangle 3"/>
+          <p:cNvSpPr/>
+          <p:nvPr/>
+        </p:nvSpPr>
+        <p:spPr>
+          <a:xfrm>
+            <a:off x="714348" y="928670"/>
+            <a:ext cx="7786742" cy="5015865"/>
+          </a:xfrm>
+          <a:prstGeom prst="rect">
+            <a:avLst/>
+          </a:prstGeom>
+        </p:spPr>
+        <p:txBody>
+          <a:bodyPr wrap="square">
+            <a:spAutoFit/>
+          </a:bodyPr>
+          <a:lstStyle/>
+          <a:p>
+            <a:pPr algn="just">
+              <a:buNone/>
+            </a:pPr>
+            <a:r>
+              <a:rPr lang="en-US" sz="1600" smtClean="0">
+                <a:latin typeface="Times New Roman" panose="02020603050405020304" pitchFamily="18" charset="0"/>
+                <a:cs typeface="Times New Roman" panose="02020603050405020304" pitchFamily="18" charset="0"/>
+                <a:sym typeface="+mn-ea"/>
+              </a:rPr>
+              <a:t>[7]. K. Bun and M. Ishizuka, “Topic extraction from news archive using TF*PDF algorithm”, In Proceedings of Third International Conference on Web Information System Engineering. </a:t>
+            </a:r>
+            <a:endParaRPr lang="en-US" sz="1600" smtClean="0">
+              <a:latin typeface="Times New Roman" panose="02020603050405020304" pitchFamily="18" charset="0"/>
+              <a:cs typeface="Times New Roman" panose="02020603050405020304" pitchFamily="18" charset="0"/>
+            </a:endParaRPr>
+          </a:p>
+          <a:p>
+            <a:pPr algn="just">
+              <a:buNone/>
+            </a:pPr>
+            <a:r>
+              <a:rPr lang="en-US" sz="1600" smtClean="0">
+                <a:latin typeface="Times New Roman" panose="02020603050405020304" pitchFamily="18" charset="0"/>
+                <a:cs typeface="Times New Roman" panose="02020603050405020304" pitchFamily="18" charset="0"/>
+                <a:sym typeface="+mn-ea"/>
+              </a:rPr>
+              <a:t>[8]. Jacques Savoy, Olena Zubaryeva, “Classification Based on Specific Vocabulary” published in 2011 IEEE/WIC/ACM International Conferences on Web Intelligence and Intelligent Agent Technology 978-0-7695-4513-4/11 2011 IEEE </a:t>
+            </a:r>
+            <a:endParaRPr lang="en-US" sz="1600" smtClean="0">
+              <a:latin typeface="Times New Roman" panose="02020603050405020304" pitchFamily="18" charset="0"/>
+              <a:cs typeface="Times New Roman" panose="02020603050405020304" pitchFamily="18" charset="0"/>
+            </a:endParaRPr>
+          </a:p>
+          <a:p>
+            <a:pPr algn="just">
+              <a:buNone/>
+            </a:pPr>
+            <a:r>
+              <a:rPr lang="en-US" sz="1600" smtClean="0">
+                <a:latin typeface="Times New Roman" panose="02020603050405020304" pitchFamily="18" charset="0"/>
+                <a:cs typeface="Times New Roman" panose="02020603050405020304" pitchFamily="18" charset="0"/>
+                <a:sym typeface="+mn-ea"/>
+              </a:rPr>
+              <a:t>[9]. Dengya Zhu, Jitian XIAO, “R-tfidf, a Variety of tf-idf Term Weighting Strategy in Document Categorization”, published in 2011 Seventh International Conference on Semantics, Knowledge and Grids. </a:t>
+            </a:r>
+            <a:endParaRPr lang="en-US" sz="1600" smtClean="0">
+              <a:latin typeface="Times New Roman" panose="02020603050405020304" pitchFamily="18" charset="0"/>
+              <a:cs typeface="Times New Roman" panose="02020603050405020304" pitchFamily="18" charset="0"/>
+            </a:endParaRPr>
+          </a:p>
+          <a:p>
+            <a:pPr algn="just">
+              <a:buNone/>
+            </a:pPr>
+            <a:r>
+              <a:rPr lang="en-US" sz="1600" smtClean="0">
+                <a:latin typeface="Times New Roman" panose="02020603050405020304" pitchFamily="18" charset="0"/>
+                <a:cs typeface="Times New Roman" panose="02020603050405020304" pitchFamily="18" charset="0"/>
+                <a:sym typeface="+mn-ea"/>
+              </a:rPr>
+              <a:t>[10]. Catherine Blake “A Comparison of Document, Sentence, and Term Event Spaces” published in IEEE 2010</a:t>
+            </a:r>
+            <a:endParaRPr lang="en-US" sz="1600" smtClean="0">
+              <a:latin typeface="Times New Roman" panose="02020603050405020304" pitchFamily="18" charset="0"/>
+              <a:cs typeface="Times New Roman" panose="02020603050405020304" pitchFamily="18" charset="0"/>
+            </a:endParaRPr>
+          </a:p>
+          <a:p>
+            <a:pPr algn="just">
+              <a:buNone/>
+            </a:pPr>
+            <a:r>
+              <a:rPr lang="en-US" sz="1600" smtClean="0">
+                <a:latin typeface="Times New Roman" panose="02020603050405020304" pitchFamily="18" charset="0"/>
+                <a:cs typeface="Times New Roman" panose="02020603050405020304" pitchFamily="18" charset="0"/>
+                <a:sym typeface="+mn-ea"/>
+              </a:rPr>
+              <a:t>[11]. Ying Chen, Wenping Guo, Xiaoming Zhao, “A semantic Based Information Retrieval Model for Blog”, Third International Symposium on Electronic Commerce and Security, 2010, IEEE </a:t>
+            </a:r>
+            <a:endParaRPr lang="en-US" sz="1600" smtClean="0">
+              <a:latin typeface="Times New Roman" panose="02020603050405020304" pitchFamily="18" charset="0"/>
+              <a:cs typeface="Times New Roman" panose="02020603050405020304" pitchFamily="18" charset="0"/>
+            </a:endParaRPr>
+          </a:p>
+          <a:p>
+            <a:pPr algn="just">
+              <a:buNone/>
+            </a:pPr>
+            <a:r>
+              <a:rPr lang="en-US" sz="1600" smtClean="0">
+                <a:latin typeface="Times New Roman" panose="02020603050405020304" pitchFamily="18" charset="0"/>
+                <a:cs typeface="Times New Roman" panose="02020603050405020304" pitchFamily="18" charset="0"/>
+                <a:sym typeface="+mn-ea"/>
+              </a:rPr>
+              <a:t>[12] Jalaj S. Modha, Prof &amp; Head Gayatri S. Pandi Sandip J. Modha, “Automatic Sentiment Analysis for Unstructured Data”, International Journal of Advanced Research in Computer Science and Software Engineering , Volume 3, Issue 12, December 2013 [14] R M. Chandrasekaran, G.Vinodhini, “Sentiment Analysis and Opinion Mining: A Survey”, International Journal of Advanced Research in Computer Science and Software Engineering, Volume 2, Issue 6, June 2012 [15] Bing Liu., “Sentiment Analysis and Opinion Mining”, Morgan &amp; Claypool Publishers, May 2012</a:t>
+            </a:r>
+            <a:endParaRPr lang="en-US" sz="1600" dirty="0" smtClean="0">
+              <a:latin typeface="Times New Roman" panose="02020603050405020304" pitchFamily="18" charset="0"/>
+              <a:cs typeface="Times New Roman" panose="02020603050405020304" pitchFamily="18" charset="0"/>
+              <a:sym typeface="+mn-ea"/>
+            </a:endParaRPr>
+          </a:p>
+        </p:txBody>
+      </p:sp>
+      <p:sp>
+        <p:nvSpPr>
+          <p:cNvPr id="2" name="Slide Number Placeholder 1"/>
+          <p:cNvSpPr>
+            <a:spLocks noGrp="1"/>
+          </p:cNvSpPr>
+          <p:nvPr>
+            <p:ph type="sldNum" sz="quarter" idx="12"/>
+          </p:nvPr>
+        </p:nvSpPr>
+        <p:spPr/>
+        <p:txBody>
+          <a:bodyPr/>
+          <a:p>
+            <a:fld id="{6AC1B37A-5BC2-4299-A427-7A619A58F75A}" type="slidenum">
+              <a:rPr lang="en-US" smtClean="0"/>
+            </a:fld>
+            <a:endParaRPr lang="en-US"/>
+          </a:p>
+        </p:txBody>
+      </p:sp>
+    </p:spTree>
+  </p:cSld>
+  <p:clrMapOvr>
+    <a:masterClrMapping/>
+  </p:clrMapOvr>
+</p:sld>
+</file>
+
+<file path=ppt/slides/slide28.xml><?xml version="1.0" encoding="utf-8"?>
+<p:sld xmlns:a="http://schemas.openxmlformats.org/drawingml/2006/main" xmlns:r="http://schemas.openxmlformats.org/officeDocument/2006/relationships" xmlns:p="http://schemas.openxmlformats.org/presentationml/2006/main">
+  <p:cSld>
+    <p:spTree>
+      <p:nvGrpSpPr>
+        <p:cNvPr id="1" name=""/>
+        <p:cNvGrpSpPr/>
+        <p:nvPr/>
+      </p:nvGrpSpPr>
+      <p:grpSpPr>
+        <a:xfrm>
+          <a:off x="0" y="0"/>
+          <a:ext cx="0" cy="0"/>
+          <a:chOff x="0" y="0"/>
+          <a:chExt cx="0" cy="0"/>
+        </a:xfrm>
+      </p:grpSpPr>
+      <p:sp>
+        <p:nvSpPr>
           <p:cNvPr id="2" name="TextBox 1"/>
           <p:cNvSpPr txBox="1"/>
           <p:nvPr/>
@@ -7586,6 +10149,27 @@
               <a:latin typeface="Times New Roman" panose="02020603050405020304" pitchFamily="18" charset="0"/>
               <a:cs typeface="Times New Roman" panose="02020603050405020304" pitchFamily="18" charset="0"/>
             </a:endParaRPr>
+          </a:p>
+        </p:txBody>
+      </p:sp>
+      <p:sp>
+        <p:nvSpPr>
+          <p:cNvPr id="3" name="Slide Number Placeholder 2"/>
+          <p:cNvSpPr>
+            <a:spLocks noGrp="1"/>
+          </p:cNvSpPr>
+          <p:nvPr>
+            <p:ph type="sldNum" sz="quarter" idx="12"/>
+          </p:nvPr>
+        </p:nvSpPr>
+        <p:spPr/>
+        <p:txBody>
+          <a:bodyPr/>
+          <a:p>
+            <a:fld id="{6AC1B37A-5BC2-4299-A427-7A619A58F75A}" type="slidenum">
+              <a:rPr lang="en-US" smtClean="0"/>
+            </a:fld>
+            <a:endParaRPr lang="en-US"/>
           </a:p>
         </p:txBody>
       </p:sp>
@@ -7845,6 +10429,27 @@
               <a:latin typeface="Times New Roman" panose="02020603050405020304" pitchFamily="18" charset="0"/>
               <a:cs typeface="Times New Roman" panose="02020603050405020304" pitchFamily="18" charset="0"/>
             </a:endParaRPr>
+          </a:p>
+        </p:txBody>
+      </p:sp>
+      <p:sp>
+        <p:nvSpPr>
+          <p:cNvPr id="4" name="Slide Number Placeholder 3"/>
+          <p:cNvSpPr>
+            <a:spLocks noGrp="1"/>
+          </p:cNvSpPr>
+          <p:nvPr>
+            <p:ph type="sldNum" sz="quarter" idx="12"/>
+          </p:nvPr>
+        </p:nvSpPr>
+        <p:spPr/>
+        <p:txBody>
+          <a:bodyPr/>
+          <a:p>
+            <a:fld id="{6AC1B37A-5BC2-4299-A427-7A619A58F75A}" type="slidenum">
+              <a:rPr lang="en-US" smtClean="0"/>
+            </a:fld>
+            <a:endParaRPr lang="en-US"/>
           </a:p>
         </p:txBody>
       </p:sp>
@@ -8324,6 +10929,27 @@
               <a:latin typeface="Times New Roman" panose="02020603050405020304" pitchFamily="18" charset="0"/>
               <a:cs typeface="Times New Roman" panose="02020603050405020304" pitchFamily="18" charset="0"/>
             </a:endParaRPr>
+          </a:p>
+        </p:txBody>
+      </p:sp>
+      <p:sp>
+        <p:nvSpPr>
+          <p:cNvPr id="2" name="Slide Number Placeholder 1"/>
+          <p:cNvSpPr>
+            <a:spLocks noGrp="1"/>
+          </p:cNvSpPr>
+          <p:nvPr>
+            <p:ph type="sldNum" sz="quarter" idx="12"/>
+          </p:nvPr>
+        </p:nvSpPr>
+        <p:spPr/>
+        <p:txBody>
+          <a:bodyPr/>
+          <a:p>
+            <a:fld id="{6AC1B37A-5BC2-4299-A427-7A619A58F75A}" type="slidenum">
+              <a:rPr lang="en-US" smtClean="0"/>
+            </a:fld>
+            <a:endParaRPr lang="en-US"/>
           </a:p>
         </p:txBody>
       </p:sp>
@@ -8824,6 +11450,27 @@
           </a:graphicData>
         </a:graphic>
       </p:graphicFrame>
+      <p:sp>
+        <p:nvSpPr>
+          <p:cNvPr id="2" name="Slide Number Placeholder 1"/>
+          <p:cNvSpPr>
+            <a:spLocks noGrp="1"/>
+          </p:cNvSpPr>
+          <p:nvPr>
+            <p:ph type="sldNum" sz="quarter" idx="12"/>
+          </p:nvPr>
+        </p:nvSpPr>
+        <p:spPr/>
+        <p:txBody>
+          <a:bodyPr/>
+          <a:p>
+            <a:fld id="{6AC1B37A-5BC2-4299-A427-7A619A58F75A}" type="slidenum">
+              <a:rPr lang="en-US" smtClean="0"/>
+            </a:fld>
+            <a:endParaRPr lang="en-US"/>
+          </a:p>
+        </p:txBody>
+      </p:sp>
     </p:spTree>
   </p:cSld>
   <p:clrMapOvr>
@@ -9113,6 +11760,27 @@
           </a:p>
         </p:txBody>
       </p:sp>
+      <p:sp>
+        <p:nvSpPr>
+          <p:cNvPr id="4" name="Slide Number Placeholder 3"/>
+          <p:cNvSpPr>
+            <a:spLocks noGrp="1"/>
+          </p:cNvSpPr>
+          <p:nvPr>
+            <p:ph type="sldNum" sz="quarter" idx="12"/>
+          </p:nvPr>
+        </p:nvSpPr>
+        <p:spPr/>
+        <p:txBody>
+          <a:bodyPr/>
+          <a:p>
+            <a:fld id="{6AC1B37A-5BC2-4299-A427-7A619A58F75A}" type="slidenum">
+              <a:rPr lang="en-US" smtClean="0"/>
+            </a:fld>
+            <a:endParaRPr lang="en-US"/>
+          </a:p>
+        </p:txBody>
+      </p:sp>
     </p:spTree>
   </p:cSld>
   <p:clrMapOvr>
@@ -9455,6 +12123,27 @@
           </a:p>
         </p:txBody>
       </p:sp>
+      <p:sp>
+        <p:nvSpPr>
+          <p:cNvPr id="4" name="Slide Number Placeholder 3"/>
+          <p:cNvSpPr>
+            <a:spLocks noGrp="1"/>
+          </p:cNvSpPr>
+          <p:nvPr>
+            <p:ph type="sldNum" sz="quarter" idx="12"/>
+          </p:nvPr>
+        </p:nvSpPr>
+        <p:spPr/>
+        <p:txBody>
+          <a:bodyPr/>
+          <a:p>
+            <a:fld id="{6AC1B37A-5BC2-4299-A427-7A619A58F75A}" type="slidenum">
+              <a:rPr lang="en-US" smtClean="0"/>
+            </a:fld>
+            <a:endParaRPr lang="en-US"/>
+          </a:p>
+        </p:txBody>
+      </p:sp>
     </p:spTree>
   </p:cSld>
   <p:clrMapOvr>
@@ -9542,6 +12231,27 @@
           </a:prstGeom>
         </p:spPr>
       </p:pic>
+      <p:sp>
+        <p:nvSpPr>
+          <p:cNvPr id="2" name="Slide Number Placeholder 1"/>
+          <p:cNvSpPr>
+            <a:spLocks noGrp="1"/>
+          </p:cNvSpPr>
+          <p:nvPr>
+            <p:ph type="sldNum" sz="quarter" idx="12"/>
+          </p:nvPr>
+        </p:nvSpPr>
+        <p:spPr/>
+        <p:txBody>
+          <a:bodyPr/>
+          <a:p>
+            <a:fld id="{6AC1B37A-5BC2-4299-A427-7A619A58F75A}" type="slidenum">
+              <a:rPr lang="en-US" smtClean="0"/>
+            </a:fld>
+            <a:endParaRPr lang="en-US"/>
+          </a:p>
+        </p:txBody>
+      </p:sp>
     </p:spTree>
   </p:cSld>
   <p:clrMapOvr>
@@ -9664,6 +12374,27 @@
           </a:ln>
         </p:spPr>
       </p:pic>
+      <p:sp>
+        <p:nvSpPr>
+          <p:cNvPr id="2" name="Slide Number Placeholder 1"/>
+          <p:cNvSpPr>
+            <a:spLocks noGrp="1"/>
+          </p:cNvSpPr>
+          <p:nvPr>
+            <p:ph type="sldNum" sz="quarter" idx="12"/>
+          </p:nvPr>
+        </p:nvSpPr>
+        <p:spPr/>
+        <p:txBody>
+          <a:bodyPr/>
+          <a:p>
+            <a:fld id="{6AC1B37A-5BC2-4299-A427-7A619A58F75A}" type="slidenum">
+              <a:rPr lang="en-US" smtClean="0"/>
+            </a:fld>
+            <a:endParaRPr lang="en-US"/>
+          </a:p>
+        </p:txBody>
+      </p:sp>
     </p:spTree>
   </p:cSld>
   <p:clrMapOvr>
@@ -10217,4 +12948,263 @@
     </a:ext>
   </a:extLst>
 </a:theme>
+</file>
+
+<file path=ppt/theme/theme3.xml><?xml version="1.0" encoding="utf-8"?>
+<a:theme xmlns:a="http://schemas.openxmlformats.org/drawingml/2006/main" name="Office Theme">
+  <a:themeElements>
+    <a:clrScheme name="Office">
+      <a:dk1>
+        <a:sysClr val="windowText" lastClr="000000"/>
+      </a:dk1>
+      <a:lt1>
+        <a:sysClr val="window" lastClr="FFFFFF"/>
+      </a:lt1>
+      <a:dk2>
+        <a:srgbClr val="44546A"/>
+      </a:dk2>
+      <a:lt2>
+        <a:srgbClr val="E7E6E6"/>
+      </a:lt2>
+      <a:accent1>
+        <a:srgbClr val="5B9BD5"/>
+      </a:accent1>
+      <a:accent2>
+        <a:srgbClr val="ED7D31"/>
+      </a:accent2>
+      <a:accent3>
+        <a:srgbClr val="A5A5A5"/>
+      </a:accent3>
+      <a:accent4>
+        <a:srgbClr val="FFC000"/>
+      </a:accent4>
+      <a:accent5>
+        <a:srgbClr val="4472C4"/>
+      </a:accent5>
+      <a:accent6>
+        <a:srgbClr val="70AD47"/>
+      </a:accent6>
+      <a:hlink>
+        <a:srgbClr val="0563C1"/>
+      </a:hlink>
+      <a:folHlink>
+        <a:srgbClr val="954F72"/>
+      </a:folHlink>
+    </a:clrScheme>
+    <a:fontScheme name="Office">
+      <a:majorFont>
+        <a:latin typeface="Calibri Light"/>
+        <a:ea typeface=""/>
+        <a:cs typeface=""/>
+        <a:font script="Jpan" typeface="ＭＳ Ｐゴシック"/>
+        <a:font script="Hang" typeface="맑은 고딕"/>
+        <a:font script="Hans" typeface="宋体"/>
+        <a:font script="Hant" typeface="新細明體"/>
+        <a:font script="Arab" typeface="Times New Roman"/>
+        <a:font script="Hebr" typeface="Times New Roman"/>
+        <a:font script="Thai" typeface="Angsana New"/>
+        <a:font script="Ethi" typeface="Nyala"/>
+        <a:font script="Beng" typeface="Vrinda"/>
+        <a:font script="Gujr" typeface="Shruti"/>
+        <a:font script="Khmr" typeface="MoolBoran"/>
+        <a:font script="Knda" typeface="Tunga"/>
+        <a:font script="Guru" typeface="Raavi"/>
+        <a:font script="Cans" typeface="Euphemia"/>
+        <a:font script="Cher" typeface="Plantagenet Cherokee"/>
+        <a:font script="Yiii" typeface="Microsoft Yi Baiti"/>
+        <a:font script="Tibt" typeface="Microsoft Himalaya"/>
+        <a:font script="Thaa" typeface="MV Boli"/>
+        <a:font script="Deva" typeface="Mangal"/>
+        <a:font script="Telu" typeface="Gautami"/>
+        <a:font script="Taml" typeface="Latha"/>
+        <a:font script="Syrc" typeface="Estrangelo Edessa"/>
+        <a:font script="Orya" typeface="Kalinga"/>
+        <a:font script="Mlym" typeface="Kartika"/>
+        <a:font script="Laoo" typeface="DokChampa"/>
+        <a:font script="Sinh" typeface="Iskoola Pota"/>
+        <a:font script="Mong" typeface="Mongolian Baiti"/>
+        <a:font script="Viet" typeface="Times New Roman"/>
+        <a:font script="Uigh" typeface="Microsoft Uighur"/>
+        <a:font script="Geor" typeface="Sylfaen"/>
+      </a:majorFont>
+      <a:minorFont>
+        <a:latin typeface="Calibri"/>
+        <a:ea typeface=""/>
+        <a:cs typeface=""/>
+        <a:font script="Jpan" typeface="ＭＳ Ｐゴシック"/>
+        <a:font script="Hang" typeface="맑은 고딕"/>
+        <a:font script="Hans" typeface="宋体"/>
+        <a:font script="Hant" typeface="新細明體"/>
+        <a:font script="Arab" typeface="Arial"/>
+        <a:font script="Hebr" typeface="Arial"/>
+        <a:font script="Thai" typeface="Cordia New"/>
+        <a:font script="Ethi" typeface="Nyala"/>
+        <a:font script="Beng" typeface="Vrinda"/>
+        <a:font script="Gujr" typeface="Shruti"/>
+        <a:font script="Khmr" typeface="DaunPenh"/>
+        <a:font script="Knda" typeface="Tunga"/>
+        <a:font script="Guru" typeface="Raavi"/>
+        <a:font script="Cans" typeface="Euphemia"/>
+        <a:font script="Cher" typeface="Plantagenet Cherokee"/>
+        <a:font script="Yiii" typeface="Microsoft Yi Baiti"/>
+        <a:font script="Tibt" typeface="Microsoft Himalaya"/>
+        <a:font script="Thaa" typeface="MV Boli"/>
+        <a:font script="Deva" typeface="Mangal"/>
+        <a:font script="Telu" typeface="Gautami"/>
+        <a:font script="Taml" typeface="Latha"/>
+        <a:font script="Syrc" typeface="Estrangelo Edessa"/>
+        <a:font script="Orya" typeface="Kalinga"/>
+        <a:font script="Mlym" typeface="Kartika"/>
+        <a:font script="Laoo" typeface="DokChampa"/>
+        <a:font script="Sinh" typeface="Iskoola Pota"/>
+        <a:font script="Mong" typeface="Mongolian Baiti"/>
+        <a:font script="Viet" typeface="Arial"/>
+        <a:font script="Uigh" typeface="Microsoft Uighur"/>
+        <a:font script="Geor" typeface="Sylfaen"/>
+      </a:minorFont>
+    </a:fontScheme>
+    <a:fmtScheme name="Office">
+      <a:fillStyleLst>
+        <a:solidFill>
+          <a:schemeClr val="phClr"/>
+        </a:solidFill>
+        <a:gradFill rotWithShape="1">
+          <a:gsLst>
+            <a:gs pos="0">
+              <a:schemeClr val="phClr">
+                <a:lumMod val="110000"/>
+                <a:satMod val="105000"/>
+                <a:tint val="67000"/>
+              </a:schemeClr>
+            </a:gs>
+            <a:gs pos="50000">
+              <a:schemeClr val="phClr">
+                <a:lumMod val="105000"/>
+                <a:satMod val="103000"/>
+                <a:tint val="73000"/>
+              </a:schemeClr>
+            </a:gs>
+            <a:gs pos="100000">
+              <a:schemeClr val="phClr">
+                <a:lumMod val="105000"/>
+                <a:satMod val="109000"/>
+                <a:tint val="81000"/>
+              </a:schemeClr>
+            </a:gs>
+          </a:gsLst>
+          <a:lin ang="5400000" scaled="0"/>
+        </a:gradFill>
+        <a:gradFill rotWithShape="1">
+          <a:gsLst>
+            <a:gs pos="0">
+              <a:schemeClr val="phClr">
+                <a:satMod val="103000"/>
+                <a:lumMod val="102000"/>
+                <a:tint val="94000"/>
+              </a:schemeClr>
+            </a:gs>
+            <a:gs pos="50000">
+              <a:schemeClr val="phClr">
+                <a:satMod val="110000"/>
+                <a:lumMod val="100000"/>
+                <a:shade val="100000"/>
+              </a:schemeClr>
+            </a:gs>
+            <a:gs pos="100000">
+              <a:schemeClr val="phClr">
+                <a:lumMod val="99000"/>
+                <a:satMod val="120000"/>
+                <a:shade val="78000"/>
+              </a:schemeClr>
+            </a:gs>
+          </a:gsLst>
+          <a:lin ang="5400000" scaled="0"/>
+        </a:gradFill>
+      </a:fillStyleLst>
+      <a:lnStyleLst>
+        <a:ln w="6350" cap="flat" cmpd="sng" algn="ctr">
+          <a:solidFill>
+            <a:schemeClr val="phClr"/>
+          </a:solidFill>
+          <a:prstDash val="solid"/>
+          <a:miter lim="800000"/>
+        </a:ln>
+        <a:ln w="12700" cap="flat" cmpd="sng" algn="ctr">
+          <a:solidFill>
+            <a:schemeClr val="phClr"/>
+          </a:solidFill>
+          <a:prstDash val="solid"/>
+          <a:miter lim="800000"/>
+        </a:ln>
+        <a:ln w="19050" cap="flat" cmpd="sng" algn="ctr">
+          <a:solidFill>
+            <a:schemeClr val="phClr"/>
+          </a:solidFill>
+          <a:prstDash val="solid"/>
+          <a:miter lim="800000"/>
+        </a:ln>
+      </a:lnStyleLst>
+      <a:effectStyleLst>
+        <a:effectStyle>
+          <a:effectLst/>
+        </a:effectStyle>
+        <a:effectStyle>
+          <a:effectLst/>
+        </a:effectStyle>
+        <a:effectStyle>
+          <a:effectLst>
+            <a:outerShdw blurRad="57150" dist="19050" dir="5400000" algn="ctr" rotWithShape="0">
+              <a:srgbClr val="000000">
+                <a:alpha val="63000"/>
+              </a:srgbClr>
+            </a:outerShdw>
+          </a:effectLst>
+        </a:effectStyle>
+      </a:effectStyleLst>
+      <a:bgFillStyleLst>
+        <a:solidFill>
+          <a:schemeClr val="phClr"/>
+        </a:solidFill>
+        <a:solidFill>
+          <a:schemeClr val="phClr">
+            <a:tint val="95000"/>
+            <a:satMod val="170000"/>
+          </a:schemeClr>
+        </a:solidFill>
+        <a:gradFill rotWithShape="1">
+          <a:gsLst>
+            <a:gs pos="0">
+              <a:schemeClr val="phClr">
+                <a:tint val="93000"/>
+                <a:satMod val="150000"/>
+                <a:shade val="98000"/>
+                <a:lumMod val="102000"/>
+              </a:schemeClr>
+            </a:gs>
+            <a:gs pos="50000">
+              <a:schemeClr val="phClr">
+                <a:tint val="98000"/>
+                <a:satMod val="130000"/>
+                <a:shade val="90000"/>
+                <a:lumMod val="103000"/>
+              </a:schemeClr>
+            </a:gs>
+            <a:gs pos="100000">
+              <a:schemeClr val="phClr">
+                <a:shade val="63000"/>
+                <a:satMod val="120000"/>
+              </a:schemeClr>
+            </a:gs>
+          </a:gsLst>
+          <a:lin ang="5400000" scaled="0"/>
+        </a:gradFill>
+      </a:bgFillStyleLst>
+    </a:fmtScheme>
+  </a:themeElements>
+  <a:extLst>
+    <a:ext uri="{05A4C25C-085E-4340-85A3-A5531E510DB2}">
+      <thm15:themeFamily xmlns:thm15="http://schemas.microsoft.com/office/thememl/2012/main" name="Office Theme" id="{62F939B6-93AF-4DB8-9C6B-D6C7DFDC589F}" vid="{4A3C46E8-61CC-4603-A589-7422A47A8E4A}"/>
+    </a:ext>
+  </a:extLst>
+</a:theme>
 </file>
</xml_diff>

<commit_message>
Documents and Architecture Diagram Updated
</commit_message>
<xml_diff>
--- a/Documents/D2_VIVA_FINAL_PPT.pptx
+++ b/Documents/D2_VIVA_FINAL_PPT.pptx
@@ -7882,33 +7882,13 @@
           <a:p>
             <a:pPr algn="just"/>
             <a:r>
-              <a:rPr lang="en-US" sz="2400" dirty="0" smtClean="0">
+              <a:rPr lang="en-US" sz="2400" smtClean="0">
                 <a:latin typeface="Times New Roman" panose="02020603050405020304" pitchFamily="18" charset="0"/>
                 <a:cs typeface="Times New Roman" panose="02020603050405020304" pitchFamily="18" charset="0"/>
               </a:rPr>
-              <a:t>Real time data collected from </a:t>
-            </a:r>
-            <a:r>
-              <a:rPr lang="en-US" sz="2400" dirty="0" err="1" smtClean="0">
-                <a:latin typeface="Times New Roman" panose="02020603050405020304" pitchFamily="18" charset="0"/>
-                <a:cs typeface="Times New Roman" panose="02020603050405020304" pitchFamily="18" charset="0"/>
-              </a:rPr>
-              <a:t>Twitter</a:t>
-            </a:r>
-            <a:r>
-              <a:rPr lang="en-US" sz="2400" dirty="0" smtClean="0">
-                <a:latin typeface="Times New Roman" panose="02020603050405020304" pitchFamily="18" charset="0"/>
-                <a:cs typeface="Times New Roman" panose="02020603050405020304" pitchFamily="18" charset="0"/>
-              </a:rPr>
-              <a:t>. Collection of data is one of the major and most important tasks of any machine learning projects. Because the input we feed to the algorithms is data. So, the algorithms efficiency and accuracy depends upon the correctness and quality of data collected. So as the data same will be the output.</a:t>
-            </a:r>
-            <a:endParaRPr lang="en-US" sz="2400" dirty="0" smtClean="0">
-              <a:latin typeface="Times New Roman" panose="02020603050405020304" pitchFamily="18" charset="0"/>
-              <a:cs typeface="Times New Roman" panose="02020603050405020304" pitchFamily="18" charset="0"/>
-            </a:endParaRPr>
-          </a:p>
-          <a:p>
-            <a:endParaRPr lang="en-US" sz="2400" dirty="0">
+              <a:t>Real-time data collected from Twitter. The collection of data is one of the major and most important tasks of any machine learning project. Because the input we feed to the algorithms is data. So, the algorithm's efficiency and accuracy depend upon the correctness and quality of data collected. So the data should be clear as possible for better results. Depending on the hashtag entered by the user we will get the most popular and recent tweets.</a:t>
+            </a:r>
+            <a:endParaRPr lang="en-US" sz="2400" smtClean="0">
               <a:latin typeface="Times New Roman" panose="02020603050405020304" pitchFamily="18" charset="0"/>
               <a:cs typeface="Times New Roman" panose="02020603050405020304" pitchFamily="18" charset="0"/>
             </a:endParaRPr>
@@ -8012,7 +7992,7 @@
                 <a:latin typeface="Times New Roman" panose="02020603050405020304" pitchFamily="18" charset="0"/>
                 <a:cs typeface="Times New Roman" panose="02020603050405020304" pitchFamily="18" charset="0"/>
               </a:rPr>
-              <a:t>Collecting the data is one task and making that data useful is an-other vital task. </a:t>
+              <a:t>Collection of data is one task and making that data as meaningful is another vital task. Data collected from various means will be in an unorganized format and there may be a lot of null values, invalid data values, and unwanted data. </a:t>
             </a:r>
             <a:endParaRPr lang="en-US" sz="2200" dirty="0" smtClean="0">
               <a:latin typeface="Times New Roman" panose="02020603050405020304" pitchFamily="18" charset="0"/>
@@ -8026,7 +8006,7 @@
                 <a:latin typeface="Times New Roman" panose="02020603050405020304" pitchFamily="18" charset="0"/>
                 <a:cs typeface="Times New Roman" panose="02020603050405020304" pitchFamily="18" charset="0"/>
               </a:rPr>
-              <a:t>Data collected from various means will be in an unorganized format and there may be lot of null values, in-valid data values and unwanted data. </a:t>
+              <a:t>Cleaning all those data and replacing them with appropriate or approximate data and removing null and missing data and replacing them with some fixed alternate values are the basic steps in pre-processing of data. </a:t>
             </a:r>
             <a:endParaRPr lang="en-US" sz="2200" dirty="0" smtClean="0">
               <a:latin typeface="Times New Roman" panose="02020603050405020304" pitchFamily="18" charset="0"/>
@@ -8040,7 +8020,7 @@
                 <a:latin typeface="Times New Roman" panose="02020603050405020304" pitchFamily="18" charset="0"/>
                 <a:cs typeface="Times New Roman" panose="02020603050405020304" pitchFamily="18" charset="0"/>
               </a:rPr>
-              <a:t>Cleaning all these data and replacing them with appropriate or approximate data and removing null and missing data and replacing them with some fixed alternate values are the basic steps in pre processing of data. </a:t>
+              <a:t>Even data collected may contain completely garbage values. It may not be in the exact format or the way that is meant to be. </a:t>
             </a:r>
             <a:endParaRPr lang="en-US" sz="2200" dirty="0" smtClean="0">
               <a:latin typeface="Times New Roman" panose="02020603050405020304" pitchFamily="18" charset="0"/>
@@ -8054,22 +8034,8 @@
                 <a:latin typeface="Times New Roman" panose="02020603050405020304" pitchFamily="18" charset="0"/>
                 <a:cs typeface="Times New Roman" panose="02020603050405020304" pitchFamily="18" charset="0"/>
               </a:rPr>
-              <a:t>Even data collected may contain completely garbage values. It may not be in exact format or way that is meant to be. All such cases must be verified and replaced with alternate values to make data meaning meaningful and useful for further processing. Data must be kept in a organized format. </a:t>
-            </a:r>
-            <a:endParaRPr lang="en-US" sz="2200" dirty="0" smtClean="0">
-              <a:latin typeface="Times New Roman" panose="02020603050405020304" pitchFamily="18" charset="0"/>
-              <a:cs typeface="Times New Roman" panose="02020603050405020304" pitchFamily="18" charset="0"/>
-            </a:endParaRPr>
-          </a:p>
-          <a:p>
-            <a:pPr algn="just"/>
-            <a:endParaRPr lang="en-US" sz="2200" dirty="0" smtClean="0">
-              <a:latin typeface="Times New Roman" panose="02020603050405020304" pitchFamily="18" charset="0"/>
-              <a:cs typeface="Times New Roman" panose="02020603050405020304" pitchFamily="18" charset="0"/>
-            </a:endParaRPr>
-          </a:p>
-          <a:p>
-            <a:pPr algn="just"/>
+              <a:t>All those cases should be verified and replaced with some other alternate values to make the data meaningful and useful for further processing. Data must be kept in an organized format. So here we have used some regex expressions to clean data.</a:t>
+            </a:r>
             <a:endParaRPr lang="en-US" sz="2200" dirty="0">
               <a:latin typeface="Times New Roman" panose="02020603050405020304" pitchFamily="18" charset="0"/>
               <a:cs typeface="Times New Roman" panose="02020603050405020304" pitchFamily="18" charset="0"/>
@@ -11892,7 +11858,7 @@
                 <a:latin typeface="Times New Roman" panose="02020603050405020304" pitchFamily="18" charset="0"/>
                 <a:cs typeface="Times New Roman" panose="02020603050405020304" pitchFamily="18" charset="0"/>
               </a:rPr>
-              <a:t>Hard Disk - 500 GB</a:t>
+              <a:t>Hard Disk - 80 GB </a:t>
             </a:r>
             <a:endParaRPr lang="en-US" sz="2100" dirty="0" smtClean="0">
               <a:latin typeface="Times New Roman" panose="02020603050405020304" pitchFamily="18" charset="0"/>
@@ -11900,7 +11866,9 @@
             </a:endParaRPr>
           </a:p>
           <a:p>
-            <a:pPr>
+            <a:pPr marL="109855" indent="0">
+              <a:buClrTx/>
+              <a:buFont typeface="Wingdings" panose="05000000000000000000" pitchFamily="2" charset="2"/>
               <a:buNone/>
             </a:pPr>
             <a:endParaRPr lang="en-US" sz="2100" b="1" dirty="0" smtClean="0">
@@ -11990,24 +11958,6 @@
                 <a:cs typeface="Times New Roman" panose="02020603050405020304" pitchFamily="18" charset="0"/>
               </a:rPr>
               <a:t>Twitter API Credentials</a:t>
-            </a:r>
-            <a:endParaRPr lang="en-US" sz="2100" dirty="0" smtClean="0">
-              <a:latin typeface="Times New Roman" panose="02020603050405020304" pitchFamily="18" charset="0"/>
-              <a:cs typeface="Times New Roman" panose="02020603050405020304" pitchFamily="18" charset="0"/>
-            </a:endParaRPr>
-          </a:p>
-          <a:p>
-            <a:pPr>
-              <a:buClrTx/>
-              <a:buFont typeface="Wingdings" panose="05000000000000000000" pitchFamily="2" charset="2"/>
-              <a:buChar char="§"/>
-            </a:pPr>
-            <a:r>
-              <a:rPr lang="en-US" sz="2100" dirty="0" smtClean="0">
-                <a:latin typeface="Times New Roman" panose="02020603050405020304" pitchFamily="18" charset="0"/>
-                <a:cs typeface="Times New Roman" panose="02020603050405020304" pitchFamily="18" charset="0"/>
-              </a:rPr>
-              <a:t>Additional :  Heroku Account</a:t>
             </a:r>
             <a:endParaRPr lang="en-US" sz="2100" dirty="0" smtClean="0">
               <a:latin typeface="Times New Roman" panose="02020603050405020304" pitchFamily="18" charset="0"/>
@@ -12179,12 +12129,7 @@
             <p:ph type="title"/>
           </p:nvPr>
         </p:nvSpPr>
-        <p:spPr>
-          <a:xfrm>
-            <a:off x="357158" y="0"/>
-            <a:ext cx="8229600" cy="1143000"/>
-          </a:xfrm>
-        </p:spPr>
+        <p:spPr/>
         <p:txBody>
           <a:bodyPr>
             <a:normAutofit/>
@@ -12205,9 +12150,30 @@
           </a:p>
         </p:txBody>
       </p:sp>
+      <p:sp>
+        <p:nvSpPr>
+          <p:cNvPr id="2" name="Slide Number Placeholder 1"/>
+          <p:cNvSpPr>
+            <a:spLocks noGrp="1"/>
+          </p:cNvSpPr>
+          <p:nvPr>
+            <p:ph type="sldNum" sz="quarter" idx="12"/>
+          </p:nvPr>
+        </p:nvSpPr>
+        <p:spPr/>
+        <p:txBody>
+          <a:bodyPr/>
+          <a:p>
+            <a:fld id="{6AC1B37A-5BC2-4299-A427-7A619A58F75A}" type="slidenum">
+              <a:rPr lang="en-US" smtClean="0"/>
+            </a:fld>
+            <a:endParaRPr lang="en-US"/>
+          </a:p>
+        </p:txBody>
+      </p:sp>
       <p:pic>
         <p:nvPicPr>
-          <p:cNvPr id="12" name="Content Placeholder 3"/>
+          <p:cNvPr id="5" name="Content Placeholder 4" descr="NLP Analysis  Latest"/>
           <p:cNvPicPr>
             <a:picLocks noChangeAspect="1"/>
           </p:cNvPicPr>
@@ -12223,35 +12189,14 @@
         </p:blipFill>
         <p:spPr>
           <a:xfrm>
-            <a:off x="990600" y="1600200"/>
-            <a:ext cx="7297420" cy="4329430"/>
+            <a:off x="1032510" y="1417955"/>
+            <a:ext cx="7339330" cy="4615815"/>
           </a:xfrm>
           <a:prstGeom prst="rect">
             <a:avLst/>
           </a:prstGeom>
         </p:spPr>
       </p:pic>
-      <p:sp>
-        <p:nvSpPr>
-          <p:cNvPr id="2" name="Slide Number Placeholder 1"/>
-          <p:cNvSpPr>
-            <a:spLocks noGrp="1"/>
-          </p:cNvSpPr>
-          <p:nvPr>
-            <p:ph type="sldNum" sz="quarter" idx="12"/>
-          </p:nvPr>
-        </p:nvSpPr>
-        <p:spPr/>
-        <p:txBody>
-          <a:bodyPr/>
-          <a:p>
-            <a:fld id="{6AC1B37A-5BC2-4299-A427-7A619A58F75A}" type="slidenum">
-              <a:rPr lang="en-US" smtClean="0"/>
-            </a:fld>
-            <a:endParaRPr lang="en-US"/>
-          </a:p>
-        </p:txBody>
-      </p:sp>
     </p:spTree>
   </p:cSld>
   <p:clrMapOvr>

</xml_diff>

<commit_message>
Documents and PPT fixed
</commit_message>
<xml_diff>
--- a/Documents/D2_VIVA_FINAL_PPT.pptx
+++ b/Documents/D2_VIVA_FINAL_PPT.pptx
@@ -8,7 +8,7 @@
     <p:notesMasterId r:id="rId4"/>
   </p:notesMasterIdLst>
   <p:handoutMasterIdLst>
-    <p:handoutMasterId r:id="rId32"/>
+    <p:handoutMasterId r:id="rId30"/>
   </p:handoutMasterIdLst>
   <p:sldIdLst>
     <p:sldId id="256" r:id="rId3"/>
@@ -27,18 +27,16 @@
     <p:sldId id="269" r:id="rId17"/>
     <p:sldId id="270" r:id="rId18"/>
     <p:sldId id="271" r:id="rId19"/>
-    <p:sldId id="277" r:id="rId20"/>
-    <p:sldId id="278" r:id="rId21"/>
-    <p:sldId id="279" r:id="rId22"/>
-    <p:sldId id="287" r:id="rId23"/>
-    <p:sldId id="288" r:id="rId24"/>
-    <p:sldId id="289" r:id="rId25"/>
-    <p:sldId id="299" r:id="rId26"/>
-    <p:sldId id="303" r:id="rId27"/>
-    <p:sldId id="304" r:id="rId28"/>
-    <p:sldId id="272" r:id="rId29"/>
-    <p:sldId id="273" r:id="rId30"/>
-    <p:sldId id="274" r:id="rId31"/>
+    <p:sldId id="278" r:id="rId20"/>
+    <p:sldId id="279" r:id="rId21"/>
+    <p:sldId id="287" r:id="rId22"/>
+    <p:sldId id="288" r:id="rId23"/>
+    <p:sldId id="289" r:id="rId24"/>
+    <p:sldId id="299" r:id="rId25"/>
+    <p:sldId id="303" r:id="rId26"/>
+    <p:sldId id="304" r:id="rId27"/>
+    <p:sldId id="272" r:id="rId28"/>
+    <p:sldId id="274" r:id="rId29"/>
   </p:sldIdLst>
   <p:sldSz cx="9144000" cy="6858000" type="screen4x3"/>
   <p:notesSz cx="6858000" cy="9144000"/>
@@ -1818,136 +1816,6 @@
 </file>
 
 <file path=ppt/notesSlides/notesSlide26.xml><?xml version="1.0" encoding="utf-8"?>
-<p:notes xmlns:a="http://schemas.openxmlformats.org/drawingml/2006/main" xmlns:r="http://schemas.openxmlformats.org/officeDocument/2006/relationships" xmlns:p="http://schemas.openxmlformats.org/presentationml/2006/main">
-  <p:cSld>
-    <p:spTree>
-      <p:nvGrpSpPr>
-        <p:cNvPr id="1" name=""/>
-        <p:cNvGrpSpPr/>
-        <p:nvPr/>
-      </p:nvGrpSpPr>
-      <p:grpSpPr/>
-      <p:sp>
-        <p:nvSpPr>
-          <p:cNvPr id="2" name="Slide Image Placeholder 1"/>
-          <p:cNvSpPr/>
-          <p:nvPr>
-            <p:ph type="sldImg" idx="2"/>
-          </p:nvPr>
-        </p:nvSpPr>
-        <p:spPr/>
-      </p:sp>
-      <p:sp>
-        <p:nvSpPr>
-          <p:cNvPr id="3" name="Text Placeholder 2"/>
-          <p:cNvSpPr/>
-          <p:nvPr>
-            <p:ph type="body" idx="3"/>
-          </p:nvPr>
-        </p:nvSpPr>
-        <p:spPr/>
-        <p:txBody>
-          <a:bodyPr/>
-          <a:p>
-            <a:endParaRPr lang="en-US"/>
-          </a:p>
-        </p:txBody>
-      </p:sp>
-      <p:sp>
-        <p:nvSpPr>
-          <p:cNvPr id="4" name="Slide Number Placeholder 3"/>
-          <p:cNvSpPr>
-            <a:spLocks noGrp="1"/>
-          </p:cNvSpPr>
-          <p:nvPr>
-            <p:ph type="sldNum" sz="quarter" idx="5"/>
-          </p:nvPr>
-        </p:nvSpPr>
-        <p:spPr/>
-        <p:txBody>
-          <a:bodyPr/>
-          <a:p>
-            <a:fld id="{21B2AA4F-B828-4D7C-AFD3-893933DAFCB4}" type="slidenum">
-              <a:rPr lang="en-US" smtClean="0"/>
-            </a:fld>
-            <a:endParaRPr lang="en-US"/>
-          </a:p>
-        </p:txBody>
-      </p:sp>
-    </p:spTree>
-  </p:cSld>
-  <p:clrMapOvr>
-    <a:masterClrMapping/>
-  </p:clrMapOvr>
-</p:notes>
-</file>
-
-<file path=ppt/notesSlides/notesSlide27.xml><?xml version="1.0" encoding="utf-8"?>
-<p:notes xmlns:a="http://schemas.openxmlformats.org/drawingml/2006/main" xmlns:r="http://schemas.openxmlformats.org/officeDocument/2006/relationships" xmlns:p="http://schemas.openxmlformats.org/presentationml/2006/main">
-  <p:cSld>
-    <p:spTree>
-      <p:nvGrpSpPr>
-        <p:cNvPr id="1" name=""/>
-        <p:cNvGrpSpPr/>
-        <p:nvPr/>
-      </p:nvGrpSpPr>
-      <p:grpSpPr/>
-      <p:sp>
-        <p:nvSpPr>
-          <p:cNvPr id="2" name="Slide Image Placeholder 1"/>
-          <p:cNvSpPr/>
-          <p:nvPr>
-            <p:ph type="sldImg" idx="2"/>
-          </p:nvPr>
-        </p:nvSpPr>
-        <p:spPr/>
-      </p:sp>
-      <p:sp>
-        <p:nvSpPr>
-          <p:cNvPr id="3" name="Text Placeholder 2"/>
-          <p:cNvSpPr/>
-          <p:nvPr>
-            <p:ph type="body" idx="3"/>
-          </p:nvPr>
-        </p:nvSpPr>
-        <p:spPr/>
-        <p:txBody>
-          <a:bodyPr/>
-          <a:p>
-            <a:endParaRPr lang="en-US"/>
-          </a:p>
-        </p:txBody>
-      </p:sp>
-      <p:sp>
-        <p:nvSpPr>
-          <p:cNvPr id="4" name="Slide Number Placeholder 3"/>
-          <p:cNvSpPr>
-            <a:spLocks noGrp="1"/>
-          </p:cNvSpPr>
-          <p:nvPr>
-            <p:ph type="sldNum" sz="quarter" idx="5"/>
-          </p:nvPr>
-        </p:nvSpPr>
-        <p:spPr/>
-        <p:txBody>
-          <a:bodyPr/>
-          <a:p>
-            <a:fld id="{21B2AA4F-B828-4D7C-AFD3-893933DAFCB4}" type="slidenum">
-              <a:rPr lang="en-US" smtClean="0"/>
-            </a:fld>
-            <a:endParaRPr lang="en-US"/>
-          </a:p>
-        </p:txBody>
-      </p:sp>
-    </p:spTree>
-  </p:cSld>
-  <p:clrMapOvr>
-    <a:masterClrMapping/>
-  </p:clrMapOvr>
-</p:notes>
-</file>
-
-<file path=ppt/notesSlides/notesSlide28.xml><?xml version="1.0" encoding="utf-8"?>
 <p:notes xmlns:a="http://schemas.openxmlformats.org/drawingml/2006/main" xmlns:r="http://schemas.openxmlformats.org/officeDocument/2006/relationships" xmlns:p="http://schemas.openxmlformats.org/presentationml/2006/main">
   <p:cSld>
     <p:spTree>
@@ -8171,6 +8039,13 @@
           </a:p>
           <a:p>
             <a:pPr algn="just"/>
+            <a:endParaRPr lang="en-US" sz="1800" dirty="0">
+              <a:latin typeface="Times New Roman" panose="02020603050405020304" pitchFamily="18" charset="0"/>
+              <a:cs typeface="Times New Roman" panose="02020603050405020304" pitchFamily="18" charset="0"/>
+            </a:endParaRPr>
+          </a:p>
+          <a:p>
+            <a:pPr algn="just"/>
             <a:r>
               <a:rPr lang="en-US" sz="1800" dirty="0">
                 <a:latin typeface="Times New Roman" panose="02020603050405020304" pitchFamily="18" charset="0"/>
@@ -8287,95 +8162,115 @@
             <p:ph idx="1"/>
           </p:nvPr>
         </p:nvSpPr>
-        <p:spPr>
-          <a:xfrm>
-            <a:off x="500034" y="1571612"/>
-            <a:ext cx="8229600" cy="4525963"/>
-          </a:xfrm>
-        </p:spPr>
-        <p:txBody>
-          <a:bodyPr>
-            <a:noAutofit/>
-          </a:bodyPr>
+        <p:spPr/>
+        <p:txBody>
+          <a:bodyPr/>
           <a:lstStyle/>
           <a:p>
-            <a:pPr algn="just"/>
-            <a:r>
-              <a:rPr lang="en-US" sz="2000" dirty="0" smtClean="0">
+            <a:pPr lvl="0"/>
+            <a:r>
+              <a:rPr lang="en-US" sz="2400" dirty="0" smtClean="0">
                 <a:latin typeface="Times New Roman" panose="02020603050405020304" pitchFamily="18" charset="0"/>
                 <a:cs typeface="Times New Roman" panose="02020603050405020304" pitchFamily="18" charset="0"/>
               </a:rPr>
-              <a:t>Testing is a process of executing a program with the intent of finding an error. A successful test is one that uncovers an as-yet- undiscovered error. System testing is the stage of implementation, which is aimed at ensuring that the system works accurately and efficiently as expected before live operation commences. </a:t>
-            </a:r>
-            <a:endParaRPr lang="en-US" sz="2000" dirty="0" smtClean="0">
+              <a:t>Social media monitoring</a:t>
+            </a:r>
+            <a:endParaRPr lang="en-US" sz="2400" dirty="0" smtClean="0">
               <a:latin typeface="Times New Roman" panose="02020603050405020304" pitchFamily="18" charset="0"/>
               <a:cs typeface="Times New Roman" panose="02020603050405020304" pitchFamily="18" charset="0"/>
             </a:endParaRPr>
           </a:p>
           <a:p>
-            <a:pPr algn="just"/>
-            <a:r>
-              <a:rPr lang="en-US" sz="2000" dirty="0" smtClean="0">
+            <a:pPr marL="567055" lvl="1" indent="0">
+              <a:buNone/>
+            </a:pPr>
+            <a:r>
+              <a:rPr lang="en-US" sz="1800" dirty="0" smtClean="0">
                 <a:latin typeface="Times New Roman" panose="02020603050405020304" pitchFamily="18" charset="0"/>
                 <a:cs typeface="Times New Roman" panose="02020603050405020304" pitchFamily="18" charset="0"/>
               </a:rPr>
-              <a:t>The software testing process commences once the program is created and the documentation and related data structures are designed. Otherwise the program or the project is not said to be complete. A good test case design is one that as a probability of finding an yet undiscovered error. A successful test is one that uncovers an yet undiscovered error. Any engineering product can be tested in one of the two ways:</a:t>
-            </a:r>
-            <a:endParaRPr lang="en-US" sz="2000" dirty="0" smtClean="0">
+              <a:t>Social media posts often present some of the most truthful points of view about products, services, and businesses because users offer their opinions unsolicited. They are simply compelled to tell the world how they feel. </a:t>
+            </a:r>
+            <a:endParaRPr lang="en-US" sz="1800" dirty="0" smtClean="0">
               <a:latin typeface="Times New Roman" panose="02020603050405020304" pitchFamily="18" charset="0"/>
               <a:cs typeface="Times New Roman" panose="02020603050405020304" pitchFamily="18" charset="0"/>
             </a:endParaRPr>
           </a:p>
           <a:p>
-            <a:pPr lvl="1" algn="just"/>
-            <a:r>
-              <a:rPr lang="en-US" sz="1700" dirty="0" smtClean="0">
+            <a:pPr lvl="0"/>
+            <a:r>
+              <a:rPr lang="en-US" sz="2400" dirty="0" smtClean="0">
                 <a:latin typeface="Times New Roman" panose="02020603050405020304" pitchFamily="18" charset="0"/>
                 <a:cs typeface="Times New Roman" panose="02020603050405020304" pitchFamily="18" charset="0"/>
               </a:rPr>
-              <a:t>Black Box testing - without knowledge of internal structure</a:t>
-            </a:r>
-            <a:endParaRPr lang="en-US" sz="1700" dirty="0" smtClean="0">
+              <a:t>Customer feedback</a:t>
+            </a:r>
+            <a:endParaRPr lang="en-US" sz="2400" dirty="0" smtClean="0">
               <a:latin typeface="Times New Roman" panose="02020603050405020304" pitchFamily="18" charset="0"/>
               <a:cs typeface="Times New Roman" panose="02020603050405020304" pitchFamily="18" charset="0"/>
             </a:endParaRPr>
           </a:p>
           <a:p>
-            <a:pPr lvl="1" algn="just"/>
-            <a:r>
-              <a:rPr lang="en-IN" sz="1700" dirty="0" smtClean="0">
+            <a:pPr marL="567055" lvl="1" indent="0">
+              <a:buNone/>
+            </a:pPr>
+            <a:r>
+              <a:rPr lang="en-US" sz="1800" dirty="0" smtClean="0">
                 <a:latin typeface="Times New Roman" panose="02020603050405020304" pitchFamily="18" charset="0"/>
                 <a:cs typeface="Times New Roman" panose="02020603050405020304" pitchFamily="18" charset="0"/>
               </a:rPr>
-              <a:t>White Box testing</a:t>
-            </a:r>
-            <a:r>
-              <a:rPr lang="en-US" altLang="en-IN" sz="1700" dirty="0" smtClean="0">
+              <a:t>Sentiment analysis can also be used to gain insights from the troves of customer feedback available (online reviews, social media, surveys) and save hundreds of employee hours.</a:t>
+            </a:r>
+            <a:endParaRPr lang="en-US" sz="1800" dirty="0" smtClean="0">
+              <a:latin typeface="Times New Roman" panose="02020603050405020304" pitchFamily="18" charset="0"/>
+              <a:cs typeface="Times New Roman" panose="02020603050405020304" pitchFamily="18" charset="0"/>
+            </a:endParaRPr>
+          </a:p>
+          <a:p>
+            <a:pPr lvl="0"/>
+            <a:r>
+              <a:rPr lang="en-US" sz="2400" dirty="0" smtClean="0">
                 <a:latin typeface="Times New Roman" panose="02020603050405020304" pitchFamily="18" charset="0"/>
                 <a:cs typeface="Times New Roman" panose="02020603050405020304" pitchFamily="18" charset="0"/>
               </a:rPr>
-              <a:t> - </a:t>
-            </a:r>
-            <a:r>
-              <a:rPr lang="en-US" sz="1700" dirty="0" smtClean="0">
-                <a:latin typeface="Times New Roman" panose="02020603050405020304" pitchFamily="18" charset="0"/>
-                <a:cs typeface="Times New Roman" panose="02020603050405020304" pitchFamily="18" charset="0"/>
-                <a:sym typeface="+mn-ea"/>
-              </a:rPr>
-              <a:t>with knowledge of internal structure</a:t>
-            </a:r>
-            <a:endParaRPr lang="en-US" sz="1700" dirty="0" smtClean="0">
+              <a:t>Customer support</a:t>
+            </a:r>
+            <a:endParaRPr lang="en-US" sz="2400" dirty="0" smtClean="0">
               <a:latin typeface="Times New Roman" panose="02020603050405020304" pitchFamily="18" charset="0"/>
               <a:cs typeface="Times New Roman" panose="02020603050405020304" pitchFamily="18" charset="0"/>
             </a:endParaRPr>
           </a:p>
           <a:p>
-            <a:pPr lvl="1" algn="just"/>
-            <a:endParaRPr lang="en-US" sz="1700" dirty="0">
+            <a:pPr marL="567055" lvl="1" indent="0">
+              <a:buNone/>
+            </a:pPr>
+            <a:r>
+              <a:rPr lang="en-US" sz="1800" dirty="0" smtClean="0">
+                <a:latin typeface="Times New Roman" panose="02020603050405020304" pitchFamily="18" charset="0"/>
+                <a:cs typeface="Times New Roman" panose="02020603050405020304" pitchFamily="18" charset="0"/>
+              </a:rPr>
+              <a:t>Customer support management presents many challenges due to the sheer number of requests, varied topics, and diverse branches within a company – not to mention the urgency of any given request.</a:t>
+            </a:r>
+            <a:br>
+              <a:rPr lang="en-US" sz="1800" dirty="0" smtClean="0">
+                <a:latin typeface="Times New Roman" panose="02020603050405020304" pitchFamily="18" charset="0"/>
+                <a:cs typeface="Times New Roman" panose="02020603050405020304" pitchFamily="18" charset="0"/>
+              </a:rPr>
+            </a:br>
+            <a:endParaRPr lang="en-US" sz="1800" dirty="0" smtClean="0">
               <a:latin typeface="Times New Roman" panose="02020603050405020304" pitchFamily="18" charset="0"/>
               <a:cs typeface="Times New Roman" panose="02020603050405020304" pitchFamily="18" charset="0"/>
             </a:endParaRPr>
           </a:p>
+          <a:p>
+            <a:pPr marL="109855" lvl="0" indent="0">
+              <a:buNone/>
+            </a:pPr>
+            <a:endParaRPr lang="en-US" sz="775" dirty="0" smtClean="0"/>
+          </a:p>
+          <a:p>
+            <a:endParaRPr lang="en-US" sz="775" dirty="0" smtClean="0"/>
+          </a:p>
         </p:txBody>
       </p:sp>
       <p:sp>
@@ -8395,7 +8290,7 @@
           <a:p>
             <a:r>
               <a:rPr lang="en-IN" dirty="0" smtClean="0"/>
-              <a:t>TESTING</a:t>
+              <a:t>APPLICATIONS</a:t>
             </a:r>
             <a:endParaRPr lang="en-US" dirty="0"/>
           </a:p>
@@ -8459,18 +8354,20 @@
         </p:nvSpPr>
         <p:spPr/>
         <p:txBody>
-          <a:bodyPr/>
+          <a:bodyPr>
+            <a:noAutofit/>
+          </a:bodyPr>
           <a:lstStyle/>
           <a:p>
             <a:pPr lvl="0"/>
             <a:r>
-              <a:rPr lang="en-US" sz="2400" dirty="0" smtClean="0">
+              <a:rPr lang="en-US" sz="2000" dirty="0" smtClean="0">
                 <a:latin typeface="Times New Roman" panose="02020603050405020304" pitchFamily="18" charset="0"/>
                 <a:cs typeface="Times New Roman" panose="02020603050405020304" pitchFamily="18" charset="0"/>
               </a:rPr>
-              <a:t>Social media monitoring</a:t>
-            </a:r>
-            <a:endParaRPr lang="en-US" sz="2400" dirty="0" smtClean="0">
+              <a:t>1) Emotion Detection</a:t>
+            </a:r>
+            <a:endParaRPr lang="en-US" sz="2000" dirty="0" smtClean="0">
               <a:latin typeface="Times New Roman" panose="02020603050405020304" pitchFamily="18" charset="0"/>
               <a:cs typeface="Times New Roman" panose="02020603050405020304" pitchFamily="18" charset="0"/>
             </a:endParaRPr>
@@ -8484,7 +8381,7 @@
                 <a:latin typeface="Times New Roman" panose="02020603050405020304" pitchFamily="18" charset="0"/>
                 <a:cs typeface="Times New Roman" panose="02020603050405020304" pitchFamily="18" charset="0"/>
               </a:rPr>
-              <a:t>Social media posts often present some of the most truthful points of view about products, services, and businesses because users offer their opinions unsolicited. They are simply compelled to tell the world how they feel. </a:t>
+              <a:t>This sentiment analysis model detects the emotions that underlie a text. It makes associations between words and emotions like anger, happiness, frustration, etc. For example,</a:t>
             </a:r>
             <a:endParaRPr lang="en-US" sz="1800" dirty="0" smtClean="0">
               <a:latin typeface="Times New Roman" panose="02020603050405020304" pitchFamily="18" charset="0"/>
@@ -8492,20 +8389,6 @@
             </a:endParaRPr>
           </a:p>
           <a:p>
-            <a:pPr lvl="0"/>
-            <a:r>
-              <a:rPr lang="en-US" sz="2400" dirty="0" smtClean="0">
-                <a:latin typeface="Times New Roman" panose="02020603050405020304" pitchFamily="18" charset="0"/>
-                <a:cs typeface="Times New Roman" panose="02020603050405020304" pitchFamily="18" charset="0"/>
-              </a:rPr>
-              <a:t>Customer feedback</a:t>
-            </a:r>
-            <a:endParaRPr lang="en-US" sz="2400" dirty="0" smtClean="0">
-              <a:latin typeface="Times New Roman" panose="02020603050405020304" pitchFamily="18" charset="0"/>
-              <a:cs typeface="Times New Roman" panose="02020603050405020304" pitchFamily="18" charset="0"/>
-            </a:endParaRPr>
-          </a:p>
-          <a:p>
             <a:pPr marL="567055" lvl="1" indent="0">
               <a:buNone/>
             </a:pPr>
@@ -8514,7 +8397,7 @@
                 <a:latin typeface="Times New Roman" panose="02020603050405020304" pitchFamily="18" charset="0"/>
                 <a:cs typeface="Times New Roman" panose="02020603050405020304" pitchFamily="18" charset="0"/>
               </a:rPr>
-              <a:t>Sentiment analysis can also be used to gain insights from the troves of customer feedback available (online reviews, social media, surveys) and save hundreds of employee hours.</a:t>
+              <a:t>'Hubspot makes my day a lot easier :)' → Happiness</a:t>
             </a:r>
             <a:endParaRPr lang="en-US" sz="1800" dirty="0" smtClean="0">
               <a:latin typeface="Times New Roman" panose="02020603050405020304" pitchFamily="18" charset="0"/>
@@ -8522,20 +8405,6 @@
             </a:endParaRPr>
           </a:p>
           <a:p>
-            <a:pPr lvl="0"/>
-            <a:r>
-              <a:rPr lang="en-US" sz="2400" dirty="0" smtClean="0">
-                <a:latin typeface="Times New Roman" panose="02020603050405020304" pitchFamily="18" charset="0"/>
-                <a:cs typeface="Times New Roman" panose="02020603050405020304" pitchFamily="18" charset="0"/>
-              </a:rPr>
-              <a:t>Customer support</a:t>
-            </a:r>
-            <a:endParaRPr lang="en-US" sz="2400" dirty="0" smtClean="0">
-              <a:latin typeface="Times New Roman" panose="02020603050405020304" pitchFamily="18" charset="0"/>
-              <a:cs typeface="Times New Roman" panose="02020603050405020304" pitchFamily="18" charset="0"/>
-            </a:endParaRPr>
-          </a:p>
-          <a:p>
             <a:pPr marL="567055" lvl="1" indent="0">
               <a:buNone/>
             </a:pPr>
@@ -8544,27 +8413,69 @@
                 <a:latin typeface="Times New Roman" panose="02020603050405020304" pitchFamily="18" charset="0"/>
                 <a:cs typeface="Times New Roman" panose="02020603050405020304" pitchFamily="18" charset="0"/>
               </a:rPr>
-              <a:t>Customer support management presents many challenges due to the sheer number of requests, varied topics, and diverse branches within a company – not to mention the urgency of any given request.</a:t>
-            </a:r>
-            <a:br>
+              <a:t>'Your customer service is a nightmare! Totally useless!!' → Anger</a:t>
+            </a:r>
+            <a:endParaRPr lang="en-US" sz="1800" dirty="0" smtClean="0">
+              <a:latin typeface="Times New Roman" panose="02020603050405020304" pitchFamily="18" charset="0"/>
+              <a:cs typeface="Times New Roman" panose="02020603050405020304" pitchFamily="18" charset="0"/>
+            </a:endParaRPr>
+          </a:p>
+          <a:p>
+            <a:pPr marL="109855" lvl="0" indent="0">
+              <a:buNone/>
+            </a:pPr>
+            <a:endParaRPr lang="en-US" sz="2000" dirty="0" smtClean="0">
+              <a:latin typeface="Times New Roman" panose="02020603050405020304" pitchFamily="18" charset="0"/>
+              <a:cs typeface="Times New Roman" panose="02020603050405020304" pitchFamily="18" charset="0"/>
+            </a:endParaRPr>
+          </a:p>
+          <a:p>
+            <a:pPr lvl="0"/>
+            <a:r>
+              <a:rPr lang="en-US" sz="2000" dirty="0" smtClean="0">
+                <a:latin typeface="Times New Roman" panose="02020603050405020304" pitchFamily="18" charset="0"/>
+                <a:cs typeface="Times New Roman" panose="02020603050405020304" pitchFamily="18" charset="0"/>
+              </a:rPr>
+              <a:t>2) Aspect-based Sentiment Analysis</a:t>
+            </a:r>
+            <a:endParaRPr lang="en-US" sz="2000" dirty="0" smtClean="0">
+              <a:latin typeface="Times New Roman" panose="02020603050405020304" pitchFamily="18" charset="0"/>
+              <a:cs typeface="Times New Roman" panose="02020603050405020304" pitchFamily="18" charset="0"/>
+            </a:endParaRPr>
+          </a:p>
+          <a:p>
+            <a:pPr marL="567055" lvl="1" indent="0">
+              <a:buNone/>
+            </a:pPr>
+            <a:r>
               <a:rPr lang="en-US" sz="1800" dirty="0" smtClean="0">
                 <a:latin typeface="Times New Roman" panose="02020603050405020304" pitchFamily="18" charset="0"/>
                 <a:cs typeface="Times New Roman" panose="02020603050405020304" pitchFamily="18" charset="0"/>
               </a:rPr>
-            </a:br>
+              <a:t>This type of sentiment analysis focuses on understanding the aspects or features that are being discussed in a given opinion. Product reviews, for example, are often composed of different opinions about different characteristics of a product, like Price, UX-UI, Integrations, Mobile Version, etc. </a:t>
+            </a:r>
             <a:endParaRPr lang="en-US" sz="1800" dirty="0" smtClean="0">
               <a:latin typeface="Times New Roman" panose="02020603050405020304" pitchFamily="18" charset="0"/>
               <a:cs typeface="Times New Roman" panose="02020603050405020304" pitchFamily="18" charset="0"/>
             </a:endParaRPr>
           </a:p>
           <a:p>
+            <a:pPr marL="567055" lvl="1" indent="0">
+              <a:buNone/>
+            </a:pPr>
+            <a:endParaRPr lang="en-US" sz="2000" dirty="0" smtClean="0">
+              <a:latin typeface="Times New Roman" panose="02020603050405020304" pitchFamily="18" charset="0"/>
+              <a:cs typeface="Times New Roman" panose="02020603050405020304" pitchFamily="18" charset="0"/>
+            </a:endParaRPr>
+          </a:p>
+          <a:p>
             <a:pPr marL="109855" lvl="0" indent="0">
               <a:buNone/>
             </a:pPr>
-            <a:endParaRPr lang="en-US" sz="775" dirty="0" smtClean="0"/>
-          </a:p>
-          <a:p>
-            <a:endParaRPr lang="en-US" sz="775" dirty="0" smtClean="0"/>
+            <a:endParaRPr lang="en-US" sz="2000" dirty="0" smtClean="0">
+              <a:latin typeface="Times New Roman" panose="02020603050405020304" pitchFamily="18" charset="0"/>
+              <a:cs typeface="Times New Roman" panose="02020603050405020304" pitchFamily="18" charset="0"/>
+            </a:endParaRPr>
           </a:p>
         </p:txBody>
       </p:sp>
@@ -8585,7 +8496,7 @@
           <a:p>
             <a:r>
               <a:rPr lang="en-IN" dirty="0" smtClean="0"/>
-              <a:t>APPLICATIONS</a:t>
+              <a:t>FUTURE ENHANCEMENTS</a:t>
             </a:r>
             <a:endParaRPr lang="en-US" dirty="0"/>
           </a:p>
@@ -8621,513 +8532,6 @@
 </file>
 
 <file path=ppt/slides/slide19.xml><?xml version="1.0" encoding="utf-8"?>
-<p:sld xmlns:a="http://schemas.openxmlformats.org/drawingml/2006/main" xmlns:r="http://schemas.openxmlformats.org/officeDocument/2006/relationships" xmlns:p="http://schemas.openxmlformats.org/presentationml/2006/main">
-  <p:cSld>
-    <p:spTree>
-      <p:nvGrpSpPr>
-        <p:cNvPr id="1" name=""/>
-        <p:cNvGrpSpPr/>
-        <p:nvPr/>
-      </p:nvGrpSpPr>
-      <p:grpSpPr>
-        <a:xfrm>
-          <a:off x="0" y="0"/>
-          <a:ext cx="0" cy="0"/>
-          <a:chOff x="0" y="0"/>
-          <a:chExt cx="0" cy="0"/>
-        </a:xfrm>
-      </p:grpSpPr>
-      <p:sp>
-        <p:nvSpPr>
-          <p:cNvPr id="2" name="Content Placeholder 1"/>
-          <p:cNvSpPr>
-            <a:spLocks noGrp="1"/>
-          </p:cNvSpPr>
-          <p:nvPr>
-            <p:ph idx="1"/>
-          </p:nvPr>
-        </p:nvSpPr>
-        <p:spPr/>
-        <p:txBody>
-          <a:bodyPr>
-            <a:noAutofit/>
-          </a:bodyPr>
-          <a:lstStyle/>
-          <a:p>
-            <a:pPr lvl="0"/>
-            <a:r>
-              <a:rPr lang="en-US" sz="2000" dirty="0" smtClean="0">
-                <a:latin typeface="Times New Roman" panose="02020603050405020304" pitchFamily="18" charset="0"/>
-                <a:cs typeface="Times New Roman" panose="02020603050405020304" pitchFamily="18" charset="0"/>
-              </a:rPr>
-              <a:t>1) Emotion Detection</a:t>
-            </a:r>
-            <a:endParaRPr lang="en-US" sz="2000" dirty="0" smtClean="0">
-              <a:latin typeface="Times New Roman" panose="02020603050405020304" pitchFamily="18" charset="0"/>
-              <a:cs typeface="Times New Roman" panose="02020603050405020304" pitchFamily="18" charset="0"/>
-            </a:endParaRPr>
-          </a:p>
-          <a:p>
-            <a:pPr marL="567055" lvl="1" indent="0">
-              <a:buNone/>
-            </a:pPr>
-            <a:r>
-              <a:rPr lang="en-US" sz="1800" dirty="0" smtClean="0">
-                <a:latin typeface="Times New Roman" panose="02020603050405020304" pitchFamily="18" charset="0"/>
-                <a:cs typeface="Times New Roman" panose="02020603050405020304" pitchFamily="18" charset="0"/>
-              </a:rPr>
-              <a:t>This sentiment analysis model detects the emotions that underlie a text. It makes associations between words and emotions like anger, happiness, frustration, etc. For example,</a:t>
-            </a:r>
-            <a:endParaRPr lang="en-US" sz="1800" dirty="0" smtClean="0">
-              <a:latin typeface="Times New Roman" panose="02020603050405020304" pitchFamily="18" charset="0"/>
-              <a:cs typeface="Times New Roman" panose="02020603050405020304" pitchFamily="18" charset="0"/>
-            </a:endParaRPr>
-          </a:p>
-          <a:p>
-            <a:pPr marL="567055" lvl="1" indent="0">
-              <a:buNone/>
-            </a:pPr>
-            <a:r>
-              <a:rPr lang="en-US" sz="1800" dirty="0" smtClean="0">
-                <a:latin typeface="Times New Roman" panose="02020603050405020304" pitchFamily="18" charset="0"/>
-                <a:cs typeface="Times New Roman" panose="02020603050405020304" pitchFamily="18" charset="0"/>
-              </a:rPr>
-              <a:t>'Hubspot makes my day a lot easier :)' → Happiness</a:t>
-            </a:r>
-            <a:endParaRPr lang="en-US" sz="1800" dirty="0" smtClean="0">
-              <a:latin typeface="Times New Roman" panose="02020603050405020304" pitchFamily="18" charset="0"/>
-              <a:cs typeface="Times New Roman" panose="02020603050405020304" pitchFamily="18" charset="0"/>
-            </a:endParaRPr>
-          </a:p>
-          <a:p>
-            <a:pPr marL="567055" lvl="1" indent="0">
-              <a:buNone/>
-            </a:pPr>
-            <a:r>
-              <a:rPr lang="en-US" sz="1800" dirty="0" smtClean="0">
-                <a:latin typeface="Times New Roman" panose="02020603050405020304" pitchFamily="18" charset="0"/>
-                <a:cs typeface="Times New Roman" panose="02020603050405020304" pitchFamily="18" charset="0"/>
-              </a:rPr>
-              <a:t>'Your customer service is a nightmare! Totally useless!!' → Anger</a:t>
-            </a:r>
-            <a:endParaRPr lang="en-US" sz="1800" dirty="0" smtClean="0">
-              <a:latin typeface="Times New Roman" panose="02020603050405020304" pitchFamily="18" charset="0"/>
-              <a:cs typeface="Times New Roman" panose="02020603050405020304" pitchFamily="18" charset="0"/>
-            </a:endParaRPr>
-          </a:p>
-          <a:p>
-            <a:pPr marL="109855" lvl="0" indent="0">
-              <a:buNone/>
-            </a:pPr>
-            <a:endParaRPr lang="en-US" sz="2000" dirty="0" smtClean="0">
-              <a:latin typeface="Times New Roman" panose="02020603050405020304" pitchFamily="18" charset="0"/>
-              <a:cs typeface="Times New Roman" panose="02020603050405020304" pitchFamily="18" charset="0"/>
-            </a:endParaRPr>
-          </a:p>
-          <a:p>
-            <a:pPr lvl="0"/>
-            <a:r>
-              <a:rPr lang="en-US" sz="2000" dirty="0" smtClean="0">
-                <a:latin typeface="Times New Roman" panose="02020603050405020304" pitchFamily="18" charset="0"/>
-                <a:cs typeface="Times New Roman" panose="02020603050405020304" pitchFamily="18" charset="0"/>
-              </a:rPr>
-              <a:t>2) Aspect-based Sentiment Analysis</a:t>
-            </a:r>
-            <a:endParaRPr lang="en-US" sz="2000" dirty="0" smtClean="0">
-              <a:latin typeface="Times New Roman" panose="02020603050405020304" pitchFamily="18" charset="0"/>
-              <a:cs typeface="Times New Roman" panose="02020603050405020304" pitchFamily="18" charset="0"/>
-            </a:endParaRPr>
-          </a:p>
-          <a:p>
-            <a:pPr marL="567055" lvl="1" indent="0">
-              <a:buNone/>
-            </a:pPr>
-            <a:r>
-              <a:rPr lang="en-US" sz="1800" dirty="0" smtClean="0">
-                <a:latin typeface="Times New Roman" panose="02020603050405020304" pitchFamily="18" charset="0"/>
-                <a:cs typeface="Times New Roman" panose="02020603050405020304" pitchFamily="18" charset="0"/>
-              </a:rPr>
-              <a:t>This type of sentiment analysis focuses on understanding the aspects or features that are being discussed in a given opinion. Product reviews, for example, are often composed of different opinions about different characteristics of a product, like Price, UX-UI, Integrations, Mobile Version, etc. </a:t>
-            </a:r>
-            <a:endParaRPr lang="en-US" sz="1800" dirty="0" smtClean="0">
-              <a:latin typeface="Times New Roman" panose="02020603050405020304" pitchFamily="18" charset="0"/>
-              <a:cs typeface="Times New Roman" panose="02020603050405020304" pitchFamily="18" charset="0"/>
-            </a:endParaRPr>
-          </a:p>
-          <a:p>
-            <a:pPr marL="567055" lvl="1" indent="0">
-              <a:buNone/>
-            </a:pPr>
-            <a:endParaRPr lang="en-US" sz="2000" dirty="0" smtClean="0">
-              <a:latin typeface="Times New Roman" panose="02020603050405020304" pitchFamily="18" charset="0"/>
-              <a:cs typeface="Times New Roman" panose="02020603050405020304" pitchFamily="18" charset="0"/>
-            </a:endParaRPr>
-          </a:p>
-          <a:p>
-            <a:pPr marL="109855" lvl="0" indent="0">
-              <a:buNone/>
-            </a:pPr>
-            <a:endParaRPr lang="en-US" sz="2000" dirty="0" smtClean="0">
-              <a:latin typeface="Times New Roman" panose="02020603050405020304" pitchFamily="18" charset="0"/>
-              <a:cs typeface="Times New Roman" panose="02020603050405020304" pitchFamily="18" charset="0"/>
-            </a:endParaRPr>
-          </a:p>
-        </p:txBody>
-      </p:sp>
-      <p:sp>
-        <p:nvSpPr>
-          <p:cNvPr id="3" name="Title 2"/>
-          <p:cNvSpPr>
-            <a:spLocks noGrp="1"/>
-          </p:cNvSpPr>
-          <p:nvPr>
-            <p:ph type="title"/>
-          </p:nvPr>
-        </p:nvSpPr>
-        <p:spPr/>
-        <p:txBody>
-          <a:bodyPr/>
-          <a:lstStyle/>
-          <a:p>
-            <a:r>
-              <a:rPr lang="en-IN" dirty="0" smtClean="0"/>
-              <a:t>FUTURE ENHANCEMENTS</a:t>
-            </a:r>
-            <a:endParaRPr lang="en-US" dirty="0"/>
-          </a:p>
-        </p:txBody>
-      </p:sp>
-      <p:sp>
-        <p:nvSpPr>
-          <p:cNvPr id="4" name="Slide Number Placeholder 3"/>
-          <p:cNvSpPr>
-            <a:spLocks noGrp="1"/>
-          </p:cNvSpPr>
-          <p:nvPr>
-            <p:ph type="sldNum" sz="quarter" idx="12"/>
-          </p:nvPr>
-        </p:nvSpPr>
-        <p:spPr/>
-        <p:txBody>
-          <a:bodyPr/>
-          <a:p>
-            <a:fld id="{6AC1B37A-5BC2-4299-A427-7A619A58F75A}" type="slidenum">
-              <a:rPr lang="en-US" smtClean="0"/>
-            </a:fld>
-            <a:endParaRPr lang="en-US"/>
-          </a:p>
-        </p:txBody>
-      </p:sp>
-    </p:spTree>
-  </p:cSld>
-  <p:clrMapOvr>
-    <a:masterClrMapping/>
-  </p:clrMapOvr>
-</p:sld>
-</file>
-
-<file path=ppt/slides/slide2.xml><?xml version="1.0" encoding="utf-8"?>
-<p:sld xmlns:a="http://schemas.openxmlformats.org/drawingml/2006/main" xmlns:r="http://schemas.openxmlformats.org/officeDocument/2006/relationships" xmlns:p="http://schemas.openxmlformats.org/presentationml/2006/main">
-  <p:cSld>
-    <p:spTree>
-      <p:nvGrpSpPr>
-        <p:cNvPr id="1" name=""/>
-        <p:cNvGrpSpPr/>
-        <p:nvPr/>
-      </p:nvGrpSpPr>
-      <p:grpSpPr>
-        <a:xfrm>
-          <a:off x="0" y="0"/>
-          <a:ext cx="0" cy="0"/>
-          <a:chOff x="0" y="0"/>
-          <a:chExt cx="0" cy="0"/>
-        </a:xfrm>
-      </p:grpSpPr>
-      <p:sp>
-        <p:nvSpPr>
-          <p:cNvPr id="2" name="Content Placeholder 1"/>
-          <p:cNvSpPr>
-            <a:spLocks noGrp="1"/>
-          </p:cNvSpPr>
-          <p:nvPr>
-            <p:ph idx="1"/>
-          </p:nvPr>
-        </p:nvSpPr>
-        <p:spPr>
-          <a:xfrm>
-            <a:off x="457200" y="1066800"/>
-            <a:ext cx="8229600" cy="5113020"/>
-          </a:xfrm>
-        </p:spPr>
-        <p:txBody>
-          <a:bodyPr>
-            <a:noAutofit/>
-          </a:bodyPr>
-          <a:lstStyle/>
-          <a:p>
-            <a:pPr marL="342900" lvl="0" indent="-342900" algn="just">
-              <a:lnSpc>
-                <a:spcPct val="90000"/>
-              </a:lnSpc>
-              <a:spcBef>
-                <a:spcPts val="750"/>
-              </a:spcBef>
-              <a:buClr>
-                <a:srgbClr val="1FAECD"/>
-              </a:buClr>
-              <a:buSzTx/>
-              <a:buFont typeface="Wingdings" panose="05000000000000000000" charset="0"/>
-              <a:buChar char="Ø"/>
-            </a:pPr>
-            <a:r>
-              <a:rPr lang="en-US" sz="2000" kern="0" smtClean="0">
-                <a:solidFill>
-                  <a:srgbClr val="000000"/>
-                </a:solidFill>
-                <a:latin typeface="Times New Roman" panose="02020603050405020304" pitchFamily="18" charset="0"/>
-                <a:cs typeface="Times New Roman" panose="02020603050405020304" pitchFamily="18" charset="0"/>
-              </a:rPr>
-              <a:t>Reviews act as a valuable source of information for decision-making. Online e-commerce sites have provided their users to make their opinion about products and services. </a:t>
-            </a:r>
-            <a:endParaRPr lang="en-US" sz="2000" kern="0" smtClean="0">
-              <a:solidFill>
-                <a:srgbClr val="000000"/>
-              </a:solidFill>
-              <a:latin typeface="Times New Roman" panose="02020603050405020304" pitchFamily="18" charset="0"/>
-              <a:cs typeface="Times New Roman" panose="02020603050405020304" pitchFamily="18" charset="0"/>
-            </a:endParaRPr>
-          </a:p>
-          <a:p>
-            <a:pPr marL="342900" lvl="0" indent="-342900" algn="just">
-              <a:lnSpc>
-                <a:spcPct val="90000"/>
-              </a:lnSpc>
-              <a:spcBef>
-                <a:spcPts val="750"/>
-              </a:spcBef>
-              <a:buClr>
-                <a:srgbClr val="1FAECD"/>
-              </a:buClr>
-              <a:buSzTx/>
-              <a:buFont typeface="Wingdings" panose="05000000000000000000" charset="0"/>
-              <a:buChar char="Ø"/>
-            </a:pPr>
-            <a:r>
-              <a:rPr lang="en-US" sz="2000" kern="0" smtClean="0">
-                <a:solidFill>
-                  <a:srgbClr val="000000"/>
-                </a:solidFill>
-                <a:latin typeface="Times New Roman" panose="02020603050405020304" pitchFamily="18" charset="0"/>
-                <a:cs typeface="Times New Roman" panose="02020603050405020304" pitchFamily="18" charset="0"/>
-              </a:rPr>
-              <a:t>A huge amount of such opinions are publicly available in the form of reviews. Manufacturers, retailers as well as customers have great interest in customer reviews. </a:t>
-            </a:r>
-            <a:endParaRPr lang="en-US" sz="2000" kern="0" smtClean="0">
-              <a:solidFill>
-                <a:srgbClr val="000000"/>
-              </a:solidFill>
-              <a:latin typeface="Times New Roman" panose="02020603050405020304" pitchFamily="18" charset="0"/>
-              <a:cs typeface="Times New Roman" panose="02020603050405020304" pitchFamily="18" charset="0"/>
-            </a:endParaRPr>
-          </a:p>
-          <a:p>
-            <a:pPr marL="342900" lvl="0" indent="-342900" algn="just">
-              <a:lnSpc>
-                <a:spcPct val="90000"/>
-              </a:lnSpc>
-              <a:spcBef>
-                <a:spcPts val="750"/>
-              </a:spcBef>
-              <a:buClr>
-                <a:srgbClr val="1FAECD"/>
-              </a:buClr>
-              <a:buSzTx/>
-              <a:buFont typeface="Wingdings" panose="05000000000000000000" charset="0"/>
-              <a:buChar char="Ø"/>
-            </a:pPr>
-            <a:r>
-              <a:rPr lang="en-US" sz="2000" kern="0" smtClean="0">
-                <a:solidFill>
-                  <a:srgbClr val="000000"/>
-                </a:solidFill>
-                <a:latin typeface="Times New Roman" panose="02020603050405020304" pitchFamily="18" charset="0"/>
-                <a:cs typeface="Times New Roman" panose="02020603050405020304" pitchFamily="18" charset="0"/>
-              </a:rPr>
-              <a:t>Due to a large number of reviews available on the internet for analysis, it is not cost worthy to read these manually. </a:t>
-            </a:r>
-            <a:endParaRPr lang="en-US" sz="2000" kern="0" smtClean="0">
-              <a:solidFill>
-                <a:srgbClr val="000000"/>
-              </a:solidFill>
-              <a:latin typeface="Times New Roman" panose="02020603050405020304" pitchFamily="18" charset="0"/>
-              <a:cs typeface="Times New Roman" panose="02020603050405020304" pitchFamily="18" charset="0"/>
-            </a:endParaRPr>
-          </a:p>
-          <a:p>
-            <a:pPr marL="342900" lvl="0" indent="-342900" algn="just">
-              <a:lnSpc>
-                <a:spcPct val="90000"/>
-              </a:lnSpc>
-              <a:spcBef>
-                <a:spcPts val="750"/>
-              </a:spcBef>
-              <a:buClr>
-                <a:srgbClr val="1FAECD"/>
-              </a:buClr>
-              <a:buSzTx/>
-              <a:buFont typeface="Wingdings" panose="05000000000000000000" charset="0"/>
-              <a:buChar char="Ø"/>
-            </a:pPr>
-            <a:r>
-              <a:rPr lang="en-US" sz="2000" kern="0" smtClean="0">
-                <a:solidFill>
-                  <a:srgbClr val="000000"/>
-                </a:solidFill>
-                <a:latin typeface="Times New Roman" panose="02020603050405020304" pitchFamily="18" charset="0"/>
-                <a:cs typeface="Times New Roman" panose="02020603050405020304" pitchFamily="18" charset="0"/>
-              </a:rPr>
-              <a:t>To optimize this time-consuming task there is a need for an automated system that provides the summarized result of user sentiments. </a:t>
-            </a:r>
-            <a:endParaRPr lang="en-US" sz="2000" kern="0" smtClean="0">
-              <a:solidFill>
-                <a:srgbClr val="000000"/>
-              </a:solidFill>
-              <a:latin typeface="Times New Roman" panose="02020603050405020304" pitchFamily="18" charset="0"/>
-              <a:cs typeface="Times New Roman" panose="02020603050405020304" pitchFamily="18" charset="0"/>
-            </a:endParaRPr>
-          </a:p>
-          <a:p>
-            <a:pPr marL="342900" lvl="0" indent="-342900" algn="just">
-              <a:lnSpc>
-                <a:spcPct val="90000"/>
-              </a:lnSpc>
-              <a:spcBef>
-                <a:spcPts val="750"/>
-              </a:spcBef>
-              <a:buClr>
-                <a:srgbClr val="1FAECD"/>
-              </a:buClr>
-              <a:buSzTx/>
-              <a:buFont typeface="Wingdings" panose="05000000000000000000" charset="0"/>
-              <a:buChar char="Ø"/>
-            </a:pPr>
-            <a:r>
-              <a:rPr lang="en-US" sz="2000" kern="0" smtClean="0">
-                <a:solidFill>
-                  <a:srgbClr val="000000"/>
-                </a:solidFill>
-                <a:latin typeface="Times New Roman" panose="02020603050405020304" pitchFamily="18" charset="0"/>
-                <a:cs typeface="Times New Roman" panose="02020603050405020304" pitchFamily="18" charset="0"/>
-              </a:rPr>
-              <a:t>Opinion Mining (OM) in the field of study that analyzes people's sentiments or opinions from reviews or opinionated text. </a:t>
-            </a:r>
-            <a:endParaRPr lang="en-US" sz="2000" kern="0" smtClean="0">
-              <a:solidFill>
-                <a:srgbClr val="000000"/>
-              </a:solidFill>
-              <a:latin typeface="Times New Roman" panose="02020603050405020304" pitchFamily="18" charset="0"/>
-              <a:cs typeface="Times New Roman" panose="02020603050405020304" pitchFamily="18" charset="0"/>
-            </a:endParaRPr>
-          </a:p>
-          <a:p>
-            <a:pPr marL="342900" lvl="0" indent="-342900" algn="just">
-              <a:lnSpc>
-                <a:spcPct val="90000"/>
-              </a:lnSpc>
-              <a:spcBef>
-                <a:spcPts val="750"/>
-              </a:spcBef>
-              <a:buClr>
-                <a:srgbClr val="1FAECD"/>
-              </a:buClr>
-              <a:buSzTx/>
-              <a:buFont typeface="Wingdings" panose="05000000000000000000" charset="0"/>
-              <a:buChar char="Ø"/>
-            </a:pPr>
-            <a:r>
-              <a:rPr lang="en-US" sz="2000" kern="0" smtClean="0">
-                <a:solidFill>
-                  <a:srgbClr val="000000"/>
-                </a:solidFill>
-                <a:latin typeface="Times New Roman" panose="02020603050405020304" pitchFamily="18" charset="0"/>
-                <a:cs typeface="Times New Roman" panose="02020603050405020304" pitchFamily="18" charset="0"/>
-              </a:rPr>
-              <a:t>Opinion Mining can be viewed as a natural language processing task, the task is to develop a system that understands the people's language. Opinion Mining is a difficult task due to the ambiguous nature of human languages( like English, etc).             </a:t>
-            </a:r>
-            <a:endParaRPr lang="en-US" sz="2000" kern="0" smtClean="0">
-              <a:solidFill>
-                <a:srgbClr val="000000"/>
-              </a:solidFill>
-              <a:latin typeface="Times New Roman" panose="02020603050405020304" pitchFamily="18" charset="0"/>
-              <a:cs typeface="Times New Roman" panose="02020603050405020304" pitchFamily="18" charset="0"/>
-            </a:endParaRPr>
-          </a:p>
-        </p:txBody>
-      </p:sp>
-      <p:sp>
-        <p:nvSpPr>
-          <p:cNvPr id="3" name="Title 2"/>
-          <p:cNvSpPr>
-            <a:spLocks noGrp="1"/>
-          </p:cNvSpPr>
-          <p:nvPr>
-            <p:ph type="title"/>
-          </p:nvPr>
-        </p:nvSpPr>
-        <p:spPr>
-          <a:xfrm>
-            <a:off x="457200" y="152083"/>
-            <a:ext cx="8229600" cy="1143000"/>
-          </a:xfrm>
-        </p:spPr>
-        <p:txBody>
-          <a:bodyPr/>
-          <a:lstStyle/>
-          <a:p>
-            <a:r>
-              <a:rPr lang="en-IN" dirty="0" smtClean="0">
-                <a:latin typeface="Times New Roman" panose="02020603050405020304" pitchFamily="18" charset="0"/>
-                <a:cs typeface="Times New Roman" panose="02020603050405020304" pitchFamily="18" charset="0"/>
-              </a:rPr>
-              <a:t>ABSTRACT</a:t>
-            </a:r>
-            <a:endParaRPr lang="en-US" dirty="0">
-              <a:latin typeface="Times New Roman" panose="02020603050405020304" pitchFamily="18" charset="0"/>
-              <a:cs typeface="Times New Roman" panose="02020603050405020304" pitchFamily="18" charset="0"/>
-            </a:endParaRPr>
-          </a:p>
-        </p:txBody>
-      </p:sp>
-      <p:sp>
-        <p:nvSpPr>
-          <p:cNvPr id="4" name="Slide Number Placeholder 3"/>
-          <p:cNvSpPr>
-            <a:spLocks noGrp="1"/>
-          </p:cNvSpPr>
-          <p:nvPr>
-            <p:ph type="sldNum" sz="quarter" idx="12"/>
-          </p:nvPr>
-        </p:nvSpPr>
-        <p:spPr/>
-        <p:txBody>
-          <a:bodyPr/>
-          <a:p>
-            <a:fld id="{6AC1B37A-5BC2-4299-A427-7A619A58F75A}" type="slidenum">
-              <a:rPr lang="en-US" smtClean="0"/>
-            </a:fld>
-            <a:endParaRPr lang="en-US"/>
-          </a:p>
-        </p:txBody>
-      </p:sp>
-    </p:spTree>
-  </p:cSld>
-  <p:clrMapOvr>
-    <a:masterClrMapping/>
-  </p:clrMapOvr>
-</p:sld>
-</file>
-
-<file path=ppt/slides/slide20.xml><?xml version="1.0" encoding="utf-8"?>
 <p:sld xmlns:a="http://schemas.openxmlformats.org/drawingml/2006/main" xmlns:r="http://schemas.openxmlformats.org/officeDocument/2006/relationships" xmlns:p="http://schemas.openxmlformats.org/presentationml/2006/main">
   <p:cSld>
     <p:spTree>
@@ -9218,7 +8622,308 @@
 </p:sld>
 </file>
 
-<file path=ppt/slides/slide21.xml><?xml version="1.0" encoding="utf-8"?>
+<file path=ppt/slides/slide2.xml><?xml version="1.0" encoding="utf-8"?>
+<p:sld xmlns:a="http://schemas.openxmlformats.org/drawingml/2006/main" xmlns:r="http://schemas.openxmlformats.org/officeDocument/2006/relationships" xmlns:p="http://schemas.openxmlformats.org/presentationml/2006/main">
+  <p:cSld>
+    <p:spTree>
+      <p:nvGrpSpPr>
+        <p:cNvPr id="1" name=""/>
+        <p:cNvGrpSpPr/>
+        <p:nvPr/>
+      </p:nvGrpSpPr>
+      <p:grpSpPr>
+        <a:xfrm>
+          <a:off x="0" y="0"/>
+          <a:ext cx="0" cy="0"/>
+          <a:chOff x="0" y="0"/>
+          <a:chExt cx="0" cy="0"/>
+        </a:xfrm>
+      </p:grpSpPr>
+      <p:sp>
+        <p:nvSpPr>
+          <p:cNvPr id="2" name="Content Placeholder 1"/>
+          <p:cNvSpPr>
+            <a:spLocks noGrp="1"/>
+          </p:cNvSpPr>
+          <p:nvPr>
+            <p:ph idx="1"/>
+          </p:nvPr>
+        </p:nvSpPr>
+        <p:spPr>
+          <a:xfrm>
+            <a:off x="457200" y="1066800"/>
+            <a:ext cx="8229600" cy="5113020"/>
+          </a:xfrm>
+        </p:spPr>
+        <p:txBody>
+          <a:bodyPr>
+            <a:noAutofit/>
+          </a:bodyPr>
+          <a:lstStyle/>
+          <a:p>
+            <a:pPr marL="342900" lvl="0" indent="-342900" algn="just">
+              <a:lnSpc>
+                <a:spcPct val="90000"/>
+              </a:lnSpc>
+              <a:spcBef>
+                <a:spcPts val="750"/>
+              </a:spcBef>
+              <a:buClr>
+                <a:srgbClr val="1FAECD"/>
+              </a:buClr>
+              <a:buSzTx/>
+              <a:buFont typeface="Wingdings" panose="05000000000000000000" charset="0"/>
+              <a:buChar char="Ø"/>
+            </a:pPr>
+            <a:r>
+              <a:rPr lang="en-US" sz="2000" kern="0" smtClean="0">
+                <a:solidFill>
+                  <a:srgbClr val="000000"/>
+                </a:solidFill>
+                <a:latin typeface="Times New Roman" panose="02020603050405020304" pitchFamily="18" charset="0"/>
+                <a:cs typeface="Times New Roman" panose="02020603050405020304" pitchFamily="18" charset="0"/>
+              </a:rPr>
+              <a:t>Reviews act as a valuable source of information for decision-making. Online e-commerce sites have provided their users to make their opinion about products and services. </a:t>
+            </a:r>
+            <a:endParaRPr lang="en-US" sz="2000" kern="0" smtClean="0">
+              <a:solidFill>
+                <a:srgbClr val="000000"/>
+              </a:solidFill>
+              <a:latin typeface="Times New Roman" panose="02020603050405020304" pitchFamily="18" charset="0"/>
+              <a:cs typeface="Times New Roman" panose="02020603050405020304" pitchFamily="18" charset="0"/>
+            </a:endParaRPr>
+          </a:p>
+          <a:p>
+            <a:pPr marL="342900" lvl="0" indent="-342900" algn="just">
+              <a:lnSpc>
+                <a:spcPct val="90000"/>
+              </a:lnSpc>
+              <a:spcBef>
+                <a:spcPts val="750"/>
+              </a:spcBef>
+              <a:buClr>
+                <a:srgbClr val="1FAECD"/>
+              </a:buClr>
+              <a:buSzTx/>
+              <a:buFont typeface="Wingdings" panose="05000000000000000000" charset="0"/>
+              <a:buChar char="Ø"/>
+            </a:pPr>
+            <a:r>
+              <a:rPr lang="en-US" sz="2000" kern="0" smtClean="0">
+                <a:solidFill>
+                  <a:srgbClr val="000000"/>
+                </a:solidFill>
+                <a:latin typeface="Times New Roman" panose="02020603050405020304" pitchFamily="18" charset="0"/>
+                <a:cs typeface="Times New Roman" panose="02020603050405020304" pitchFamily="18" charset="0"/>
+              </a:rPr>
+              <a:t>A huge amount of such opinions are publicly available in the form of reviews. Manufacturers, retailers as well as customers have great interest in customer reviews. </a:t>
+            </a:r>
+            <a:endParaRPr lang="en-US" sz="2000" kern="0" smtClean="0">
+              <a:solidFill>
+                <a:srgbClr val="000000"/>
+              </a:solidFill>
+              <a:latin typeface="Times New Roman" panose="02020603050405020304" pitchFamily="18" charset="0"/>
+              <a:cs typeface="Times New Roman" panose="02020603050405020304" pitchFamily="18" charset="0"/>
+            </a:endParaRPr>
+          </a:p>
+          <a:p>
+            <a:pPr marL="342900" lvl="0" indent="-342900" algn="just">
+              <a:lnSpc>
+                <a:spcPct val="90000"/>
+              </a:lnSpc>
+              <a:spcBef>
+                <a:spcPts val="750"/>
+              </a:spcBef>
+              <a:buClr>
+                <a:srgbClr val="1FAECD"/>
+              </a:buClr>
+              <a:buSzTx/>
+              <a:buFont typeface="Wingdings" panose="05000000000000000000" charset="0"/>
+              <a:buChar char="Ø"/>
+            </a:pPr>
+            <a:r>
+              <a:rPr lang="en-US" sz="2000" kern="0" smtClean="0">
+                <a:solidFill>
+                  <a:srgbClr val="000000"/>
+                </a:solidFill>
+                <a:latin typeface="Times New Roman" panose="02020603050405020304" pitchFamily="18" charset="0"/>
+                <a:cs typeface="Times New Roman" panose="02020603050405020304" pitchFamily="18" charset="0"/>
+              </a:rPr>
+              <a:t>Due to a large number of reviews available on the internet for analysis, it is not cost worthy to read these manually. </a:t>
+            </a:r>
+            <a:endParaRPr lang="en-US" sz="2000" kern="0" smtClean="0">
+              <a:solidFill>
+                <a:srgbClr val="000000"/>
+              </a:solidFill>
+              <a:latin typeface="Times New Roman" panose="02020603050405020304" pitchFamily="18" charset="0"/>
+              <a:cs typeface="Times New Roman" panose="02020603050405020304" pitchFamily="18" charset="0"/>
+            </a:endParaRPr>
+          </a:p>
+          <a:p>
+            <a:pPr marL="342900" lvl="0" indent="-342900" algn="just">
+              <a:lnSpc>
+                <a:spcPct val="90000"/>
+              </a:lnSpc>
+              <a:spcBef>
+                <a:spcPts val="750"/>
+              </a:spcBef>
+              <a:buClr>
+                <a:srgbClr val="1FAECD"/>
+              </a:buClr>
+              <a:buSzTx/>
+              <a:buFont typeface="Wingdings" panose="05000000000000000000" charset="0"/>
+              <a:buChar char="Ø"/>
+            </a:pPr>
+            <a:r>
+              <a:rPr lang="en-US" sz="2000" kern="0" smtClean="0">
+                <a:solidFill>
+                  <a:srgbClr val="000000"/>
+                </a:solidFill>
+                <a:latin typeface="Times New Roman" panose="02020603050405020304" pitchFamily="18" charset="0"/>
+                <a:cs typeface="Times New Roman" panose="02020603050405020304" pitchFamily="18" charset="0"/>
+              </a:rPr>
+              <a:t>To optimize this time-consuming task there is a need for an automated system that provides the summarized result of user sentiments. </a:t>
+            </a:r>
+            <a:endParaRPr lang="en-US" sz="2000" kern="0" smtClean="0">
+              <a:solidFill>
+                <a:srgbClr val="000000"/>
+              </a:solidFill>
+              <a:latin typeface="Times New Roman" panose="02020603050405020304" pitchFamily="18" charset="0"/>
+              <a:cs typeface="Times New Roman" panose="02020603050405020304" pitchFamily="18" charset="0"/>
+            </a:endParaRPr>
+          </a:p>
+          <a:p>
+            <a:pPr marL="342900" lvl="0" indent="-342900" algn="just">
+              <a:lnSpc>
+                <a:spcPct val="90000"/>
+              </a:lnSpc>
+              <a:spcBef>
+                <a:spcPts val="750"/>
+              </a:spcBef>
+              <a:buClr>
+                <a:srgbClr val="1FAECD"/>
+              </a:buClr>
+              <a:buSzTx/>
+              <a:buFont typeface="Wingdings" panose="05000000000000000000" charset="0"/>
+              <a:buChar char="Ø"/>
+            </a:pPr>
+            <a:r>
+              <a:rPr lang="en-US" sz="2000" kern="0" smtClean="0">
+                <a:solidFill>
+                  <a:srgbClr val="000000"/>
+                </a:solidFill>
+                <a:latin typeface="Times New Roman" panose="02020603050405020304" pitchFamily="18" charset="0"/>
+                <a:cs typeface="Times New Roman" panose="02020603050405020304" pitchFamily="18" charset="0"/>
+              </a:rPr>
+              <a:t>Opinion Mining (OM) in the field of study that analyzes people's sentiments or opinions from reviews or opinionated text. </a:t>
+            </a:r>
+            <a:endParaRPr lang="en-US" sz="2000" kern="0" smtClean="0">
+              <a:solidFill>
+                <a:srgbClr val="000000"/>
+              </a:solidFill>
+              <a:latin typeface="Times New Roman" panose="02020603050405020304" pitchFamily="18" charset="0"/>
+              <a:cs typeface="Times New Roman" panose="02020603050405020304" pitchFamily="18" charset="0"/>
+            </a:endParaRPr>
+          </a:p>
+          <a:p>
+            <a:pPr marL="342900" lvl="0" indent="-342900" algn="just">
+              <a:lnSpc>
+                <a:spcPct val="90000"/>
+              </a:lnSpc>
+              <a:spcBef>
+                <a:spcPts val="750"/>
+              </a:spcBef>
+              <a:buClr>
+                <a:srgbClr val="1FAECD"/>
+              </a:buClr>
+              <a:buSzTx/>
+              <a:buFont typeface="Wingdings" panose="05000000000000000000" charset="0"/>
+              <a:buChar char="Ø"/>
+            </a:pPr>
+            <a:r>
+              <a:rPr lang="en-US" sz="2000" kern="0" smtClean="0">
+                <a:solidFill>
+                  <a:srgbClr val="000000"/>
+                </a:solidFill>
+                <a:latin typeface="Times New Roman" panose="02020603050405020304" pitchFamily="18" charset="0"/>
+                <a:cs typeface="Times New Roman" panose="02020603050405020304" pitchFamily="18" charset="0"/>
+              </a:rPr>
+              <a:t>Opinion Mining can be viewed as a natural language processing task, the task is to develop a system that understands the people's language. Opinion Mining is a difficult task due to the ambiguous nature of human languages( like English, etc).             </a:t>
+            </a:r>
+            <a:endParaRPr lang="en-US" sz="2000" kern="0" smtClean="0">
+              <a:solidFill>
+                <a:srgbClr val="000000"/>
+              </a:solidFill>
+              <a:latin typeface="Times New Roman" panose="02020603050405020304" pitchFamily="18" charset="0"/>
+              <a:cs typeface="Times New Roman" panose="02020603050405020304" pitchFamily="18" charset="0"/>
+            </a:endParaRPr>
+          </a:p>
+        </p:txBody>
+      </p:sp>
+      <p:sp>
+        <p:nvSpPr>
+          <p:cNvPr id="3" name="Title 2"/>
+          <p:cNvSpPr>
+            <a:spLocks noGrp="1"/>
+          </p:cNvSpPr>
+          <p:nvPr>
+            <p:ph type="title"/>
+          </p:nvPr>
+        </p:nvSpPr>
+        <p:spPr>
+          <a:xfrm>
+            <a:off x="457200" y="152083"/>
+            <a:ext cx="8229600" cy="1143000"/>
+          </a:xfrm>
+        </p:spPr>
+        <p:txBody>
+          <a:bodyPr/>
+          <a:lstStyle/>
+          <a:p>
+            <a:r>
+              <a:rPr lang="en-IN" dirty="0" smtClean="0">
+                <a:latin typeface="Times New Roman" panose="02020603050405020304" pitchFamily="18" charset="0"/>
+                <a:cs typeface="Times New Roman" panose="02020603050405020304" pitchFamily="18" charset="0"/>
+              </a:rPr>
+              <a:t>ABSTRACT</a:t>
+            </a:r>
+            <a:endParaRPr lang="en-US" dirty="0">
+              <a:latin typeface="Times New Roman" panose="02020603050405020304" pitchFamily="18" charset="0"/>
+              <a:cs typeface="Times New Roman" panose="02020603050405020304" pitchFamily="18" charset="0"/>
+            </a:endParaRPr>
+          </a:p>
+        </p:txBody>
+      </p:sp>
+      <p:sp>
+        <p:nvSpPr>
+          <p:cNvPr id="4" name="Slide Number Placeholder 3"/>
+          <p:cNvSpPr>
+            <a:spLocks noGrp="1"/>
+          </p:cNvSpPr>
+          <p:nvPr>
+            <p:ph type="sldNum" sz="quarter" idx="12"/>
+          </p:nvPr>
+        </p:nvSpPr>
+        <p:spPr/>
+        <p:txBody>
+          <a:bodyPr/>
+          <a:p>
+            <a:fld id="{6AC1B37A-5BC2-4299-A427-7A619A58F75A}" type="slidenum">
+              <a:rPr lang="en-US" smtClean="0"/>
+            </a:fld>
+            <a:endParaRPr lang="en-US"/>
+          </a:p>
+        </p:txBody>
+      </p:sp>
+    </p:spTree>
+  </p:cSld>
+  <p:clrMapOvr>
+    <a:masterClrMapping/>
+  </p:clrMapOvr>
+</p:sld>
+</file>
+
+<file path=ppt/slides/slide20.xml><?xml version="1.0" encoding="utf-8"?>
 <p:sld xmlns:a="http://schemas.openxmlformats.org/drawingml/2006/main" xmlns:r="http://schemas.openxmlformats.org/officeDocument/2006/relationships" xmlns:p="http://schemas.openxmlformats.org/presentationml/2006/main">
   <p:cSld>
     <p:spTree>
@@ -9309,7 +9014,7 @@
 </p:sld>
 </file>
 
-<file path=ppt/slides/slide22.xml><?xml version="1.0" encoding="utf-8"?>
+<file path=ppt/slides/slide21.xml><?xml version="1.0" encoding="utf-8"?>
 <p:sld xmlns:a="http://schemas.openxmlformats.org/drawingml/2006/main" xmlns:r="http://schemas.openxmlformats.org/officeDocument/2006/relationships" xmlns:p="http://schemas.openxmlformats.org/presentationml/2006/main">
   <p:cSld>
     <p:spTree>
@@ -9396,7 +9101,7 @@
 </p:sld>
 </file>
 
-<file path=ppt/slides/slide23.xml><?xml version="1.0" encoding="utf-8"?>
+<file path=ppt/slides/slide22.xml><?xml version="1.0" encoding="utf-8"?>
 <p:sld xmlns:a="http://schemas.openxmlformats.org/drawingml/2006/main" xmlns:r="http://schemas.openxmlformats.org/officeDocument/2006/relationships" xmlns:p="http://schemas.openxmlformats.org/presentationml/2006/main">
   <p:cSld>
     <p:spTree>
@@ -9483,7 +9188,7 @@
 </p:sld>
 </file>
 
-<file path=ppt/slides/slide24.xml><?xml version="1.0" encoding="utf-8"?>
+<file path=ppt/slides/slide23.xml><?xml version="1.0" encoding="utf-8"?>
 <p:sld xmlns:a="http://schemas.openxmlformats.org/drawingml/2006/main" xmlns:r="http://schemas.openxmlformats.org/officeDocument/2006/relationships" xmlns:p="http://schemas.openxmlformats.org/presentationml/2006/main">
   <p:cSld>
     <p:spTree>
@@ -9572,7 +9277,7 @@
 </p:sld>
 </file>
 
-<file path=ppt/slides/slide25.xml><?xml version="1.0" encoding="utf-8"?>
+<file path=ppt/slides/slide24.xml><?xml version="1.0" encoding="utf-8"?>
 <p:sld xmlns:a="http://schemas.openxmlformats.org/drawingml/2006/main" xmlns:r="http://schemas.openxmlformats.org/officeDocument/2006/relationships" xmlns:p="http://schemas.openxmlformats.org/presentationml/2006/main">
   <p:cSld>
     <p:spTree>
@@ -9661,7 +9366,7 @@
 </p:sld>
 </file>
 
-<file path=ppt/slides/slide26.xml><?xml version="1.0" encoding="utf-8"?>
+<file path=ppt/slides/slide25.xml><?xml version="1.0" encoding="utf-8"?>
 <p:sld xmlns:a="http://schemas.openxmlformats.org/drawingml/2006/main" xmlns:r="http://schemas.openxmlformats.org/officeDocument/2006/relationships" xmlns:p="http://schemas.openxmlformats.org/presentationml/2006/main">
   <p:cSld>
     <p:spTree>
@@ -9853,204 +9558,7 @@
 </p:sld>
 </file>
 
-<file path=ppt/slides/slide27.xml><?xml version="1.0" encoding="utf-8"?>
-<p:sld xmlns:a="http://schemas.openxmlformats.org/drawingml/2006/main" xmlns:r="http://schemas.openxmlformats.org/officeDocument/2006/relationships" xmlns:p="http://schemas.openxmlformats.org/presentationml/2006/main">
-  <p:cSld>
-    <p:spTree>
-      <p:nvGrpSpPr>
-        <p:cNvPr id="1" name=""/>
-        <p:cNvGrpSpPr/>
-        <p:nvPr/>
-      </p:nvGrpSpPr>
-      <p:grpSpPr>
-        <a:xfrm>
-          <a:off x="0" y="0"/>
-          <a:ext cx="0" cy="0"/>
-          <a:chOff x="0" y="0"/>
-          <a:chExt cx="0" cy="0"/>
-        </a:xfrm>
-      </p:grpSpPr>
-      <p:sp>
-        <p:nvSpPr>
-          <p:cNvPr id="3" name="TextBox 2"/>
-          <p:cNvSpPr txBox="1"/>
-          <p:nvPr/>
-        </p:nvSpPr>
-        <p:spPr>
-          <a:xfrm>
-            <a:off x="500034" y="571480"/>
-            <a:ext cx="8143932" cy="369332"/>
-          </a:xfrm>
-          <a:prstGeom prst="rect">
-            <a:avLst/>
-          </a:prstGeom>
-          <a:noFill/>
-        </p:spPr>
-        <p:txBody>
-          <a:bodyPr wrap="square" rtlCol="0">
-            <a:spAutoFit/>
-          </a:bodyPr>
-          <a:lstStyle/>
-          <a:p>
-            <a:endParaRPr lang="en-US" dirty="0"/>
-          </a:p>
-        </p:txBody>
-      </p:sp>
-      <p:sp>
-        <p:nvSpPr>
-          <p:cNvPr id="4" name="Rectangle 3"/>
-          <p:cNvSpPr/>
-          <p:nvPr/>
-        </p:nvSpPr>
-        <p:spPr>
-          <a:xfrm>
-            <a:off x="714348" y="928670"/>
-            <a:ext cx="7786742" cy="5015865"/>
-          </a:xfrm>
-          <a:prstGeom prst="rect">
-            <a:avLst/>
-          </a:prstGeom>
-        </p:spPr>
-        <p:txBody>
-          <a:bodyPr wrap="square">
-            <a:spAutoFit/>
-          </a:bodyPr>
-          <a:lstStyle/>
-          <a:p>
-            <a:pPr algn="just">
-              <a:buNone/>
-            </a:pPr>
-            <a:r>
-              <a:rPr lang="en-US" sz="1600" smtClean="0">
-                <a:latin typeface="Times New Roman" panose="02020603050405020304" pitchFamily="18" charset="0"/>
-                <a:cs typeface="Times New Roman" panose="02020603050405020304" pitchFamily="18" charset="0"/>
-                <a:sym typeface="+mn-ea"/>
-              </a:rPr>
-              <a:t>[7]. K. Bun and M. Ishizuka, “Topic extraction from news archive using TF*PDF algorithm”, In Proceedings of Third International Conference on Web Information System Engineering. </a:t>
-            </a:r>
-            <a:endParaRPr lang="en-US" sz="1600" smtClean="0">
-              <a:latin typeface="Times New Roman" panose="02020603050405020304" pitchFamily="18" charset="0"/>
-              <a:cs typeface="Times New Roman" panose="02020603050405020304" pitchFamily="18" charset="0"/>
-            </a:endParaRPr>
-          </a:p>
-          <a:p>
-            <a:pPr algn="just">
-              <a:buNone/>
-            </a:pPr>
-            <a:r>
-              <a:rPr lang="en-US" sz="1600" smtClean="0">
-                <a:latin typeface="Times New Roman" panose="02020603050405020304" pitchFamily="18" charset="0"/>
-                <a:cs typeface="Times New Roman" panose="02020603050405020304" pitchFamily="18" charset="0"/>
-                <a:sym typeface="+mn-ea"/>
-              </a:rPr>
-              <a:t>[8]. Jacques Savoy, Olena Zubaryeva, “Classification Based on Specific Vocabulary” published in 2011 IEEE/WIC/ACM International Conferences on Web Intelligence and Intelligent Agent Technology 978-0-7695-4513-4/11 2011 IEEE </a:t>
-            </a:r>
-            <a:endParaRPr lang="en-US" sz="1600" smtClean="0">
-              <a:latin typeface="Times New Roman" panose="02020603050405020304" pitchFamily="18" charset="0"/>
-              <a:cs typeface="Times New Roman" panose="02020603050405020304" pitchFamily="18" charset="0"/>
-            </a:endParaRPr>
-          </a:p>
-          <a:p>
-            <a:pPr algn="just">
-              <a:buNone/>
-            </a:pPr>
-            <a:r>
-              <a:rPr lang="en-US" sz="1600" smtClean="0">
-                <a:latin typeface="Times New Roman" panose="02020603050405020304" pitchFamily="18" charset="0"/>
-                <a:cs typeface="Times New Roman" panose="02020603050405020304" pitchFamily="18" charset="0"/>
-                <a:sym typeface="+mn-ea"/>
-              </a:rPr>
-              <a:t>[9]. Dengya Zhu, Jitian XIAO, “R-tfidf, a Variety of tf-idf Term Weighting Strategy in Document Categorization”, published in 2011 Seventh International Conference on Semantics, Knowledge and Grids. </a:t>
-            </a:r>
-            <a:endParaRPr lang="en-US" sz="1600" smtClean="0">
-              <a:latin typeface="Times New Roman" panose="02020603050405020304" pitchFamily="18" charset="0"/>
-              <a:cs typeface="Times New Roman" panose="02020603050405020304" pitchFamily="18" charset="0"/>
-            </a:endParaRPr>
-          </a:p>
-          <a:p>
-            <a:pPr algn="just">
-              <a:buNone/>
-            </a:pPr>
-            <a:r>
-              <a:rPr lang="en-US" sz="1600" smtClean="0">
-                <a:latin typeface="Times New Roman" panose="02020603050405020304" pitchFamily="18" charset="0"/>
-                <a:cs typeface="Times New Roman" panose="02020603050405020304" pitchFamily="18" charset="0"/>
-                <a:sym typeface="+mn-ea"/>
-              </a:rPr>
-              <a:t>[10]. Catherine Blake “A Comparison of Document, Sentence, and Term Event Spaces” published in IEEE 2010</a:t>
-            </a:r>
-            <a:endParaRPr lang="en-US" sz="1600" smtClean="0">
-              <a:latin typeface="Times New Roman" panose="02020603050405020304" pitchFamily="18" charset="0"/>
-              <a:cs typeface="Times New Roman" panose="02020603050405020304" pitchFamily="18" charset="0"/>
-            </a:endParaRPr>
-          </a:p>
-          <a:p>
-            <a:pPr algn="just">
-              <a:buNone/>
-            </a:pPr>
-            <a:r>
-              <a:rPr lang="en-US" sz="1600" smtClean="0">
-                <a:latin typeface="Times New Roman" panose="02020603050405020304" pitchFamily="18" charset="0"/>
-                <a:cs typeface="Times New Roman" panose="02020603050405020304" pitchFamily="18" charset="0"/>
-                <a:sym typeface="+mn-ea"/>
-              </a:rPr>
-              <a:t>[11]. Ying Chen, Wenping Guo, Xiaoming Zhao, “A semantic Based Information Retrieval Model for Blog”, Third International Symposium on Electronic Commerce and Security, 2010, IEEE </a:t>
-            </a:r>
-            <a:endParaRPr lang="en-US" sz="1600" smtClean="0">
-              <a:latin typeface="Times New Roman" panose="02020603050405020304" pitchFamily="18" charset="0"/>
-              <a:cs typeface="Times New Roman" panose="02020603050405020304" pitchFamily="18" charset="0"/>
-            </a:endParaRPr>
-          </a:p>
-          <a:p>
-            <a:pPr algn="just">
-              <a:buNone/>
-            </a:pPr>
-            <a:r>
-              <a:rPr lang="en-US" sz="1600" smtClean="0">
-                <a:latin typeface="Times New Roman" panose="02020603050405020304" pitchFamily="18" charset="0"/>
-                <a:cs typeface="Times New Roman" panose="02020603050405020304" pitchFamily="18" charset="0"/>
-                <a:sym typeface="+mn-ea"/>
-              </a:rPr>
-              <a:t>[12] Jalaj S. Modha, Prof &amp; Head Gayatri S. Pandi Sandip J. Modha, “Automatic Sentiment Analysis for Unstructured Data”, International Journal of Advanced Research in Computer Science and Software Engineering , Volume 3, Issue 12, December 2013 [14] R M. Chandrasekaran, G.Vinodhini, “Sentiment Analysis and Opinion Mining: A Survey”, International Journal of Advanced Research in Computer Science and Software Engineering, Volume 2, Issue 6, June 2012 [15] Bing Liu., “Sentiment Analysis and Opinion Mining”, Morgan &amp; Claypool Publishers, May 2012</a:t>
-            </a:r>
-            <a:endParaRPr lang="en-US" sz="1600" dirty="0" smtClean="0">
-              <a:latin typeface="Times New Roman" panose="02020603050405020304" pitchFamily="18" charset="0"/>
-              <a:cs typeface="Times New Roman" panose="02020603050405020304" pitchFamily="18" charset="0"/>
-              <a:sym typeface="+mn-ea"/>
-            </a:endParaRPr>
-          </a:p>
-        </p:txBody>
-      </p:sp>
-      <p:sp>
-        <p:nvSpPr>
-          <p:cNvPr id="2" name="Slide Number Placeholder 1"/>
-          <p:cNvSpPr>
-            <a:spLocks noGrp="1"/>
-          </p:cNvSpPr>
-          <p:nvPr>
-            <p:ph type="sldNum" sz="quarter" idx="12"/>
-          </p:nvPr>
-        </p:nvSpPr>
-        <p:spPr/>
-        <p:txBody>
-          <a:bodyPr/>
-          <a:p>
-            <a:fld id="{6AC1B37A-5BC2-4299-A427-7A619A58F75A}" type="slidenum">
-              <a:rPr lang="en-US" smtClean="0"/>
-            </a:fld>
-            <a:endParaRPr lang="en-US"/>
-          </a:p>
-        </p:txBody>
-      </p:sp>
-    </p:spTree>
-  </p:cSld>
-  <p:clrMapOvr>
-    <a:masterClrMapping/>
-  </p:clrMapOvr>
-</p:sld>
-</file>
-
-<file path=ppt/slides/slide28.xml><?xml version="1.0" encoding="utf-8"?>
+<file path=ppt/slides/slide26.xml><?xml version="1.0" encoding="utf-8"?>
 <p:sld xmlns:a="http://schemas.openxmlformats.org/drawingml/2006/main" xmlns:r="http://schemas.openxmlformats.org/officeDocument/2006/relationships" xmlns:p="http://schemas.openxmlformats.org/presentationml/2006/main">
   <p:cSld>
     <p:spTree>

</xml_diff>